<commit_message>
Prezentacija za Mobile Day event. Verzija v1.2
</commit_message>
<xml_diff>
--- a/Mobile Day presentation.pptx
+++ b/Mobile Day presentation.pptx
@@ -47,6 +47,12 @@
     <p:sldId id="298" r:id="rId41"/>
     <p:sldId id="299" r:id="rId42"/>
     <p:sldId id="300" r:id="rId43"/>
+    <p:sldId id="301" r:id="rId44"/>
+    <p:sldId id="304" r:id="rId45"/>
+    <p:sldId id="305" r:id="rId46"/>
+    <p:sldId id="303" r:id="rId47"/>
+    <p:sldId id="302" r:id="rId48"/>
+    <p:sldId id="306" r:id="rId49"/>
   </p:sldIdLst>
   <p:sldSz cx="9144000" cy="6858000" type="screen4x3"/>
   <p:notesSz cx="6858000" cy="9144000"/>
@@ -330,7 +336,7 @@
             <a:fld id="{728CDCE0-B3CA-4E31-BE8F-C371E524937F}" type="datetimeFigureOut">
               <a:rPr lang="en-US" smtClean="0"/>
               <a:pPr/>
-              <a:t>6/18/2014</a:t>
+              <a:t>6/19/2014</a:t>
             </a:fld>
             <a:endParaRPr lang="en-US"/>
           </a:p>
@@ -497,7 +503,7 @@
             <a:fld id="{728CDCE0-B3CA-4E31-BE8F-C371E524937F}" type="datetimeFigureOut">
               <a:rPr lang="en-US" smtClean="0"/>
               <a:pPr/>
-              <a:t>6/18/2014</a:t>
+              <a:t>6/19/2014</a:t>
             </a:fld>
             <a:endParaRPr lang="en-US"/>
           </a:p>
@@ -674,7 +680,7 @@
             <a:fld id="{728CDCE0-B3CA-4E31-BE8F-C371E524937F}" type="datetimeFigureOut">
               <a:rPr lang="en-US" smtClean="0"/>
               <a:pPr/>
-              <a:t>6/18/2014</a:t>
+              <a:t>6/19/2014</a:t>
             </a:fld>
             <a:endParaRPr lang="en-US"/>
           </a:p>
@@ -841,7 +847,7 @@
             <a:fld id="{728CDCE0-B3CA-4E31-BE8F-C371E524937F}" type="datetimeFigureOut">
               <a:rPr lang="en-US" smtClean="0"/>
               <a:pPr/>
-              <a:t>6/18/2014</a:t>
+              <a:t>6/19/2014</a:t>
             </a:fld>
             <a:endParaRPr lang="en-US"/>
           </a:p>
@@ -1084,7 +1090,7 @@
             <a:fld id="{728CDCE0-B3CA-4E31-BE8F-C371E524937F}" type="datetimeFigureOut">
               <a:rPr lang="en-US" smtClean="0"/>
               <a:pPr/>
-              <a:t>6/18/2014</a:t>
+              <a:t>6/19/2014</a:t>
             </a:fld>
             <a:endParaRPr lang="en-US"/>
           </a:p>
@@ -1369,7 +1375,7 @@
             <a:fld id="{728CDCE0-B3CA-4E31-BE8F-C371E524937F}" type="datetimeFigureOut">
               <a:rPr lang="en-US" smtClean="0"/>
               <a:pPr/>
-              <a:t>6/18/2014</a:t>
+              <a:t>6/19/2014</a:t>
             </a:fld>
             <a:endParaRPr lang="en-US"/>
           </a:p>
@@ -1788,7 +1794,7 @@
             <a:fld id="{728CDCE0-B3CA-4E31-BE8F-C371E524937F}" type="datetimeFigureOut">
               <a:rPr lang="en-US" smtClean="0"/>
               <a:pPr/>
-              <a:t>6/18/2014</a:t>
+              <a:t>6/19/2014</a:t>
             </a:fld>
             <a:endParaRPr lang="en-US"/>
           </a:p>
@@ -1903,7 +1909,7 @@
             <a:fld id="{728CDCE0-B3CA-4E31-BE8F-C371E524937F}" type="datetimeFigureOut">
               <a:rPr lang="en-US" smtClean="0"/>
               <a:pPr/>
-              <a:t>6/18/2014</a:t>
+              <a:t>6/19/2014</a:t>
             </a:fld>
             <a:endParaRPr lang="en-US"/>
           </a:p>
@@ -1995,7 +2001,7 @@
             <a:fld id="{728CDCE0-B3CA-4E31-BE8F-C371E524937F}" type="datetimeFigureOut">
               <a:rPr lang="en-US" smtClean="0"/>
               <a:pPr/>
-              <a:t>6/18/2014</a:t>
+              <a:t>6/19/2014</a:t>
             </a:fld>
             <a:endParaRPr lang="en-US"/>
           </a:p>
@@ -2269,7 +2275,7 @@
             <a:fld id="{728CDCE0-B3CA-4E31-BE8F-C371E524937F}" type="datetimeFigureOut">
               <a:rPr lang="en-US" smtClean="0"/>
               <a:pPr/>
-              <a:t>6/18/2014</a:t>
+              <a:t>6/19/2014</a:t>
             </a:fld>
             <a:endParaRPr lang="en-US"/>
           </a:p>
@@ -2519,7 +2525,7 @@
             <a:fld id="{728CDCE0-B3CA-4E31-BE8F-C371E524937F}" type="datetimeFigureOut">
               <a:rPr lang="en-US" smtClean="0"/>
               <a:pPr/>
-              <a:t>6/18/2014</a:t>
+              <a:t>6/19/2014</a:t>
             </a:fld>
             <a:endParaRPr lang="en-US"/>
           </a:p>
@@ -2729,7 +2735,7 @@
             <a:fld id="{728CDCE0-B3CA-4E31-BE8F-C371E524937F}" type="datetimeFigureOut">
               <a:rPr lang="en-US" smtClean="0"/>
               <a:pPr/>
-              <a:t>6/18/2014</a:t>
+              <a:t>6/19/2014</a:t>
             </a:fld>
             <a:endParaRPr lang="en-US"/>
           </a:p>
@@ -8372,7 +8378,7 @@
             <a:fld id="{71A8F685-8706-447C-ADBE-376EAB5A8D5E}" type="datetime1">
               <a:rPr lang="nl-BE" smtClean="0"/>
               <a:pPr/>
-              <a:t>18/06/2014</a:t>
+              <a:t>19/06/2014</a:t>
             </a:fld>
             <a:endParaRPr lang="nl-BE"/>
           </a:p>
@@ -11177,11 +11183,7 @@
           <a:p>
             <a:r>
               <a:rPr lang="en-US" sz="2400" dirty="0" smtClean="0"/>
-              <a:t>A </a:t>
-            </a:r>
-            <a:r>
-              <a:rPr lang="en-US" sz="2400" dirty="0" smtClean="0"/>
-              <a:t>service combination represent a state</a:t>
+              <a:t>A service combination represent a state</a:t>
             </a:r>
           </a:p>
           <a:p>
@@ -11416,9 +11418,6 @@
               </a:rPr>
               <a:t>Two phase process: </a:t>
             </a:r>
-            <a:endParaRPr lang="en-US" dirty="0" smtClean="0">
-              <a:cs typeface="Times New Roman" pitchFamily="18" charset="0"/>
-            </a:endParaRPr>
           </a:p>
           <a:p>
             <a:endParaRPr lang="en-US" dirty="0" smtClean="0">
@@ -11449,13 +11448,7 @@
               <a:rPr lang="en-US" b="0" dirty="0" smtClean="0">
                 <a:cs typeface="Times New Roman" pitchFamily="18" charset="0"/>
               </a:rPr>
-              <a:t>Exhaustive search through the state problem space, investigating every service </a:t>
-            </a:r>
-            <a:r>
-              <a:rPr lang="en-US" b="0" dirty="0" smtClean="0">
-                <a:cs typeface="Times New Roman" pitchFamily="18" charset="0"/>
-              </a:rPr>
-              <a:t>combination</a:t>
+              <a:t>Exhaustive search through the state problem space, investigating every service combination</a:t>
             </a:r>
           </a:p>
           <a:p>
@@ -11482,31 +11475,7 @@
               <a:rPr lang="en-US" b="0" dirty="0" smtClean="0">
                 <a:cs typeface="Times New Roman" pitchFamily="18" charset="0"/>
               </a:rPr>
-              <a:t>use </a:t>
-            </a:r>
-            <a:r>
-              <a:rPr lang="en-US" b="0" dirty="0" smtClean="0">
-                <a:cs typeface="Times New Roman" pitchFamily="18" charset="0"/>
-              </a:rPr>
-              <a:t>“Epsilon greedy” </a:t>
-            </a:r>
-            <a:r>
-              <a:rPr lang="en-US" b="0" dirty="0" smtClean="0">
-                <a:cs typeface="Times New Roman" pitchFamily="18" charset="0"/>
-              </a:rPr>
-              <a:t>algorithm to enforce optimal decisions, while staying versatile to </a:t>
-            </a:r>
-            <a:r>
-              <a:rPr lang="en-US" b="0" dirty="0" smtClean="0">
-                <a:cs typeface="Times New Roman" pitchFamily="18" charset="0"/>
-              </a:rPr>
-              <a:t>adapt to possible </a:t>
-            </a:r>
-            <a:r>
-              <a:rPr lang="en-US" b="0" dirty="0" smtClean="0">
-                <a:cs typeface="Times New Roman" pitchFamily="18" charset="0"/>
-              </a:rPr>
-              <a:t>network condition changes</a:t>
+              <a:t>use “Epsilon greedy” algorithm to enforce optimal decisions, while staying versatile to adapt to possible network condition changes</a:t>
             </a:r>
             <a:endParaRPr lang="en-US" b="0" dirty="0">
               <a:cs typeface="Times New Roman" pitchFamily="18" charset="0"/>
@@ -11630,24 +11599,15 @@
           <a:p>
             <a:r>
               <a:rPr lang="en-US" dirty="0" smtClean="0"/>
-              <a:t>Exploration </a:t>
-            </a:r>
-            <a:r>
-              <a:rPr lang="en-US" dirty="0" smtClean="0"/>
-              <a:t>phase:</a:t>
+              <a:t>Exploration phase:</a:t>
             </a:r>
           </a:p>
           <a:p>
             <a:pPr lvl="1"/>
             <a:r>
               <a:rPr lang="en-US" sz="1800" dirty="0" smtClean="0"/>
-              <a:t>Collect </a:t>
-            </a:r>
-            <a:r>
-              <a:rPr lang="en-US" sz="1800" dirty="0" smtClean="0"/>
-              <a:t>the information about </a:t>
-            </a:r>
-            <a:endParaRPr lang="en-US" sz="1800" dirty="0" smtClean="0"/>
+              <a:t>Collect the information about </a:t>
+            </a:r>
           </a:p>
           <a:p>
             <a:pPr lvl="1">
@@ -11655,15 +11615,7 @@
             </a:pPr>
             <a:r>
               <a:rPr lang="en-US" sz="1800" dirty="0" smtClean="0"/>
-              <a:t>every </a:t>
-            </a:r>
-            <a:r>
-              <a:rPr lang="en-US" sz="1800" dirty="0" smtClean="0"/>
-              <a:t>state/action pair, using </a:t>
-            </a:r>
-            <a:r>
-              <a:rPr lang="en-US" sz="1800" dirty="0" smtClean="0"/>
-              <a:t>the</a:t>
+              <a:t>every state/action pair, using the</a:t>
             </a:r>
           </a:p>
           <a:p>
@@ -11676,15 +11628,7 @@
             </a:r>
             <a:r>
               <a:rPr lang="en-US" sz="1800" dirty="0" smtClean="0"/>
-              <a:t> </a:t>
-            </a:r>
-            <a:r>
-              <a:rPr lang="en-US" sz="1800" dirty="0" smtClean="0"/>
-              <a:t>property of the </a:t>
-            </a:r>
-            <a:r>
-              <a:rPr lang="en-US" sz="1800" dirty="0" smtClean="0"/>
-              <a:t>MDP</a:t>
+              <a:t> property of the MDP</a:t>
             </a:r>
           </a:p>
           <a:p>
@@ -11695,15 +11639,7 @@
             <a:pPr lvl="1"/>
             <a:r>
               <a:rPr lang="en-US" sz="1800" dirty="0" smtClean="0"/>
-              <a:t>Use </a:t>
-            </a:r>
-            <a:r>
-              <a:rPr lang="en-US" sz="1800" dirty="0" smtClean="0"/>
-              <a:t>a pseudo random walk </a:t>
-            </a:r>
-            <a:r>
-              <a:rPr lang="en-US" sz="1800" dirty="0" smtClean="0"/>
-              <a:t>to</a:t>
+              <a:t>Use a pseudo random walk to</a:t>
             </a:r>
           </a:p>
           <a:p>
@@ -11712,15 +11648,7 @@
             </a:pPr>
             <a:r>
               <a:rPr lang="en-US" sz="1800" dirty="0" smtClean="0"/>
-              <a:t> </a:t>
-            </a:r>
-            <a:r>
-              <a:rPr lang="en-US" sz="1800" dirty="0" smtClean="0"/>
-              <a:t>collect </a:t>
-            </a:r>
-            <a:r>
-              <a:rPr lang="en-US" sz="1800" dirty="0" smtClean="0"/>
-              <a:t>samples</a:t>
+              <a:t> collect samples</a:t>
             </a:r>
           </a:p>
           <a:p>
@@ -11731,15 +11659,7 @@
             <a:pPr lvl="1"/>
             <a:r>
               <a:rPr lang="en-US" sz="1800" dirty="0" smtClean="0"/>
-              <a:t>Once </a:t>
-            </a:r>
-            <a:r>
-              <a:rPr lang="en-US" sz="1800" dirty="0" smtClean="0"/>
-              <a:t>it is </a:t>
-            </a:r>
-            <a:r>
-              <a:rPr lang="en-US" sz="1800" dirty="0" smtClean="0"/>
-              <a:t>done, calculate the </a:t>
+              <a:t>Once it is done, calculate the </a:t>
             </a:r>
           </a:p>
           <a:p>
@@ -11750,7 +11670,6 @@
               <a:rPr lang="en-US" sz="1800" dirty="0" smtClean="0"/>
               <a:t>initial set of weights and Q values</a:t>
             </a:r>
-            <a:endParaRPr lang="en-US" sz="1800" dirty="0" smtClean="0"/>
           </a:p>
         </p:txBody>
       </p:sp>
@@ -11851,39 +11770,11 @@
             <a:pPr lvl="1"/>
             <a:r>
               <a:rPr lang="en-US" sz="2000" dirty="0" smtClean="0"/>
-              <a:t>Percentage </a:t>
-            </a:r>
-            <a:r>
-              <a:rPr lang="en-US" sz="2000" dirty="0" smtClean="0"/>
-              <a:t>of the number of episodes that system have spent in each state during </a:t>
-            </a:r>
-            <a:r>
-              <a:rPr lang="en-US" sz="2000" dirty="0" smtClean="0"/>
-              <a:t>a particular </a:t>
-            </a:r>
-            <a:r>
-              <a:rPr lang="en-US" sz="2000" dirty="0" smtClean="0"/>
-              <a:t>experimental run. Each run is characterized by a </a:t>
-            </a:r>
-            <a:r>
-              <a:rPr lang="en-US" sz="2000" dirty="0" smtClean="0"/>
-              <a:t>different </a:t>
-            </a:r>
-            <a:r>
-              <a:rPr lang="en-US" sz="2000" dirty="0" smtClean="0"/>
-              <a:t>value of the </a:t>
-            </a:r>
-            <a:r>
-              <a:rPr lang="en-US" sz="2000" dirty="0" smtClean="0"/>
-              <a:t>“epsilon” </a:t>
+              <a:t>Percentage of the number of episodes that system have spent in each state during a particular experimental run. Each run is characterized by a different value of the “epsilon” </a:t>
             </a:r>
             <a:r>
               <a:rPr lang="pt-BR" sz="2000" dirty="0" smtClean="0"/>
-              <a:t>factor = </a:t>
-            </a:r>
-            <a:r>
-              <a:rPr lang="pt-BR" sz="2000" dirty="0" smtClean="0"/>
-              <a:t>(0.9, 0.7, 0.4, 0.1).</a:t>
+              <a:t>factor = (0.9, 0.7, 0.4, 0.1).</a:t>
             </a:r>
             <a:endParaRPr lang="en-US" sz="2000" dirty="0" smtClean="0"/>
           </a:p>
@@ -11990,15 +11881,7 @@
             <a:pPr lvl="1"/>
             <a:r>
               <a:rPr lang="en-US" sz="2000" dirty="0" smtClean="0"/>
-              <a:t>The optimal and the worst performing service combinations</a:t>
-            </a:r>
-            <a:r>
-              <a:rPr lang="en-US" sz="2000" dirty="0" smtClean="0"/>
-              <a:t> </a:t>
-            </a:r>
-            <a:r>
-              <a:rPr lang="en-US" sz="2000" dirty="0" smtClean="0"/>
-              <a:t>switch performances (not highly probable – for a demonstration purpose only)</a:t>
+              <a:t>The optimal and the worst performing service combinations switch performances (not highly probable – for a demonstration purpose only)</a:t>
             </a:r>
           </a:p>
           <a:p>
@@ -12186,8 +12069,8 @@
               <a:t>Implementation – </a:t>
             </a:r>
             <a:r>
-              <a:rPr lang="en-US" sz="4000" dirty="0" smtClean="0"/>
-              <a:t>an improved use case</a:t>
+              <a:rPr lang="en-US" sz="3600" dirty="0" smtClean="0"/>
+              <a:t>a more complex use case</a:t>
             </a:r>
             <a:endParaRPr lang="en-US" dirty="0"/>
           </a:p>
@@ -12217,15 +12100,7 @@
           <a:p>
             <a:r>
               <a:rPr lang="en-US" sz="2400" dirty="0" smtClean="0"/>
-              <a:t>16 </a:t>
-            </a:r>
-            <a:r>
-              <a:rPr lang="en-US" sz="2400" dirty="0" smtClean="0"/>
-              <a:t>experimental service combinations </a:t>
-            </a:r>
-            <a:r>
-              <a:rPr lang="en-US" sz="2400" dirty="0" smtClean="0"/>
-              <a:t>(</a:t>
+              <a:t>16 experimental service combinations (</a:t>
             </a:r>
             <a:r>
               <a:rPr lang="en-US" sz="2400" dirty="0" err="1" smtClean="0"/>
@@ -12233,11 +12108,7 @@
             </a:r>
             <a:r>
               <a:rPr lang="en-US" sz="2400" dirty="0" smtClean="0"/>
-              <a:t> A, CD, ABD </a:t>
-            </a:r>
-            <a:r>
-              <a:rPr lang="en-US" sz="2400" dirty="0" smtClean="0"/>
-              <a:t>…)</a:t>
+              <a:t> A, CD, ABD …)</a:t>
             </a:r>
           </a:p>
           <a:p>
@@ -12245,44 +12116,35 @@
               <a:rPr lang="en-US" sz="2400" dirty="0" smtClean="0"/>
               <a:t> Pre-estimated influences for each combination</a:t>
             </a:r>
+          </a:p>
+          <a:p>
+            <a:r>
+              <a:rPr lang="en-US" sz="2400" dirty="0" smtClean="0"/>
+              <a:t>16 actions available at every state</a:t>
+            </a:r>
+          </a:p>
+          <a:p>
             <a:endParaRPr lang="en-US" sz="2400" dirty="0" smtClean="0"/>
           </a:p>
           <a:p>
+            <a:endParaRPr lang="en-US" sz="2400" dirty="0" smtClean="0"/>
+          </a:p>
+          <a:p>
+            <a:endParaRPr lang="en-US" sz="2400" dirty="0" smtClean="0"/>
+          </a:p>
+          <a:p>
+            <a:endParaRPr lang="en-US" sz="2400" dirty="0" smtClean="0"/>
+          </a:p>
+          <a:p>
+            <a:endParaRPr lang="en-US" sz="2400" dirty="0" smtClean="0"/>
+          </a:p>
+          <a:p>
+            <a:endParaRPr lang="en-US" sz="2400" dirty="0" smtClean="0"/>
+          </a:p>
+          <a:p>
             <a:r>
               <a:rPr lang="en-US" sz="2400" dirty="0" smtClean="0"/>
-              <a:t>16 actions available at every </a:t>
-            </a:r>
-            <a:r>
-              <a:rPr lang="en-US" sz="2400" dirty="0" smtClean="0"/>
-              <a:t>state</a:t>
-            </a:r>
-          </a:p>
-          <a:p>
-            <a:endParaRPr lang="en-US" sz="2400" dirty="0" smtClean="0"/>
-          </a:p>
-          <a:p>
-            <a:endParaRPr lang="en-US" sz="2400" dirty="0" smtClean="0"/>
-          </a:p>
-          <a:p>
-            <a:endParaRPr lang="en-US" sz="2400" dirty="0" smtClean="0"/>
-          </a:p>
-          <a:p>
-            <a:endParaRPr lang="en-US" sz="2400" dirty="0" smtClean="0"/>
-          </a:p>
-          <a:p>
-            <a:endParaRPr lang="en-US" sz="2400" dirty="0" smtClean="0"/>
-          </a:p>
-          <a:p>
-            <a:endParaRPr lang="en-US" sz="2400" dirty="0" smtClean="0"/>
-          </a:p>
-          <a:p>
-            <a:r>
-              <a:rPr lang="en-US" sz="2400" dirty="0" smtClean="0"/>
-              <a:t>One </a:t>
-            </a:r>
-            <a:r>
-              <a:rPr lang="en-US" sz="2400" dirty="0" smtClean="0"/>
-              <a:t>basis function per incentive – Phi</a:t>
+              <a:t>One basis function per incentive – Phi</a:t>
             </a:r>
             <a:r>
               <a:rPr lang="en-US" sz="1800" dirty="0" smtClean="0"/>
@@ -12377,8 +12239,8 @@
               <a:t>Implementation – </a:t>
             </a:r>
             <a:r>
-              <a:rPr lang="en-US" sz="4000" dirty="0" smtClean="0"/>
-              <a:t>an improved use case</a:t>
+              <a:rPr lang="en-US" sz="3600" dirty="0" smtClean="0"/>
+              <a:t>a more complex use case</a:t>
             </a:r>
             <a:endParaRPr lang="en-US" dirty="0"/>
           </a:p>
@@ -12779,8 +12641,8 @@
               <a:t>Implementation – </a:t>
             </a:r>
             <a:r>
-              <a:rPr lang="en-US" sz="4000" dirty="0" smtClean="0"/>
-              <a:t>an improved use case</a:t>
+              <a:rPr lang="en-US" sz="3600" dirty="0" smtClean="0"/>
+              <a:t>a more complex use case</a:t>
             </a:r>
             <a:endParaRPr lang="en-US" dirty="0"/>
           </a:p>
@@ -12805,28 +12667,15 @@
           <a:p>
             <a:r>
               <a:rPr lang="en-US" dirty="0" smtClean="0"/>
-              <a:t>Exploitation </a:t>
-            </a:r>
-            <a:r>
-              <a:rPr lang="en-US" dirty="0" smtClean="0"/>
-              <a:t>phase (epsilon greedy)</a:t>
+              <a:t>Exploitation phase (epsilon greedy)</a:t>
             </a:r>
           </a:p>
           <a:p>
             <a:pPr lvl="1"/>
             <a:r>
               <a:rPr lang="en-US" sz="2000" dirty="0" smtClean="0"/>
-              <a:t>Results </a:t>
-            </a:r>
-            <a:r>
-              <a:rPr lang="en-US" sz="2000" dirty="0" smtClean="0"/>
-              <a:t>after 100 learning episodes, no disturbances </a:t>
-            </a:r>
-            <a:r>
-              <a:rPr lang="en-US" sz="2000" dirty="0" smtClean="0"/>
-              <a:t>present:</a:t>
-            </a:r>
-            <a:endParaRPr lang="en-US" sz="2000" dirty="0" smtClean="0"/>
+              <a:t>Results after 100 learning episodes, no disturbances present:</a:t>
+            </a:r>
           </a:p>
           <a:p>
             <a:pPr>
@@ -12915,8 +12764,8 @@
               <a:t>Implementation – </a:t>
             </a:r>
             <a:r>
-              <a:rPr lang="en-US" sz="4000" dirty="0" smtClean="0"/>
-              <a:t>an improved use case</a:t>
+              <a:rPr lang="en-US" sz="3600" dirty="0" smtClean="0"/>
+              <a:t>a more complex use case</a:t>
             </a:r>
             <a:endParaRPr lang="en-US" dirty="0"/>
           </a:p>
@@ -12952,13 +12801,8 @@
             </a:pPr>
             <a:r>
               <a:rPr lang="en-US" sz="2000" dirty="0" smtClean="0"/>
-              <a:t>Reaction to a network condition </a:t>
-            </a:r>
-            <a:r>
-              <a:rPr lang="en-US" sz="2000" dirty="0" smtClean="0"/>
-              <a:t>disturbance (worst case scenario)</a:t>
-            </a:r>
-            <a:endParaRPr lang="en-US" sz="2000" dirty="0" smtClean="0"/>
+              <a:t>Reaction to a network condition disturbance (worst case scenario)</a:t>
+            </a:r>
           </a:p>
           <a:p>
             <a:pPr>
@@ -13033,12 +12877,26 @@
         </p:nvSpPr>
         <p:spPr/>
         <p:txBody>
-          <a:bodyPr/>
+          <a:bodyPr>
+            <a:normAutofit fontScale="90000"/>
+          </a:bodyPr>
           <a:lstStyle/>
           <a:p>
             <a:r>
               <a:rPr lang="en-US" dirty="0" smtClean="0"/>
-              <a:t>Implementation and results</a:t>
+              <a:t>Implementation </a:t>
+            </a:r>
+            <a:r>
+              <a:rPr lang="en-US" dirty="0" smtClean="0"/>
+              <a:t>- </a:t>
+            </a:r>
+            <a:r>
+              <a:rPr lang="en-US" sz="3600" dirty="0" smtClean="0"/>
+              <a:t>a </a:t>
+            </a:r>
+            <a:r>
+              <a:rPr lang="en-US" sz="3600" dirty="0" smtClean="0"/>
+              <a:t>more complex use case</a:t>
             </a:r>
             <a:endParaRPr lang="en-US" dirty="0"/>
           </a:p>
@@ -13075,11 +12933,7 @@
             <a:pPr lvl="1"/>
             <a:r>
               <a:rPr lang="en-US" sz="2000" dirty="0" smtClean="0"/>
-              <a:t>Introducing </a:t>
-            </a:r>
-            <a:r>
-              <a:rPr lang="en-US" sz="2000" dirty="0" smtClean="0"/>
-              <a:t>a simple efficiency-improving procedure</a:t>
+              <a:t>Introducing a simple efficiency-improving procedure</a:t>
             </a:r>
           </a:p>
           <a:p>
@@ -13132,36 +12986,27 @@
             </a:r>
           </a:p>
           <a:p>
-            <a:pPr>
+            <a:pPr lvl="1">
               <a:buFontTx/>
               <a:buChar char="-"/>
             </a:pPr>
             <a:r>
-              <a:rPr lang="en-US" sz="1900" dirty="0" smtClean="0"/>
+              <a:rPr lang="en-US" sz="1800" dirty="0" smtClean="0"/>
               <a:t>No </a:t>
             </a:r>
             <a:r>
-              <a:rPr lang="en-US" sz="1900" dirty="0" smtClean="0"/>
-              <a:t>significant difference in the number of episodes spent in the optimal </a:t>
-            </a:r>
-            <a:r>
-              <a:rPr lang="en-US" sz="1900" dirty="0" smtClean="0"/>
-              <a:t>state</a:t>
-            </a:r>
-            <a:endParaRPr lang="en-US" sz="1900" dirty="0" smtClean="0"/>
-          </a:p>
-          <a:p>
-            <a:pPr>
+              <a:rPr lang="en-US" sz="1800" dirty="0" smtClean="0"/>
+              <a:t>significant difference in the number of episodes spent in the optimal state</a:t>
+            </a:r>
+          </a:p>
+          <a:p>
+            <a:pPr lvl="1">
               <a:buFontTx/>
               <a:buChar char="-"/>
             </a:pPr>
             <a:r>
-              <a:rPr lang="en-US" sz="1900" dirty="0" smtClean="0"/>
-              <a:t>Significant </a:t>
-            </a:r>
-            <a:r>
-              <a:rPr lang="en-US" sz="1900" dirty="0" smtClean="0"/>
-              <a:t>reduction in the number of episodes spent in the worst performing states</a:t>
+              <a:rPr lang="en-US" sz="1800" dirty="0" smtClean="0"/>
+              <a:t>Significant reduction in the number of episodes spent in the worst performing states</a:t>
             </a:r>
           </a:p>
           <a:p>
@@ -13229,6 +13074,3248 @@
     <a:masterClrMapping/>
   </p:clrMapOvr>
   <p:transition/>
+</p:sld>
+</file>
+
+<file path=ppt/slides/slide43.xml><?xml version="1.0" encoding="utf-8"?>
+<p:sld xmlns:a="http://schemas.openxmlformats.org/drawingml/2006/main" xmlns:r="http://schemas.openxmlformats.org/officeDocument/2006/relationships" xmlns:p="http://schemas.openxmlformats.org/presentationml/2006/main">
+  <p:cSld>
+    <p:spTree>
+      <p:nvGrpSpPr>
+        <p:cNvPr id="1" name=""/>
+        <p:cNvGrpSpPr/>
+        <p:nvPr/>
+      </p:nvGrpSpPr>
+      <p:grpSpPr>
+        <a:xfrm>
+          <a:off x="0" y="0"/>
+          <a:ext cx="0" cy="0"/>
+          <a:chOff x="0" y="0"/>
+          <a:chExt cx="0" cy="0"/>
+        </a:xfrm>
+      </p:grpSpPr>
+      <p:sp>
+        <p:nvSpPr>
+          <p:cNvPr id="2" name="Title 1"/>
+          <p:cNvSpPr>
+            <a:spLocks noGrp="1"/>
+          </p:cNvSpPr>
+          <p:nvPr>
+            <p:ph type="title"/>
+          </p:nvPr>
+        </p:nvSpPr>
+        <p:spPr/>
+        <p:txBody>
+          <a:bodyPr>
+            <a:normAutofit fontScale="90000"/>
+          </a:bodyPr>
+          <a:lstStyle/>
+          <a:p>
+            <a:r>
+              <a:rPr lang="en-US" dirty="0" smtClean="0"/>
+              <a:t>Implementation – introducing SOFTMAX</a:t>
+            </a:r>
+            <a:endParaRPr lang="en-US" dirty="0"/>
+          </a:p>
+        </p:txBody>
+      </p:sp>
+      <p:sp>
+        <p:nvSpPr>
+          <p:cNvPr id="3" name="Content Placeholder 2"/>
+          <p:cNvSpPr>
+            <a:spLocks noGrp="1"/>
+          </p:cNvSpPr>
+          <p:nvPr>
+            <p:ph idx="1"/>
+          </p:nvPr>
+        </p:nvSpPr>
+        <p:spPr/>
+        <p:txBody>
+          <a:bodyPr>
+            <a:normAutofit fontScale="77500" lnSpcReduction="20000"/>
+          </a:bodyPr>
+          <a:lstStyle/>
+          <a:p>
+            <a:r>
+              <a:rPr lang="en-US" sz="3600" dirty="0" smtClean="0">
+                <a:cs typeface="Times New Roman" pitchFamily="18" charset="0"/>
+              </a:rPr>
+              <a:t>SOFTMAX exploiting strategy:</a:t>
+            </a:r>
+          </a:p>
+          <a:p>
+            <a:endParaRPr lang="en-US" dirty="0" smtClean="0">
+              <a:cs typeface="Times New Roman" pitchFamily="18" charset="0"/>
+            </a:endParaRPr>
+          </a:p>
+          <a:p>
+            <a:endParaRPr lang="en-US" dirty="0" smtClean="0">
+              <a:cs typeface="Times New Roman" pitchFamily="18" charset="0"/>
+            </a:endParaRPr>
+          </a:p>
+          <a:p>
+            <a:endParaRPr lang="en-US" dirty="0" smtClean="0">
+              <a:cs typeface="Times New Roman" pitchFamily="18" charset="0"/>
+            </a:endParaRPr>
+          </a:p>
+          <a:p>
+            <a:endParaRPr lang="en-US" dirty="0" smtClean="0">
+              <a:cs typeface="Times New Roman" pitchFamily="18" charset="0"/>
+            </a:endParaRPr>
+          </a:p>
+          <a:p>
+            <a:pPr>
+              <a:buNone/>
+            </a:pPr>
+            <a:r>
+              <a:rPr lang="en-US" dirty="0" smtClean="0">
+                <a:cs typeface="Times New Roman" pitchFamily="18" charset="0"/>
+              </a:rPr>
+              <a:t> </a:t>
+            </a:r>
+          </a:p>
+          <a:p>
+            <a:r>
+              <a:rPr lang="en-US" dirty="0" smtClean="0">
+                <a:cs typeface="Times New Roman" pitchFamily="18" charset="0"/>
+              </a:rPr>
+              <a:t>Probability of choosing a service combination depends on it’s Q value. </a:t>
+            </a:r>
+            <a:endParaRPr lang="en-US" dirty="0" smtClean="0">
+              <a:cs typeface="Times New Roman" pitchFamily="18" charset="0"/>
+            </a:endParaRPr>
+          </a:p>
+          <a:p>
+            <a:endParaRPr lang="en-US" dirty="0" smtClean="0">
+              <a:cs typeface="Times New Roman" pitchFamily="18" charset="0"/>
+            </a:endParaRPr>
+          </a:p>
+          <a:p>
+            <a:r>
+              <a:rPr lang="el-GR" dirty="0" smtClean="0">
+                <a:cs typeface="Times New Roman" pitchFamily="18" charset="0"/>
+              </a:rPr>
+              <a:t>τ</a:t>
+            </a:r>
+            <a:r>
+              <a:rPr lang="en-US" dirty="0" smtClean="0">
+                <a:cs typeface="Times New Roman" pitchFamily="18" charset="0"/>
+              </a:rPr>
+              <a:t>  is a positive parameter called the </a:t>
+            </a:r>
+            <a:r>
+              <a:rPr lang="en-US" i="1" dirty="0" smtClean="0">
+                <a:cs typeface="Times New Roman" pitchFamily="18" charset="0"/>
+              </a:rPr>
+              <a:t>temperature</a:t>
+            </a:r>
+            <a:r>
+              <a:rPr lang="en-US" dirty="0" smtClean="0">
+                <a:cs typeface="Times New Roman" pitchFamily="18" charset="0"/>
+              </a:rPr>
+              <a:t>. Low</a:t>
+            </a:r>
+            <a:r>
+              <a:rPr lang="en-US" i="1" dirty="0" smtClean="0">
+                <a:cs typeface="Times New Roman" pitchFamily="18" charset="0"/>
+              </a:rPr>
+              <a:t> </a:t>
+            </a:r>
+            <a:r>
+              <a:rPr lang="en-US" dirty="0" smtClean="0">
+                <a:cs typeface="Times New Roman" pitchFamily="18" charset="0"/>
+              </a:rPr>
+              <a:t>temperatures cause a greater difference in selection probability for actions that differ in their value estimates.</a:t>
+            </a:r>
+          </a:p>
+          <a:p>
+            <a:endParaRPr lang="en-US" dirty="0"/>
+          </a:p>
+        </p:txBody>
+      </p:sp>
+      <p:pic>
+        <p:nvPicPr>
+          <p:cNvPr id="4" name="Picture 3" descr="Softmax.jpg"/>
+          <p:cNvPicPr>
+            <a:picLocks noChangeAspect="1"/>
+          </p:cNvPicPr>
+          <p:nvPr/>
+        </p:nvPicPr>
+        <p:blipFill>
+          <a:blip r:embed="rId2" cstate="print"/>
+          <a:stretch>
+            <a:fillRect/>
+          </a:stretch>
+        </p:blipFill>
+        <p:spPr>
+          <a:xfrm>
+            <a:off x="3429000" y="2362200"/>
+            <a:ext cx="2133600" cy="1200150"/>
+          </a:xfrm>
+          <a:prstGeom prst="rect">
+            <a:avLst/>
+          </a:prstGeom>
+        </p:spPr>
+      </p:pic>
+    </p:spTree>
+  </p:cSld>
+  <p:clrMapOvr>
+    <a:masterClrMapping/>
+  </p:clrMapOvr>
+</p:sld>
+</file>
+
+<file path=ppt/slides/slide44.xml><?xml version="1.0" encoding="utf-8"?>
+<p:sld xmlns:a="http://schemas.openxmlformats.org/drawingml/2006/main" xmlns:r="http://schemas.openxmlformats.org/officeDocument/2006/relationships" xmlns:p="http://schemas.openxmlformats.org/presentationml/2006/main">
+  <p:cSld>
+    <p:spTree>
+      <p:nvGrpSpPr>
+        <p:cNvPr id="1" name=""/>
+        <p:cNvGrpSpPr/>
+        <p:nvPr/>
+      </p:nvGrpSpPr>
+      <p:grpSpPr>
+        <a:xfrm>
+          <a:off x="0" y="0"/>
+          <a:ext cx="0" cy="0"/>
+          <a:chOff x="0" y="0"/>
+          <a:chExt cx="0" cy="0"/>
+        </a:xfrm>
+      </p:grpSpPr>
+      <p:sp>
+        <p:nvSpPr>
+          <p:cNvPr id="2" name="Title 1"/>
+          <p:cNvSpPr>
+            <a:spLocks noGrp="1"/>
+          </p:cNvSpPr>
+          <p:nvPr>
+            <p:ph type="title"/>
+          </p:nvPr>
+        </p:nvSpPr>
+        <p:spPr/>
+        <p:txBody>
+          <a:bodyPr>
+            <a:normAutofit fontScale="90000"/>
+          </a:bodyPr>
+          <a:lstStyle/>
+          <a:p>
+            <a:r>
+              <a:rPr lang="en-US" sz="5400" dirty="0" smtClean="0">
+                <a:cs typeface="Times New Roman" pitchFamily="18" charset="0"/>
+              </a:rPr>
+              <a:t>Implementation – </a:t>
+            </a:r>
+            <a:r>
+              <a:rPr lang="en-US" sz="3600" dirty="0" smtClean="0">
+                <a:cs typeface="Times New Roman" pitchFamily="18" charset="0"/>
+              </a:rPr>
+              <a:t>an even more complex use case</a:t>
+            </a:r>
+            <a:endParaRPr lang="en-US" dirty="0"/>
+          </a:p>
+        </p:txBody>
+      </p:sp>
+      <p:sp>
+        <p:nvSpPr>
+          <p:cNvPr id="3" name="Content Placeholder 2"/>
+          <p:cNvSpPr>
+            <a:spLocks noGrp="1"/>
+          </p:cNvSpPr>
+          <p:nvPr>
+            <p:ph idx="1"/>
+          </p:nvPr>
+        </p:nvSpPr>
+        <p:spPr>
+          <a:xfrm>
+            <a:off x="457200" y="1600200"/>
+            <a:ext cx="8229600" cy="5029200"/>
+          </a:xfrm>
+        </p:spPr>
+        <p:txBody>
+          <a:bodyPr>
+            <a:normAutofit lnSpcReduction="10000"/>
+          </a:bodyPr>
+          <a:lstStyle/>
+          <a:p>
+            <a:r>
+              <a:rPr lang="en-US" sz="2800" dirty="0" smtClean="0"/>
+              <a:t>Exploring 32 different states</a:t>
+            </a:r>
+          </a:p>
+          <a:p>
+            <a:r>
+              <a:rPr lang="en-US" sz="2800" dirty="0" smtClean="0"/>
+              <a:t>Real life measurements</a:t>
+            </a:r>
+          </a:p>
+          <a:p>
+            <a:endParaRPr lang="en-US" sz="2800" dirty="0" smtClean="0"/>
+          </a:p>
+          <a:p>
+            <a:endParaRPr lang="en-US" sz="2800" dirty="0" smtClean="0"/>
+          </a:p>
+          <a:p>
+            <a:endParaRPr lang="en-US" sz="2800" dirty="0" smtClean="0"/>
+          </a:p>
+          <a:p>
+            <a:endParaRPr lang="en-US" sz="2800" dirty="0" smtClean="0"/>
+          </a:p>
+          <a:p>
+            <a:endParaRPr lang="en-US" sz="2800" dirty="0" smtClean="0"/>
+          </a:p>
+          <a:p>
+            <a:pPr>
+              <a:lnSpc>
+                <a:spcPct val="90000"/>
+              </a:lnSpc>
+              <a:buNone/>
+              <a:defRPr/>
+            </a:pPr>
+            <a:r>
+              <a:rPr lang="en-US" sz="1600" dirty="0" smtClean="0">
+                <a:solidFill>
+                  <a:srgbClr val="20AC00"/>
+                </a:solidFill>
+              </a:rPr>
+              <a:t>Sub-net  A: temperature monitoring sensor nodes</a:t>
+            </a:r>
+          </a:p>
+          <a:p>
+            <a:pPr lvl="1">
+              <a:lnSpc>
+                <a:spcPct val="90000"/>
+              </a:lnSpc>
+              <a:defRPr/>
+            </a:pPr>
+            <a:r>
+              <a:rPr lang="en-US" sz="1600" dirty="0" smtClean="0">
+                <a:solidFill>
+                  <a:srgbClr val="000000"/>
+                </a:solidFill>
+              </a:rPr>
+              <a:t>Incentives: high network lifetime</a:t>
+            </a:r>
+          </a:p>
+          <a:p>
+            <a:pPr lvl="1">
+              <a:lnSpc>
+                <a:spcPct val="90000"/>
+              </a:lnSpc>
+              <a:defRPr/>
+            </a:pPr>
+            <a:r>
+              <a:rPr lang="en-US" sz="1600" dirty="0" smtClean="0">
+                <a:solidFill>
+                  <a:srgbClr val="000000"/>
+                </a:solidFill>
+              </a:rPr>
+              <a:t>Available services: packet sharing, aggregation</a:t>
+            </a:r>
+            <a:endParaRPr lang="en-US" sz="1200" dirty="0" smtClean="0">
+              <a:solidFill>
+                <a:srgbClr val="000000"/>
+              </a:solidFill>
+            </a:endParaRPr>
+          </a:p>
+          <a:p>
+            <a:pPr>
+              <a:lnSpc>
+                <a:spcPct val="90000"/>
+              </a:lnSpc>
+              <a:buNone/>
+              <a:defRPr/>
+            </a:pPr>
+            <a:r>
+              <a:rPr lang="en-US" sz="1600" dirty="0" smtClean="0">
+                <a:solidFill>
+                  <a:srgbClr val="E72D00"/>
+                </a:solidFill>
+              </a:rPr>
+              <a:t>Sub-net  B: temperature sensor nodes</a:t>
+            </a:r>
+          </a:p>
+          <a:p>
+            <a:pPr lvl="1">
+              <a:lnSpc>
+                <a:spcPct val="90000"/>
+              </a:lnSpc>
+              <a:defRPr/>
+            </a:pPr>
+            <a:r>
+              <a:rPr lang="en-US" sz="1600" dirty="0" smtClean="0">
+                <a:solidFill>
+                  <a:srgbClr val="000000"/>
+                </a:solidFill>
+              </a:rPr>
+              <a:t>Incentives: low delay, high network lifetime</a:t>
+            </a:r>
+          </a:p>
+          <a:p>
+            <a:pPr lvl="1">
+              <a:lnSpc>
+                <a:spcPct val="90000"/>
+              </a:lnSpc>
+              <a:defRPr/>
+            </a:pPr>
+            <a:r>
+              <a:rPr lang="en-US" sz="1600" dirty="0" smtClean="0">
+                <a:solidFill>
+                  <a:srgbClr val="000000"/>
+                </a:solidFill>
+              </a:rPr>
+              <a:t>Available services: packet sharing, aggregation</a:t>
+            </a:r>
+          </a:p>
+          <a:p>
+            <a:pPr lvl="1">
+              <a:lnSpc>
+                <a:spcPct val="90000"/>
+              </a:lnSpc>
+              <a:buNone/>
+              <a:defRPr/>
+            </a:pPr>
+            <a:endParaRPr lang="en-US" sz="1400" dirty="0" smtClean="0">
+              <a:solidFill>
+                <a:srgbClr val="000000"/>
+              </a:solidFill>
+            </a:endParaRPr>
+          </a:p>
+          <a:p>
+            <a:endParaRPr lang="en-US" sz="1800" b="1" dirty="0" smtClean="0"/>
+          </a:p>
+          <a:p>
+            <a:endParaRPr lang="en-US" sz="2800" dirty="0" smtClean="0"/>
+          </a:p>
+          <a:p>
+            <a:endParaRPr lang="en-US" dirty="0"/>
+          </a:p>
+        </p:txBody>
+      </p:sp>
+      <p:grpSp>
+        <p:nvGrpSpPr>
+          <p:cNvPr id="6" name="Group 2"/>
+          <p:cNvGrpSpPr>
+            <a:grpSpLocks/>
+          </p:cNvGrpSpPr>
+          <p:nvPr/>
+        </p:nvGrpSpPr>
+        <p:grpSpPr bwMode="auto">
+          <a:xfrm>
+            <a:off x="1066800" y="2667000"/>
+            <a:ext cx="7356475" cy="1886895"/>
+            <a:chOff x="427553" y="3208500"/>
+            <a:chExt cx="8499134" cy="2496976"/>
+          </a:xfrm>
+        </p:grpSpPr>
+        <p:pic>
+          <p:nvPicPr>
+            <p:cNvPr id="7" name="Picture 2" descr="D:\SVN\research\publications\Papers\Network Negotiation\Journal Version\measurements\Zuiderpoort3.png"/>
+            <p:cNvPicPr>
+              <a:picLocks noChangeAspect="1" noChangeArrowheads="1"/>
+            </p:cNvPicPr>
+            <p:nvPr/>
+          </p:nvPicPr>
+          <p:blipFill>
+            <a:blip r:embed="rId2" cstate="print"/>
+            <a:srcRect/>
+            <a:stretch>
+              <a:fillRect/>
+            </a:stretch>
+          </p:blipFill>
+          <p:spPr bwMode="auto">
+            <a:xfrm>
+              <a:off x="427553" y="3295650"/>
+              <a:ext cx="8305800" cy="1619250"/>
+            </a:xfrm>
+            <a:prstGeom prst="rect">
+              <a:avLst/>
+            </a:prstGeom>
+            <a:noFill/>
+            <a:ln w="9525">
+              <a:noFill/>
+              <a:miter lim="800000"/>
+              <a:headEnd/>
+              <a:tailEnd/>
+            </a:ln>
+          </p:spPr>
+        </p:pic>
+        <p:grpSp>
+          <p:nvGrpSpPr>
+            <p:cNvPr id="8" name="Group 75"/>
+            <p:cNvGrpSpPr>
+              <a:grpSpLocks/>
+            </p:cNvGrpSpPr>
+            <p:nvPr/>
+          </p:nvGrpSpPr>
+          <p:grpSpPr bwMode="auto">
+            <a:xfrm>
+              <a:off x="1151453" y="5429250"/>
+              <a:ext cx="152400" cy="200025"/>
+              <a:chOff x="1219200" y="4905375"/>
+              <a:chExt cx="152400" cy="200025"/>
+            </a:xfrm>
+          </p:grpSpPr>
+          <p:pic>
+            <p:nvPicPr>
+              <p:cNvPr id="71" name="Picture 4"/>
+              <p:cNvPicPr>
+                <a:picLocks noChangeAspect="1" noChangeArrowheads="1"/>
+              </p:cNvPicPr>
+              <p:nvPr/>
+            </p:nvPicPr>
+            <p:blipFill>
+              <a:blip r:embed="rId3" cstate="print"/>
+              <a:srcRect/>
+              <a:stretch>
+                <a:fillRect/>
+              </a:stretch>
+            </p:blipFill>
+            <p:spPr bwMode="auto">
+              <a:xfrm>
+                <a:off x="1286203" y="4905375"/>
+                <a:ext cx="85397" cy="123825"/>
+              </a:xfrm>
+              <a:prstGeom prst="rect">
+                <a:avLst/>
+              </a:prstGeom>
+              <a:noFill/>
+              <a:ln w="9525">
+                <a:noFill/>
+                <a:miter lim="800000"/>
+                <a:headEnd/>
+                <a:tailEnd/>
+              </a:ln>
+            </p:spPr>
+          </p:pic>
+          <p:sp>
+            <p:nvSpPr>
+              <p:cNvPr id="72" name="Isosceles Triangle 71"/>
+              <p:cNvSpPr/>
+              <p:nvPr/>
+            </p:nvSpPr>
+            <p:spPr>
+              <a:xfrm>
+                <a:off x="1219171" y="4952957"/>
+                <a:ext cx="152394" cy="152429"/>
+              </a:xfrm>
+              <a:prstGeom prst="triangle">
+                <a:avLst/>
+              </a:prstGeom>
+            </p:spPr>
+            <p:style>
+              <a:lnRef idx="1">
+                <a:schemeClr val="accent2"/>
+              </a:lnRef>
+              <a:fillRef idx="2">
+                <a:schemeClr val="accent2"/>
+              </a:fillRef>
+              <a:effectRef idx="1">
+                <a:schemeClr val="accent2"/>
+              </a:effectRef>
+              <a:fontRef idx="minor">
+                <a:schemeClr val="dk1"/>
+              </a:fontRef>
+            </p:style>
+            <p:txBody>
+              <a:bodyPr anchor="ctr"/>
+              <a:lstStyle/>
+              <a:p>
+                <a:pPr algn="ctr">
+                  <a:defRPr/>
+                </a:pPr>
+                <a:r>
+                  <a:rPr lang="en-US" sz="1050" dirty="0"/>
+                  <a:t>B</a:t>
+                </a:r>
+                <a:endParaRPr lang="nl-BE" sz="1050" dirty="0"/>
+              </a:p>
+            </p:txBody>
+          </p:sp>
+        </p:grpSp>
+        <p:grpSp>
+          <p:nvGrpSpPr>
+            <p:cNvPr id="9" name="Group 78"/>
+            <p:cNvGrpSpPr/>
+            <p:nvPr/>
+          </p:nvGrpSpPr>
+          <p:grpSpPr>
+            <a:xfrm>
+              <a:off x="1151453" y="5095875"/>
+              <a:ext cx="161597" cy="228600"/>
+              <a:chOff x="1143000" y="4419600"/>
+              <a:chExt cx="161597" cy="228600"/>
+            </a:xfrm>
+            <a:solidFill>
+              <a:srgbClr val="00B050"/>
+            </a:solidFill>
+          </p:grpSpPr>
+          <p:pic>
+            <p:nvPicPr>
+              <p:cNvPr id="69" name="Picture 4"/>
+              <p:cNvPicPr>
+                <a:picLocks noChangeAspect="1" noChangeArrowheads="1"/>
+              </p:cNvPicPr>
+              <p:nvPr/>
+            </p:nvPicPr>
+            <p:blipFill>
+              <a:blip r:embed="rId3" cstate="print"/>
+              <a:srcRect/>
+              <a:stretch>
+                <a:fillRect/>
+              </a:stretch>
+            </p:blipFill>
+            <p:spPr bwMode="auto">
+              <a:xfrm>
+                <a:off x="1219200" y="4419600"/>
+                <a:ext cx="85397" cy="123825"/>
+              </a:xfrm>
+              <a:prstGeom prst="rect">
+                <a:avLst/>
+              </a:prstGeom>
+              <a:grpFill/>
+              <a:ln w="9525">
+                <a:noFill/>
+                <a:miter lim="800000"/>
+                <a:headEnd/>
+                <a:tailEnd/>
+              </a:ln>
+            </p:spPr>
+          </p:pic>
+          <p:sp>
+            <p:nvSpPr>
+              <p:cNvPr id="70" name="Oval 69"/>
+              <p:cNvSpPr/>
+              <p:nvPr/>
+            </p:nvSpPr>
+            <p:spPr>
+              <a:xfrm>
+                <a:off x="1143000" y="4495800"/>
+                <a:ext cx="152400" cy="152400"/>
+              </a:xfrm>
+              <a:prstGeom prst="ellipse">
+                <a:avLst/>
+              </a:prstGeom>
+              <a:grpFill/>
+            </p:spPr>
+            <p:style>
+              <a:lnRef idx="1">
+                <a:schemeClr val="accent3"/>
+              </a:lnRef>
+              <a:fillRef idx="2">
+                <a:schemeClr val="accent3"/>
+              </a:fillRef>
+              <a:effectRef idx="1">
+                <a:schemeClr val="accent3"/>
+              </a:effectRef>
+              <a:fontRef idx="minor">
+                <a:schemeClr val="dk1"/>
+              </a:fontRef>
+            </p:style>
+            <p:txBody>
+              <a:bodyPr anchor="ctr"/>
+              <a:lstStyle/>
+              <a:p>
+                <a:pPr algn="ctr">
+                  <a:defRPr/>
+                </a:pPr>
+                <a:r>
+                  <a:rPr lang="en-US" sz="1050" dirty="0"/>
+                  <a:t>A</a:t>
+                </a:r>
+                <a:endParaRPr lang="nl-BE" sz="1050" dirty="0"/>
+              </a:p>
+            </p:txBody>
+          </p:sp>
+        </p:grpSp>
+        <p:grpSp>
+          <p:nvGrpSpPr>
+            <p:cNvPr id="10" name="Group 81"/>
+            <p:cNvGrpSpPr/>
+            <p:nvPr/>
+          </p:nvGrpSpPr>
+          <p:grpSpPr>
+            <a:xfrm>
+              <a:off x="1599457" y="4122900"/>
+              <a:ext cx="323194" cy="439576"/>
+              <a:chOff x="990600" y="3657600"/>
+              <a:chExt cx="161597" cy="228600"/>
+            </a:xfrm>
+            <a:solidFill>
+              <a:srgbClr val="00B050"/>
+            </a:solidFill>
+          </p:grpSpPr>
+          <p:pic>
+            <p:nvPicPr>
+              <p:cNvPr id="67" name="Picture 4"/>
+              <p:cNvPicPr>
+                <a:picLocks noChangeAspect="1" noChangeArrowheads="1"/>
+              </p:cNvPicPr>
+              <p:nvPr/>
+            </p:nvPicPr>
+            <p:blipFill>
+              <a:blip r:embed="rId3" cstate="print"/>
+              <a:srcRect/>
+              <a:stretch>
+                <a:fillRect/>
+              </a:stretch>
+            </p:blipFill>
+            <p:spPr bwMode="auto">
+              <a:xfrm>
+                <a:off x="1066800" y="3657600"/>
+                <a:ext cx="85397" cy="123825"/>
+              </a:xfrm>
+              <a:prstGeom prst="rect">
+                <a:avLst/>
+              </a:prstGeom>
+              <a:grpFill/>
+              <a:ln w="9525">
+                <a:noFill/>
+                <a:miter lim="800000"/>
+                <a:headEnd/>
+                <a:tailEnd/>
+              </a:ln>
+            </p:spPr>
+          </p:pic>
+          <p:sp>
+            <p:nvSpPr>
+              <p:cNvPr id="68" name="Oval 67"/>
+              <p:cNvSpPr/>
+              <p:nvPr/>
+            </p:nvSpPr>
+            <p:spPr>
+              <a:xfrm>
+                <a:off x="990600" y="3733800"/>
+                <a:ext cx="152400" cy="152400"/>
+              </a:xfrm>
+              <a:prstGeom prst="ellipse">
+                <a:avLst/>
+              </a:prstGeom>
+              <a:grpFill/>
+            </p:spPr>
+            <p:style>
+              <a:lnRef idx="1">
+                <a:schemeClr val="accent3"/>
+              </a:lnRef>
+              <a:fillRef idx="2">
+                <a:schemeClr val="accent3"/>
+              </a:fillRef>
+              <a:effectRef idx="1">
+                <a:schemeClr val="accent3"/>
+              </a:effectRef>
+              <a:fontRef idx="minor">
+                <a:schemeClr val="dk1"/>
+              </a:fontRef>
+            </p:style>
+            <p:txBody>
+              <a:bodyPr anchor="ctr"/>
+              <a:lstStyle/>
+              <a:p>
+                <a:pPr algn="ctr">
+                  <a:defRPr/>
+                </a:pPr>
+                <a:r>
+                  <a:rPr lang="en-US" sz="1050" dirty="0"/>
+                  <a:t>A</a:t>
+                </a:r>
+                <a:endParaRPr lang="nl-BE" sz="1050" dirty="0"/>
+              </a:p>
+            </p:txBody>
+          </p:sp>
+        </p:grpSp>
+        <p:sp>
+          <p:nvSpPr>
+            <p:cNvPr id="11" name="TextBox 84"/>
+            <p:cNvSpPr txBox="1">
+              <a:spLocks noChangeArrowheads="1"/>
+            </p:cNvSpPr>
+            <p:nvPr/>
+          </p:nvSpPr>
+          <p:spPr bwMode="auto">
+            <a:xfrm>
+              <a:off x="1456253" y="5095874"/>
+              <a:ext cx="2785634" cy="277000"/>
+            </a:xfrm>
+            <a:prstGeom prst="rect">
+              <a:avLst/>
+            </a:prstGeom>
+            <a:noFill/>
+            <a:ln w="9525">
+              <a:noFill/>
+              <a:miter lim="800000"/>
+              <a:headEnd/>
+              <a:tailEnd/>
+            </a:ln>
+          </p:spPr>
+          <p:txBody>
+            <a:bodyPr wrap="none">
+              <a:spAutoFit/>
+            </a:bodyPr>
+            <a:lstStyle/>
+            <a:p>
+              <a:r>
+                <a:rPr lang="en-US" sz="1200" dirty="0"/>
+                <a:t>Temperature  sensor node (community A)</a:t>
+              </a:r>
+              <a:endParaRPr lang="nl-BE" sz="1200"/>
+            </a:p>
+          </p:txBody>
+        </p:sp>
+        <p:sp>
+          <p:nvSpPr>
+            <p:cNvPr id="12" name="TextBox 85"/>
+            <p:cNvSpPr txBox="1">
+              <a:spLocks noChangeArrowheads="1"/>
+            </p:cNvSpPr>
+            <p:nvPr/>
+          </p:nvSpPr>
+          <p:spPr bwMode="auto">
+            <a:xfrm>
+              <a:off x="1467830" y="5428475"/>
+              <a:ext cx="3135410" cy="277000"/>
+            </a:xfrm>
+            <a:prstGeom prst="rect">
+              <a:avLst/>
+            </a:prstGeom>
+            <a:noFill/>
+            <a:ln w="9525">
+              <a:noFill/>
+              <a:miter lim="800000"/>
+              <a:headEnd/>
+              <a:tailEnd/>
+            </a:ln>
+          </p:spPr>
+          <p:txBody>
+            <a:bodyPr wrap="none">
+              <a:spAutoFit/>
+            </a:bodyPr>
+            <a:lstStyle/>
+            <a:p>
+              <a:r>
+                <a:rPr lang="en-US" sz="1200" dirty="0"/>
+                <a:t>Intrusion detection sensor node (community B)</a:t>
+              </a:r>
+            </a:p>
+          </p:txBody>
+        </p:sp>
+        <p:grpSp>
+          <p:nvGrpSpPr>
+            <p:cNvPr id="13" name="Group 86"/>
+            <p:cNvGrpSpPr/>
+            <p:nvPr/>
+          </p:nvGrpSpPr>
+          <p:grpSpPr>
+            <a:xfrm>
+              <a:off x="3047257" y="3437100"/>
+              <a:ext cx="323194" cy="439576"/>
+              <a:chOff x="990600" y="3657600"/>
+              <a:chExt cx="161597" cy="228600"/>
+            </a:xfrm>
+            <a:solidFill>
+              <a:srgbClr val="00B050"/>
+            </a:solidFill>
+          </p:grpSpPr>
+          <p:pic>
+            <p:nvPicPr>
+              <p:cNvPr id="65" name="Picture 4"/>
+              <p:cNvPicPr>
+                <a:picLocks noChangeAspect="1" noChangeArrowheads="1"/>
+              </p:cNvPicPr>
+              <p:nvPr/>
+            </p:nvPicPr>
+            <p:blipFill>
+              <a:blip r:embed="rId3" cstate="print"/>
+              <a:srcRect/>
+              <a:stretch>
+                <a:fillRect/>
+              </a:stretch>
+            </p:blipFill>
+            <p:spPr bwMode="auto">
+              <a:xfrm>
+                <a:off x="1066800" y="3657600"/>
+                <a:ext cx="85397" cy="123825"/>
+              </a:xfrm>
+              <a:prstGeom prst="rect">
+                <a:avLst/>
+              </a:prstGeom>
+              <a:grpFill/>
+              <a:ln w="9525">
+                <a:noFill/>
+                <a:miter lim="800000"/>
+                <a:headEnd/>
+                <a:tailEnd/>
+              </a:ln>
+            </p:spPr>
+          </p:pic>
+          <p:sp>
+            <p:nvSpPr>
+              <p:cNvPr id="66" name="Oval 65"/>
+              <p:cNvSpPr/>
+              <p:nvPr/>
+            </p:nvSpPr>
+            <p:spPr>
+              <a:xfrm>
+                <a:off x="990600" y="3733800"/>
+                <a:ext cx="152400" cy="152400"/>
+              </a:xfrm>
+              <a:prstGeom prst="ellipse">
+                <a:avLst/>
+              </a:prstGeom>
+              <a:grpFill/>
+            </p:spPr>
+            <p:style>
+              <a:lnRef idx="1">
+                <a:schemeClr val="accent3"/>
+              </a:lnRef>
+              <a:fillRef idx="2">
+                <a:schemeClr val="accent3"/>
+              </a:fillRef>
+              <a:effectRef idx="1">
+                <a:schemeClr val="accent3"/>
+              </a:effectRef>
+              <a:fontRef idx="minor">
+                <a:schemeClr val="dk1"/>
+              </a:fontRef>
+            </p:style>
+            <p:txBody>
+              <a:bodyPr anchor="ctr"/>
+              <a:lstStyle/>
+              <a:p>
+                <a:pPr algn="ctr">
+                  <a:defRPr/>
+                </a:pPr>
+                <a:r>
+                  <a:rPr lang="en-US" sz="1050" dirty="0"/>
+                  <a:t>A</a:t>
+                </a:r>
+                <a:endParaRPr lang="nl-BE" sz="1050" dirty="0"/>
+              </a:p>
+            </p:txBody>
+          </p:sp>
+        </p:grpSp>
+        <p:grpSp>
+          <p:nvGrpSpPr>
+            <p:cNvPr id="14" name="Group 89"/>
+            <p:cNvGrpSpPr/>
+            <p:nvPr/>
+          </p:nvGrpSpPr>
+          <p:grpSpPr>
+            <a:xfrm>
+              <a:off x="3428257" y="3970500"/>
+              <a:ext cx="323194" cy="439576"/>
+              <a:chOff x="990600" y="3657600"/>
+              <a:chExt cx="161597" cy="228600"/>
+            </a:xfrm>
+            <a:solidFill>
+              <a:srgbClr val="00B050"/>
+            </a:solidFill>
+          </p:grpSpPr>
+          <p:pic>
+            <p:nvPicPr>
+              <p:cNvPr id="63" name="Picture 4"/>
+              <p:cNvPicPr>
+                <a:picLocks noChangeAspect="1" noChangeArrowheads="1"/>
+              </p:cNvPicPr>
+              <p:nvPr/>
+            </p:nvPicPr>
+            <p:blipFill>
+              <a:blip r:embed="rId3" cstate="print"/>
+              <a:srcRect/>
+              <a:stretch>
+                <a:fillRect/>
+              </a:stretch>
+            </p:blipFill>
+            <p:spPr bwMode="auto">
+              <a:xfrm>
+                <a:off x="1066800" y="3657600"/>
+                <a:ext cx="85397" cy="123825"/>
+              </a:xfrm>
+              <a:prstGeom prst="rect">
+                <a:avLst/>
+              </a:prstGeom>
+              <a:grpFill/>
+              <a:ln w="9525">
+                <a:noFill/>
+                <a:miter lim="800000"/>
+                <a:headEnd/>
+                <a:tailEnd/>
+              </a:ln>
+            </p:spPr>
+          </p:pic>
+          <p:sp>
+            <p:nvSpPr>
+              <p:cNvPr id="64" name="Oval 63"/>
+              <p:cNvSpPr/>
+              <p:nvPr/>
+            </p:nvSpPr>
+            <p:spPr>
+              <a:xfrm>
+                <a:off x="990600" y="3733800"/>
+                <a:ext cx="152400" cy="152400"/>
+              </a:xfrm>
+              <a:prstGeom prst="ellipse">
+                <a:avLst/>
+              </a:prstGeom>
+              <a:grpFill/>
+            </p:spPr>
+            <p:style>
+              <a:lnRef idx="1">
+                <a:schemeClr val="accent3"/>
+              </a:lnRef>
+              <a:fillRef idx="2">
+                <a:schemeClr val="accent3"/>
+              </a:fillRef>
+              <a:effectRef idx="1">
+                <a:schemeClr val="accent3"/>
+              </a:effectRef>
+              <a:fontRef idx="minor">
+                <a:schemeClr val="dk1"/>
+              </a:fontRef>
+            </p:style>
+            <p:txBody>
+              <a:bodyPr anchor="ctr"/>
+              <a:lstStyle/>
+              <a:p>
+                <a:pPr algn="ctr">
+                  <a:defRPr/>
+                </a:pPr>
+                <a:r>
+                  <a:rPr lang="en-US" sz="1050" dirty="0"/>
+                  <a:t>A</a:t>
+                </a:r>
+                <a:endParaRPr lang="nl-BE" sz="1050" dirty="0"/>
+              </a:p>
+            </p:txBody>
+          </p:sp>
+        </p:grpSp>
+        <p:grpSp>
+          <p:nvGrpSpPr>
+            <p:cNvPr id="15" name="Group 92"/>
+            <p:cNvGrpSpPr/>
+            <p:nvPr/>
+          </p:nvGrpSpPr>
+          <p:grpSpPr>
+            <a:xfrm>
+              <a:off x="4190257" y="3284700"/>
+              <a:ext cx="323194" cy="439576"/>
+              <a:chOff x="990600" y="3657600"/>
+              <a:chExt cx="161597" cy="228600"/>
+            </a:xfrm>
+            <a:solidFill>
+              <a:srgbClr val="00B050"/>
+            </a:solidFill>
+          </p:grpSpPr>
+          <p:pic>
+            <p:nvPicPr>
+              <p:cNvPr id="61" name="Picture 4"/>
+              <p:cNvPicPr>
+                <a:picLocks noChangeAspect="1" noChangeArrowheads="1"/>
+              </p:cNvPicPr>
+              <p:nvPr/>
+            </p:nvPicPr>
+            <p:blipFill>
+              <a:blip r:embed="rId3" cstate="print"/>
+              <a:srcRect/>
+              <a:stretch>
+                <a:fillRect/>
+              </a:stretch>
+            </p:blipFill>
+            <p:spPr bwMode="auto">
+              <a:xfrm>
+                <a:off x="1066800" y="3657600"/>
+                <a:ext cx="85397" cy="123825"/>
+              </a:xfrm>
+              <a:prstGeom prst="rect">
+                <a:avLst/>
+              </a:prstGeom>
+              <a:grpFill/>
+              <a:ln w="9525">
+                <a:noFill/>
+                <a:miter lim="800000"/>
+                <a:headEnd/>
+                <a:tailEnd/>
+              </a:ln>
+            </p:spPr>
+          </p:pic>
+          <p:sp>
+            <p:nvSpPr>
+              <p:cNvPr id="62" name="Oval 61"/>
+              <p:cNvSpPr/>
+              <p:nvPr/>
+            </p:nvSpPr>
+            <p:spPr>
+              <a:xfrm>
+                <a:off x="990600" y="3733800"/>
+                <a:ext cx="152400" cy="152400"/>
+              </a:xfrm>
+              <a:prstGeom prst="ellipse">
+                <a:avLst/>
+              </a:prstGeom>
+              <a:grpFill/>
+            </p:spPr>
+            <p:style>
+              <a:lnRef idx="1">
+                <a:schemeClr val="accent3"/>
+              </a:lnRef>
+              <a:fillRef idx="2">
+                <a:schemeClr val="accent3"/>
+              </a:fillRef>
+              <a:effectRef idx="1">
+                <a:schemeClr val="accent3"/>
+              </a:effectRef>
+              <a:fontRef idx="minor">
+                <a:schemeClr val="dk1"/>
+              </a:fontRef>
+            </p:style>
+            <p:txBody>
+              <a:bodyPr anchor="ctr"/>
+              <a:lstStyle/>
+              <a:p>
+                <a:pPr algn="ctr">
+                  <a:defRPr/>
+                </a:pPr>
+                <a:r>
+                  <a:rPr lang="en-US" sz="1050" dirty="0"/>
+                  <a:t>A</a:t>
+                </a:r>
+                <a:endParaRPr lang="nl-BE" sz="1050" dirty="0"/>
+              </a:p>
+            </p:txBody>
+          </p:sp>
+        </p:grpSp>
+        <p:grpSp>
+          <p:nvGrpSpPr>
+            <p:cNvPr id="16" name="Group 95"/>
+            <p:cNvGrpSpPr/>
+            <p:nvPr/>
+          </p:nvGrpSpPr>
+          <p:grpSpPr>
+            <a:xfrm>
+              <a:off x="5180857" y="3665700"/>
+              <a:ext cx="323194" cy="439576"/>
+              <a:chOff x="990600" y="3657600"/>
+              <a:chExt cx="161597" cy="228600"/>
+            </a:xfrm>
+            <a:solidFill>
+              <a:srgbClr val="00B050"/>
+            </a:solidFill>
+          </p:grpSpPr>
+          <p:pic>
+            <p:nvPicPr>
+              <p:cNvPr id="59" name="Picture 4"/>
+              <p:cNvPicPr>
+                <a:picLocks noChangeAspect="1" noChangeArrowheads="1"/>
+              </p:cNvPicPr>
+              <p:nvPr/>
+            </p:nvPicPr>
+            <p:blipFill>
+              <a:blip r:embed="rId3" cstate="print"/>
+              <a:srcRect/>
+              <a:stretch>
+                <a:fillRect/>
+              </a:stretch>
+            </p:blipFill>
+            <p:spPr bwMode="auto">
+              <a:xfrm>
+                <a:off x="1066800" y="3657600"/>
+                <a:ext cx="85397" cy="123825"/>
+              </a:xfrm>
+              <a:prstGeom prst="rect">
+                <a:avLst/>
+              </a:prstGeom>
+              <a:grpFill/>
+              <a:ln w="9525">
+                <a:noFill/>
+                <a:miter lim="800000"/>
+                <a:headEnd/>
+                <a:tailEnd/>
+              </a:ln>
+            </p:spPr>
+          </p:pic>
+          <p:sp>
+            <p:nvSpPr>
+              <p:cNvPr id="60" name="Oval 59"/>
+              <p:cNvSpPr/>
+              <p:nvPr/>
+            </p:nvSpPr>
+            <p:spPr>
+              <a:xfrm>
+                <a:off x="990600" y="3733800"/>
+                <a:ext cx="152400" cy="152400"/>
+              </a:xfrm>
+              <a:prstGeom prst="ellipse">
+                <a:avLst/>
+              </a:prstGeom>
+              <a:grpFill/>
+            </p:spPr>
+            <p:style>
+              <a:lnRef idx="1">
+                <a:schemeClr val="accent3"/>
+              </a:lnRef>
+              <a:fillRef idx="2">
+                <a:schemeClr val="accent3"/>
+              </a:fillRef>
+              <a:effectRef idx="1">
+                <a:schemeClr val="accent3"/>
+              </a:effectRef>
+              <a:fontRef idx="minor">
+                <a:schemeClr val="dk1"/>
+              </a:fontRef>
+            </p:style>
+            <p:txBody>
+              <a:bodyPr anchor="ctr"/>
+              <a:lstStyle/>
+              <a:p>
+                <a:pPr algn="ctr">
+                  <a:defRPr/>
+                </a:pPr>
+                <a:r>
+                  <a:rPr lang="en-US" sz="1050" dirty="0"/>
+                  <a:t>A</a:t>
+                </a:r>
+                <a:endParaRPr lang="nl-BE" sz="1050" dirty="0"/>
+              </a:p>
+            </p:txBody>
+          </p:sp>
+        </p:grpSp>
+        <p:grpSp>
+          <p:nvGrpSpPr>
+            <p:cNvPr id="17" name="Group 98"/>
+            <p:cNvGrpSpPr/>
+            <p:nvPr/>
+          </p:nvGrpSpPr>
+          <p:grpSpPr>
+            <a:xfrm>
+              <a:off x="6247657" y="4427700"/>
+              <a:ext cx="323194" cy="439576"/>
+              <a:chOff x="990600" y="3657600"/>
+              <a:chExt cx="161597" cy="228600"/>
+            </a:xfrm>
+            <a:solidFill>
+              <a:srgbClr val="00B050"/>
+            </a:solidFill>
+          </p:grpSpPr>
+          <p:pic>
+            <p:nvPicPr>
+              <p:cNvPr id="57" name="Picture 4"/>
+              <p:cNvPicPr>
+                <a:picLocks noChangeAspect="1" noChangeArrowheads="1"/>
+              </p:cNvPicPr>
+              <p:nvPr/>
+            </p:nvPicPr>
+            <p:blipFill>
+              <a:blip r:embed="rId3" cstate="print"/>
+              <a:srcRect/>
+              <a:stretch>
+                <a:fillRect/>
+              </a:stretch>
+            </p:blipFill>
+            <p:spPr bwMode="auto">
+              <a:xfrm>
+                <a:off x="1066800" y="3657600"/>
+                <a:ext cx="85397" cy="123825"/>
+              </a:xfrm>
+              <a:prstGeom prst="rect">
+                <a:avLst/>
+              </a:prstGeom>
+              <a:grpFill/>
+              <a:ln w="9525">
+                <a:noFill/>
+                <a:miter lim="800000"/>
+                <a:headEnd/>
+                <a:tailEnd/>
+              </a:ln>
+            </p:spPr>
+          </p:pic>
+          <p:sp>
+            <p:nvSpPr>
+              <p:cNvPr id="58" name="Oval 57"/>
+              <p:cNvSpPr/>
+              <p:nvPr/>
+            </p:nvSpPr>
+            <p:spPr>
+              <a:xfrm>
+                <a:off x="990600" y="3733800"/>
+                <a:ext cx="152400" cy="152400"/>
+              </a:xfrm>
+              <a:prstGeom prst="ellipse">
+                <a:avLst/>
+              </a:prstGeom>
+              <a:grpFill/>
+            </p:spPr>
+            <p:style>
+              <a:lnRef idx="1">
+                <a:schemeClr val="accent3"/>
+              </a:lnRef>
+              <a:fillRef idx="2">
+                <a:schemeClr val="accent3"/>
+              </a:fillRef>
+              <a:effectRef idx="1">
+                <a:schemeClr val="accent3"/>
+              </a:effectRef>
+              <a:fontRef idx="minor">
+                <a:schemeClr val="dk1"/>
+              </a:fontRef>
+            </p:style>
+            <p:txBody>
+              <a:bodyPr anchor="ctr"/>
+              <a:lstStyle/>
+              <a:p>
+                <a:pPr algn="ctr">
+                  <a:defRPr/>
+                </a:pPr>
+                <a:r>
+                  <a:rPr lang="en-US" sz="1050" dirty="0"/>
+                  <a:t>A</a:t>
+                </a:r>
+                <a:endParaRPr lang="nl-BE" sz="1050" dirty="0"/>
+              </a:p>
+            </p:txBody>
+          </p:sp>
+        </p:grpSp>
+        <p:grpSp>
+          <p:nvGrpSpPr>
+            <p:cNvPr id="18" name="Group 101"/>
+            <p:cNvGrpSpPr/>
+            <p:nvPr/>
+          </p:nvGrpSpPr>
+          <p:grpSpPr>
+            <a:xfrm>
+              <a:off x="8305057" y="3970500"/>
+              <a:ext cx="323194" cy="439576"/>
+              <a:chOff x="990600" y="3657600"/>
+              <a:chExt cx="161597" cy="228600"/>
+            </a:xfrm>
+            <a:solidFill>
+              <a:srgbClr val="00B050"/>
+            </a:solidFill>
+          </p:grpSpPr>
+          <p:pic>
+            <p:nvPicPr>
+              <p:cNvPr id="55" name="Picture 4"/>
+              <p:cNvPicPr>
+                <a:picLocks noChangeAspect="1" noChangeArrowheads="1"/>
+              </p:cNvPicPr>
+              <p:nvPr/>
+            </p:nvPicPr>
+            <p:blipFill>
+              <a:blip r:embed="rId3" cstate="print"/>
+              <a:srcRect/>
+              <a:stretch>
+                <a:fillRect/>
+              </a:stretch>
+            </p:blipFill>
+            <p:spPr bwMode="auto">
+              <a:xfrm>
+                <a:off x="1066800" y="3657600"/>
+                <a:ext cx="85397" cy="123825"/>
+              </a:xfrm>
+              <a:prstGeom prst="rect">
+                <a:avLst/>
+              </a:prstGeom>
+              <a:grpFill/>
+              <a:ln w="9525">
+                <a:noFill/>
+                <a:miter lim="800000"/>
+                <a:headEnd/>
+                <a:tailEnd/>
+              </a:ln>
+            </p:spPr>
+          </p:pic>
+          <p:sp>
+            <p:nvSpPr>
+              <p:cNvPr id="56" name="Oval 55"/>
+              <p:cNvSpPr/>
+              <p:nvPr/>
+            </p:nvSpPr>
+            <p:spPr>
+              <a:xfrm>
+                <a:off x="990600" y="3733800"/>
+                <a:ext cx="152400" cy="152400"/>
+              </a:xfrm>
+              <a:prstGeom prst="ellipse">
+                <a:avLst/>
+              </a:prstGeom>
+              <a:grpFill/>
+            </p:spPr>
+            <p:style>
+              <a:lnRef idx="1">
+                <a:schemeClr val="accent3"/>
+              </a:lnRef>
+              <a:fillRef idx="2">
+                <a:schemeClr val="accent3"/>
+              </a:fillRef>
+              <a:effectRef idx="1">
+                <a:schemeClr val="accent3"/>
+              </a:effectRef>
+              <a:fontRef idx="minor">
+                <a:schemeClr val="dk1"/>
+              </a:fontRef>
+            </p:style>
+            <p:txBody>
+              <a:bodyPr anchor="ctr"/>
+              <a:lstStyle/>
+              <a:p>
+                <a:pPr algn="ctr">
+                  <a:defRPr/>
+                </a:pPr>
+                <a:r>
+                  <a:rPr lang="en-US" sz="1050" dirty="0"/>
+                  <a:t>A</a:t>
+                </a:r>
+                <a:endParaRPr lang="nl-BE" sz="1050" dirty="0"/>
+              </a:p>
+            </p:txBody>
+          </p:sp>
+        </p:grpSp>
+        <p:grpSp>
+          <p:nvGrpSpPr>
+            <p:cNvPr id="19" name="Group 104"/>
+            <p:cNvGrpSpPr/>
+            <p:nvPr/>
+          </p:nvGrpSpPr>
+          <p:grpSpPr>
+            <a:xfrm>
+              <a:off x="7009657" y="3970500"/>
+              <a:ext cx="323194" cy="439576"/>
+              <a:chOff x="990600" y="3657600"/>
+              <a:chExt cx="161597" cy="228600"/>
+            </a:xfrm>
+            <a:solidFill>
+              <a:srgbClr val="00B050"/>
+            </a:solidFill>
+          </p:grpSpPr>
+          <p:pic>
+            <p:nvPicPr>
+              <p:cNvPr id="53" name="Picture 4"/>
+              <p:cNvPicPr>
+                <a:picLocks noChangeAspect="1" noChangeArrowheads="1"/>
+              </p:cNvPicPr>
+              <p:nvPr/>
+            </p:nvPicPr>
+            <p:blipFill>
+              <a:blip r:embed="rId3" cstate="print"/>
+              <a:srcRect/>
+              <a:stretch>
+                <a:fillRect/>
+              </a:stretch>
+            </p:blipFill>
+            <p:spPr bwMode="auto">
+              <a:xfrm>
+                <a:off x="1066800" y="3657600"/>
+                <a:ext cx="85397" cy="123825"/>
+              </a:xfrm>
+              <a:prstGeom prst="rect">
+                <a:avLst/>
+              </a:prstGeom>
+              <a:grpFill/>
+              <a:ln w="9525">
+                <a:noFill/>
+                <a:miter lim="800000"/>
+                <a:headEnd/>
+                <a:tailEnd/>
+              </a:ln>
+            </p:spPr>
+          </p:pic>
+          <p:sp>
+            <p:nvSpPr>
+              <p:cNvPr id="54" name="Oval 53"/>
+              <p:cNvSpPr/>
+              <p:nvPr/>
+            </p:nvSpPr>
+            <p:spPr>
+              <a:xfrm>
+                <a:off x="990600" y="3733800"/>
+                <a:ext cx="152400" cy="152400"/>
+              </a:xfrm>
+              <a:prstGeom prst="ellipse">
+                <a:avLst/>
+              </a:prstGeom>
+              <a:grpFill/>
+            </p:spPr>
+            <p:style>
+              <a:lnRef idx="1">
+                <a:schemeClr val="accent3"/>
+              </a:lnRef>
+              <a:fillRef idx="2">
+                <a:schemeClr val="accent3"/>
+              </a:fillRef>
+              <a:effectRef idx="1">
+                <a:schemeClr val="accent3"/>
+              </a:effectRef>
+              <a:fontRef idx="minor">
+                <a:schemeClr val="dk1"/>
+              </a:fontRef>
+            </p:style>
+            <p:txBody>
+              <a:bodyPr anchor="ctr"/>
+              <a:lstStyle/>
+              <a:p>
+                <a:pPr algn="ctr">
+                  <a:defRPr/>
+                </a:pPr>
+                <a:r>
+                  <a:rPr lang="en-US" sz="1050" dirty="0"/>
+                  <a:t>A</a:t>
+                </a:r>
+                <a:endParaRPr lang="nl-BE" sz="1050" dirty="0"/>
+              </a:p>
+            </p:txBody>
+          </p:sp>
+        </p:grpSp>
+        <p:grpSp>
+          <p:nvGrpSpPr>
+            <p:cNvPr id="20" name="Group 107"/>
+            <p:cNvGrpSpPr/>
+            <p:nvPr/>
+          </p:nvGrpSpPr>
+          <p:grpSpPr>
+            <a:xfrm>
+              <a:off x="7009657" y="3208500"/>
+              <a:ext cx="323194" cy="439576"/>
+              <a:chOff x="990600" y="3657600"/>
+              <a:chExt cx="161597" cy="228600"/>
+            </a:xfrm>
+            <a:solidFill>
+              <a:srgbClr val="00B050"/>
+            </a:solidFill>
+          </p:grpSpPr>
+          <p:pic>
+            <p:nvPicPr>
+              <p:cNvPr id="51" name="Picture 4"/>
+              <p:cNvPicPr>
+                <a:picLocks noChangeAspect="1" noChangeArrowheads="1"/>
+              </p:cNvPicPr>
+              <p:nvPr/>
+            </p:nvPicPr>
+            <p:blipFill>
+              <a:blip r:embed="rId3" cstate="print"/>
+              <a:srcRect/>
+              <a:stretch>
+                <a:fillRect/>
+              </a:stretch>
+            </p:blipFill>
+            <p:spPr bwMode="auto">
+              <a:xfrm>
+                <a:off x="1066800" y="3657600"/>
+                <a:ext cx="85397" cy="123825"/>
+              </a:xfrm>
+              <a:prstGeom prst="rect">
+                <a:avLst/>
+              </a:prstGeom>
+              <a:grpFill/>
+              <a:ln w="9525">
+                <a:noFill/>
+                <a:miter lim="800000"/>
+                <a:headEnd/>
+                <a:tailEnd/>
+              </a:ln>
+            </p:spPr>
+          </p:pic>
+          <p:sp>
+            <p:nvSpPr>
+              <p:cNvPr id="52" name="Oval 51"/>
+              <p:cNvSpPr/>
+              <p:nvPr/>
+            </p:nvSpPr>
+            <p:spPr>
+              <a:xfrm>
+                <a:off x="990600" y="3733800"/>
+                <a:ext cx="152400" cy="152400"/>
+              </a:xfrm>
+              <a:prstGeom prst="ellipse">
+                <a:avLst/>
+              </a:prstGeom>
+              <a:grpFill/>
+            </p:spPr>
+            <p:style>
+              <a:lnRef idx="1">
+                <a:schemeClr val="accent3"/>
+              </a:lnRef>
+              <a:fillRef idx="2">
+                <a:schemeClr val="accent3"/>
+              </a:fillRef>
+              <a:effectRef idx="1">
+                <a:schemeClr val="accent3"/>
+              </a:effectRef>
+              <a:fontRef idx="minor">
+                <a:schemeClr val="dk1"/>
+              </a:fontRef>
+            </p:style>
+            <p:txBody>
+              <a:bodyPr anchor="ctr"/>
+              <a:lstStyle/>
+              <a:p>
+                <a:pPr algn="ctr">
+                  <a:defRPr/>
+                </a:pPr>
+                <a:r>
+                  <a:rPr lang="en-US" sz="1050" dirty="0"/>
+                  <a:t>A</a:t>
+                </a:r>
+                <a:endParaRPr lang="nl-BE" sz="1050" dirty="0"/>
+              </a:p>
+            </p:txBody>
+          </p:sp>
+        </p:grpSp>
+        <p:grpSp>
+          <p:nvGrpSpPr>
+            <p:cNvPr id="21" name="Group 110"/>
+            <p:cNvGrpSpPr>
+              <a:grpSpLocks/>
+            </p:cNvGrpSpPr>
+            <p:nvPr/>
+          </p:nvGrpSpPr>
+          <p:grpSpPr bwMode="auto">
+            <a:xfrm>
+              <a:off x="1608653" y="4454072"/>
+              <a:ext cx="304800" cy="384629"/>
+              <a:chOff x="1219200" y="4905375"/>
+              <a:chExt cx="152400" cy="200025"/>
+            </a:xfrm>
+          </p:grpSpPr>
+          <p:pic>
+            <p:nvPicPr>
+              <p:cNvPr id="49" name="Picture 4"/>
+              <p:cNvPicPr>
+                <a:picLocks noChangeAspect="1" noChangeArrowheads="1"/>
+              </p:cNvPicPr>
+              <p:nvPr/>
+            </p:nvPicPr>
+            <p:blipFill>
+              <a:blip r:embed="rId3" cstate="print"/>
+              <a:srcRect/>
+              <a:stretch>
+                <a:fillRect/>
+              </a:stretch>
+            </p:blipFill>
+            <p:spPr bwMode="auto">
+              <a:xfrm>
+                <a:off x="1286203" y="4905375"/>
+                <a:ext cx="85397" cy="123825"/>
+              </a:xfrm>
+              <a:prstGeom prst="rect">
+                <a:avLst/>
+              </a:prstGeom>
+              <a:noFill/>
+              <a:ln w="9525">
+                <a:noFill/>
+                <a:miter lim="800000"/>
+                <a:headEnd/>
+                <a:tailEnd/>
+              </a:ln>
+            </p:spPr>
+          </p:pic>
+          <p:sp>
+            <p:nvSpPr>
+              <p:cNvPr id="50" name="Isosceles Triangle 49"/>
+              <p:cNvSpPr/>
+              <p:nvPr/>
+            </p:nvSpPr>
+            <p:spPr>
+              <a:xfrm>
+                <a:off x="1219177" y="4953378"/>
+                <a:ext cx="152394" cy="151935"/>
+              </a:xfrm>
+              <a:prstGeom prst="triangle">
+                <a:avLst/>
+              </a:prstGeom>
+            </p:spPr>
+            <p:style>
+              <a:lnRef idx="1">
+                <a:schemeClr val="accent2"/>
+              </a:lnRef>
+              <a:fillRef idx="2">
+                <a:schemeClr val="accent2"/>
+              </a:fillRef>
+              <a:effectRef idx="1">
+                <a:schemeClr val="accent2"/>
+              </a:effectRef>
+              <a:fontRef idx="minor">
+                <a:schemeClr val="dk1"/>
+              </a:fontRef>
+            </p:style>
+            <p:txBody>
+              <a:bodyPr anchor="ctr"/>
+              <a:lstStyle/>
+              <a:p>
+                <a:pPr algn="ctr">
+                  <a:defRPr/>
+                </a:pPr>
+                <a:r>
+                  <a:rPr lang="en-US" sz="1050" dirty="0"/>
+                  <a:t>B</a:t>
+                </a:r>
+                <a:endParaRPr lang="nl-BE" sz="1050" dirty="0"/>
+              </a:p>
+            </p:txBody>
+          </p:sp>
+        </p:grpSp>
+        <p:grpSp>
+          <p:nvGrpSpPr>
+            <p:cNvPr id="22" name="Group 113"/>
+            <p:cNvGrpSpPr>
+              <a:grpSpLocks/>
+            </p:cNvGrpSpPr>
+            <p:nvPr/>
+          </p:nvGrpSpPr>
+          <p:grpSpPr bwMode="auto">
+            <a:xfrm>
+              <a:off x="694253" y="4149272"/>
+              <a:ext cx="304800" cy="384629"/>
+              <a:chOff x="1219200" y="4905375"/>
+              <a:chExt cx="152400" cy="200025"/>
+            </a:xfrm>
+          </p:grpSpPr>
+          <p:pic>
+            <p:nvPicPr>
+              <p:cNvPr id="47" name="Picture 4"/>
+              <p:cNvPicPr>
+                <a:picLocks noChangeAspect="1" noChangeArrowheads="1"/>
+              </p:cNvPicPr>
+              <p:nvPr/>
+            </p:nvPicPr>
+            <p:blipFill>
+              <a:blip r:embed="rId3" cstate="print"/>
+              <a:srcRect/>
+              <a:stretch>
+                <a:fillRect/>
+              </a:stretch>
+            </p:blipFill>
+            <p:spPr bwMode="auto">
+              <a:xfrm>
+                <a:off x="1286203" y="4905375"/>
+                <a:ext cx="85397" cy="123825"/>
+              </a:xfrm>
+              <a:prstGeom prst="rect">
+                <a:avLst/>
+              </a:prstGeom>
+              <a:noFill/>
+              <a:ln w="9525">
+                <a:noFill/>
+                <a:miter lim="800000"/>
+                <a:headEnd/>
+                <a:tailEnd/>
+              </a:ln>
+            </p:spPr>
+          </p:pic>
+          <p:sp>
+            <p:nvSpPr>
+              <p:cNvPr id="48" name="Isosceles Triangle 47"/>
+              <p:cNvSpPr/>
+              <p:nvPr/>
+            </p:nvSpPr>
+            <p:spPr>
+              <a:xfrm>
+                <a:off x="1219195" y="4953348"/>
+                <a:ext cx="152394" cy="151935"/>
+              </a:xfrm>
+              <a:prstGeom prst="triangle">
+                <a:avLst/>
+              </a:prstGeom>
+            </p:spPr>
+            <p:style>
+              <a:lnRef idx="1">
+                <a:schemeClr val="accent2"/>
+              </a:lnRef>
+              <a:fillRef idx="2">
+                <a:schemeClr val="accent2"/>
+              </a:fillRef>
+              <a:effectRef idx="1">
+                <a:schemeClr val="accent2"/>
+              </a:effectRef>
+              <a:fontRef idx="minor">
+                <a:schemeClr val="dk1"/>
+              </a:fontRef>
+            </p:style>
+            <p:txBody>
+              <a:bodyPr anchor="ctr"/>
+              <a:lstStyle/>
+              <a:p>
+                <a:pPr algn="ctr">
+                  <a:defRPr/>
+                </a:pPr>
+                <a:r>
+                  <a:rPr lang="en-US" sz="1050" dirty="0"/>
+                  <a:t>B</a:t>
+                </a:r>
+                <a:endParaRPr lang="nl-BE" sz="1050" dirty="0"/>
+              </a:p>
+            </p:txBody>
+          </p:sp>
+        </p:grpSp>
+        <p:grpSp>
+          <p:nvGrpSpPr>
+            <p:cNvPr id="23" name="Group 116"/>
+            <p:cNvGrpSpPr>
+              <a:grpSpLocks/>
+            </p:cNvGrpSpPr>
+            <p:nvPr/>
+          </p:nvGrpSpPr>
+          <p:grpSpPr bwMode="auto">
+            <a:xfrm>
+              <a:off x="2218253" y="3492047"/>
+              <a:ext cx="304800" cy="384629"/>
+              <a:chOff x="1219200" y="4905375"/>
+              <a:chExt cx="152400" cy="200025"/>
+            </a:xfrm>
+          </p:grpSpPr>
+          <p:pic>
+            <p:nvPicPr>
+              <p:cNvPr id="45" name="Picture 4"/>
+              <p:cNvPicPr>
+                <a:picLocks noChangeAspect="1" noChangeArrowheads="1"/>
+              </p:cNvPicPr>
+              <p:nvPr/>
+            </p:nvPicPr>
+            <p:blipFill>
+              <a:blip r:embed="rId3" cstate="print"/>
+              <a:srcRect/>
+              <a:stretch>
+                <a:fillRect/>
+              </a:stretch>
+            </p:blipFill>
+            <p:spPr bwMode="auto">
+              <a:xfrm>
+                <a:off x="1286203" y="4905375"/>
+                <a:ext cx="85397" cy="123825"/>
+              </a:xfrm>
+              <a:prstGeom prst="rect">
+                <a:avLst/>
+              </a:prstGeom>
+              <a:noFill/>
+              <a:ln w="9525">
+                <a:noFill/>
+                <a:miter lim="800000"/>
+                <a:headEnd/>
+                <a:tailEnd/>
+              </a:ln>
+            </p:spPr>
+          </p:pic>
+          <p:sp>
+            <p:nvSpPr>
+              <p:cNvPr id="46" name="Isosceles Triangle 45"/>
+              <p:cNvSpPr/>
+              <p:nvPr/>
+            </p:nvSpPr>
+            <p:spPr>
+              <a:xfrm>
+                <a:off x="1219164" y="4953282"/>
+                <a:ext cx="152394" cy="151935"/>
+              </a:xfrm>
+              <a:prstGeom prst="triangle">
+                <a:avLst/>
+              </a:prstGeom>
+            </p:spPr>
+            <p:style>
+              <a:lnRef idx="1">
+                <a:schemeClr val="accent2"/>
+              </a:lnRef>
+              <a:fillRef idx="2">
+                <a:schemeClr val="accent2"/>
+              </a:fillRef>
+              <a:effectRef idx="1">
+                <a:schemeClr val="accent2"/>
+              </a:effectRef>
+              <a:fontRef idx="minor">
+                <a:schemeClr val="dk1"/>
+              </a:fontRef>
+            </p:style>
+            <p:txBody>
+              <a:bodyPr anchor="ctr"/>
+              <a:lstStyle/>
+              <a:p>
+                <a:pPr algn="ctr">
+                  <a:defRPr/>
+                </a:pPr>
+                <a:r>
+                  <a:rPr lang="en-US" sz="1050" dirty="0"/>
+                  <a:t>B</a:t>
+                </a:r>
+                <a:endParaRPr lang="nl-BE" sz="1050" dirty="0"/>
+              </a:p>
+            </p:txBody>
+          </p:sp>
+        </p:grpSp>
+        <p:grpSp>
+          <p:nvGrpSpPr>
+            <p:cNvPr id="24" name="Group 119"/>
+            <p:cNvGrpSpPr>
+              <a:grpSpLocks/>
+            </p:cNvGrpSpPr>
+            <p:nvPr/>
+          </p:nvGrpSpPr>
+          <p:grpSpPr bwMode="auto">
+            <a:xfrm>
+              <a:off x="3056453" y="3996872"/>
+              <a:ext cx="304800" cy="384629"/>
+              <a:chOff x="1219200" y="4905375"/>
+              <a:chExt cx="152400" cy="200025"/>
+            </a:xfrm>
+          </p:grpSpPr>
+          <p:pic>
+            <p:nvPicPr>
+              <p:cNvPr id="43" name="Picture 4"/>
+              <p:cNvPicPr>
+                <a:picLocks noChangeAspect="1" noChangeArrowheads="1"/>
+              </p:cNvPicPr>
+              <p:nvPr/>
+            </p:nvPicPr>
+            <p:blipFill>
+              <a:blip r:embed="rId3" cstate="print"/>
+              <a:srcRect/>
+              <a:stretch>
+                <a:fillRect/>
+              </a:stretch>
+            </p:blipFill>
+            <p:spPr bwMode="auto">
+              <a:xfrm>
+                <a:off x="1286203" y="4905375"/>
+                <a:ext cx="85397" cy="123825"/>
+              </a:xfrm>
+              <a:prstGeom prst="rect">
+                <a:avLst/>
+              </a:prstGeom>
+              <a:noFill/>
+              <a:ln w="9525">
+                <a:noFill/>
+                <a:miter lim="800000"/>
+                <a:headEnd/>
+                <a:tailEnd/>
+              </a:ln>
+            </p:spPr>
+          </p:pic>
+          <p:sp>
+            <p:nvSpPr>
+              <p:cNvPr id="44" name="Isosceles Triangle 43"/>
+              <p:cNvSpPr/>
+              <p:nvPr/>
+            </p:nvSpPr>
+            <p:spPr>
+              <a:xfrm>
+                <a:off x="1219148" y="4953333"/>
+                <a:ext cx="152394" cy="151935"/>
+              </a:xfrm>
+              <a:prstGeom prst="triangle">
+                <a:avLst/>
+              </a:prstGeom>
+            </p:spPr>
+            <p:style>
+              <a:lnRef idx="1">
+                <a:schemeClr val="accent2"/>
+              </a:lnRef>
+              <a:fillRef idx="2">
+                <a:schemeClr val="accent2"/>
+              </a:fillRef>
+              <a:effectRef idx="1">
+                <a:schemeClr val="accent2"/>
+              </a:effectRef>
+              <a:fontRef idx="minor">
+                <a:schemeClr val="dk1"/>
+              </a:fontRef>
+            </p:style>
+            <p:txBody>
+              <a:bodyPr anchor="ctr"/>
+              <a:lstStyle/>
+              <a:p>
+                <a:pPr algn="ctr">
+                  <a:defRPr/>
+                </a:pPr>
+                <a:r>
+                  <a:rPr lang="en-US" sz="1050" dirty="0"/>
+                  <a:t>B</a:t>
+                </a:r>
+                <a:endParaRPr lang="nl-BE" sz="1050" dirty="0"/>
+              </a:p>
+            </p:txBody>
+          </p:sp>
+        </p:grpSp>
+        <p:grpSp>
+          <p:nvGrpSpPr>
+            <p:cNvPr id="25" name="Group 122"/>
+            <p:cNvGrpSpPr>
+              <a:grpSpLocks/>
+            </p:cNvGrpSpPr>
+            <p:nvPr/>
+          </p:nvGrpSpPr>
+          <p:grpSpPr bwMode="auto">
+            <a:xfrm>
+              <a:off x="3437453" y="3311072"/>
+              <a:ext cx="304800" cy="384629"/>
+              <a:chOff x="1219200" y="4905375"/>
+              <a:chExt cx="152400" cy="200025"/>
+            </a:xfrm>
+          </p:grpSpPr>
+          <p:pic>
+            <p:nvPicPr>
+              <p:cNvPr id="41" name="Picture 4"/>
+              <p:cNvPicPr>
+                <a:picLocks noChangeAspect="1" noChangeArrowheads="1"/>
+              </p:cNvPicPr>
+              <p:nvPr/>
+            </p:nvPicPr>
+            <p:blipFill>
+              <a:blip r:embed="rId3" cstate="print"/>
+              <a:srcRect/>
+              <a:stretch>
+                <a:fillRect/>
+              </a:stretch>
+            </p:blipFill>
+            <p:spPr bwMode="auto">
+              <a:xfrm>
+                <a:off x="1286203" y="4905375"/>
+                <a:ext cx="85397" cy="123825"/>
+              </a:xfrm>
+              <a:prstGeom prst="rect">
+                <a:avLst/>
+              </a:prstGeom>
+              <a:noFill/>
+              <a:ln w="9525">
+                <a:noFill/>
+                <a:miter lim="800000"/>
+                <a:headEnd/>
+                <a:tailEnd/>
+              </a:ln>
+            </p:spPr>
+          </p:pic>
+          <p:sp>
+            <p:nvSpPr>
+              <p:cNvPr id="42" name="Isosceles Triangle 41"/>
+              <p:cNvSpPr/>
+              <p:nvPr/>
+            </p:nvSpPr>
+            <p:spPr>
+              <a:xfrm>
+                <a:off x="1219140" y="4953264"/>
+                <a:ext cx="152394" cy="151935"/>
+              </a:xfrm>
+              <a:prstGeom prst="triangle">
+                <a:avLst/>
+              </a:prstGeom>
+            </p:spPr>
+            <p:style>
+              <a:lnRef idx="1">
+                <a:schemeClr val="accent2"/>
+              </a:lnRef>
+              <a:fillRef idx="2">
+                <a:schemeClr val="accent2"/>
+              </a:fillRef>
+              <a:effectRef idx="1">
+                <a:schemeClr val="accent2"/>
+              </a:effectRef>
+              <a:fontRef idx="minor">
+                <a:schemeClr val="dk1"/>
+              </a:fontRef>
+            </p:style>
+            <p:txBody>
+              <a:bodyPr anchor="ctr"/>
+              <a:lstStyle/>
+              <a:p>
+                <a:pPr algn="ctr">
+                  <a:defRPr/>
+                </a:pPr>
+                <a:r>
+                  <a:rPr lang="en-US" sz="1050" dirty="0"/>
+                  <a:t>B</a:t>
+                </a:r>
+                <a:endParaRPr lang="nl-BE" sz="1050" dirty="0"/>
+              </a:p>
+            </p:txBody>
+          </p:sp>
+        </p:grpSp>
+        <p:grpSp>
+          <p:nvGrpSpPr>
+            <p:cNvPr id="26" name="Group 125"/>
+            <p:cNvGrpSpPr>
+              <a:grpSpLocks/>
+            </p:cNvGrpSpPr>
+            <p:nvPr/>
+          </p:nvGrpSpPr>
+          <p:grpSpPr bwMode="auto">
+            <a:xfrm>
+              <a:off x="4199453" y="3692072"/>
+              <a:ext cx="304800" cy="384629"/>
+              <a:chOff x="1219200" y="4905375"/>
+              <a:chExt cx="152400" cy="200025"/>
+            </a:xfrm>
+          </p:grpSpPr>
+          <p:pic>
+            <p:nvPicPr>
+              <p:cNvPr id="39" name="Picture 4"/>
+              <p:cNvPicPr>
+                <a:picLocks noChangeAspect="1" noChangeArrowheads="1"/>
+              </p:cNvPicPr>
+              <p:nvPr/>
+            </p:nvPicPr>
+            <p:blipFill>
+              <a:blip r:embed="rId3" cstate="print"/>
+              <a:srcRect/>
+              <a:stretch>
+                <a:fillRect/>
+              </a:stretch>
+            </p:blipFill>
+            <p:spPr bwMode="auto">
+              <a:xfrm>
+                <a:off x="1286203" y="4905375"/>
+                <a:ext cx="85397" cy="123825"/>
+              </a:xfrm>
+              <a:prstGeom prst="rect">
+                <a:avLst/>
+              </a:prstGeom>
+              <a:noFill/>
+              <a:ln w="9525">
+                <a:noFill/>
+                <a:miter lim="800000"/>
+                <a:headEnd/>
+                <a:tailEnd/>
+              </a:ln>
+            </p:spPr>
+          </p:pic>
+          <p:sp>
+            <p:nvSpPr>
+              <p:cNvPr id="40" name="Isosceles Triangle 39"/>
+              <p:cNvSpPr/>
+              <p:nvPr/>
+            </p:nvSpPr>
+            <p:spPr>
+              <a:xfrm>
+                <a:off x="1219125" y="4953302"/>
+                <a:ext cx="152394" cy="151935"/>
+              </a:xfrm>
+              <a:prstGeom prst="triangle">
+                <a:avLst/>
+              </a:prstGeom>
+            </p:spPr>
+            <p:style>
+              <a:lnRef idx="1">
+                <a:schemeClr val="accent2"/>
+              </a:lnRef>
+              <a:fillRef idx="2">
+                <a:schemeClr val="accent2"/>
+              </a:fillRef>
+              <a:effectRef idx="1">
+                <a:schemeClr val="accent2"/>
+              </a:effectRef>
+              <a:fontRef idx="minor">
+                <a:schemeClr val="dk1"/>
+              </a:fontRef>
+            </p:style>
+            <p:txBody>
+              <a:bodyPr anchor="ctr"/>
+              <a:lstStyle/>
+              <a:p>
+                <a:pPr algn="ctr">
+                  <a:defRPr/>
+                </a:pPr>
+                <a:r>
+                  <a:rPr lang="en-US" sz="1050" dirty="0"/>
+                  <a:t>B</a:t>
+                </a:r>
+                <a:endParaRPr lang="nl-BE" sz="1050" dirty="0"/>
+              </a:p>
+            </p:txBody>
+          </p:sp>
+        </p:grpSp>
+        <p:grpSp>
+          <p:nvGrpSpPr>
+            <p:cNvPr id="27" name="Group 128"/>
+            <p:cNvGrpSpPr>
+              <a:grpSpLocks/>
+            </p:cNvGrpSpPr>
+            <p:nvPr/>
+          </p:nvGrpSpPr>
+          <p:grpSpPr bwMode="auto">
+            <a:xfrm>
+              <a:off x="6256853" y="3234872"/>
+              <a:ext cx="304800" cy="384629"/>
+              <a:chOff x="1219200" y="4905375"/>
+              <a:chExt cx="152400" cy="200025"/>
+            </a:xfrm>
+          </p:grpSpPr>
+          <p:pic>
+            <p:nvPicPr>
+              <p:cNvPr id="37" name="Picture 4"/>
+              <p:cNvPicPr>
+                <a:picLocks noChangeAspect="1" noChangeArrowheads="1"/>
+              </p:cNvPicPr>
+              <p:nvPr/>
+            </p:nvPicPr>
+            <p:blipFill>
+              <a:blip r:embed="rId3" cstate="print"/>
+              <a:srcRect/>
+              <a:stretch>
+                <a:fillRect/>
+              </a:stretch>
+            </p:blipFill>
+            <p:spPr bwMode="auto">
+              <a:xfrm>
+                <a:off x="1286203" y="4905375"/>
+                <a:ext cx="85397" cy="123825"/>
+              </a:xfrm>
+              <a:prstGeom prst="rect">
+                <a:avLst/>
+              </a:prstGeom>
+              <a:noFill/>
+              <a:ln w="9525">
+                <a:noFill/>
+                <a:miter lim="800000"/>
+                <a:headEnd/>
+                <a:tailEnd/>
+              </a:ln>
+            </p:spPr>
+          </p:pic>
+          <p:sp>
+            <p:nvSpPr>
+              <p:cNvPr id="38" name="Isosceles Triangle 37"/>
+              <p:cNvSpPr/>
+              <p:nvPr/>
+            </p:nvSpPr>
+            <p:spPr>
+              <a:xfrm>
+                <a:off x="1219083" y="4953257"/>
+                <a:ext cx="152394" cy="151935"/>
+              </a:xfrm>
+              <a:prstGeom prst="triangle">
+                <a:avLst/>
+              </a:prstGeom>
+            </p:spPr>
+            <p:style>
+              <a:lnRef idx="1">
+                <a:schemeClr val="accent2"/>
+              </a:lnRef>
+              <a:fillRef idx="2">
+                <a:schemeClr val="accent2"/>
+              </a:fillRef>
+              <a:effectRef idx="1">
+                <a:schemeClr val="accent2"/>
+              </a:effectRef>
+              <a:fontRef idx="minor">
+                <a:schemeClr val="dk1"/>
+              </a:fontRef>
+            </p:style>
+            <p:txBody>
+              <a:bodyPr anchor="ctr"/>
+              <a:lstStyle/>
+              <a:p>
+                <a:pPr algn="ctr">
+                  <a:defRPr/>
+                </a:pPr>
+                <a:r>
+                  <a:rPr lang="en-US" sz="1050" dirty="0"/>
+                  <a:t>B</a:t>
+                </a:r>
+                <a:endParaRPr lang="nl-BE" sz="1050" dirty="0"/>
+              </a:p>
+            </p:txBody>
+          </p:sp>
+        </p:grpSp>
+        <p:grpSp>
+          <p:nvGrpSpPr>
+            <p:cNvPr id="28" name="Group 131"/>
+            <p:cNvGrpSpPr>
+              <a:grpSpLocks/>
+            </p:cNvGrpSpPr>
+            <p:nvPr/>
+          </p:nvGrpSpPr>
+          <p:grpSpPr bwMode="auto">
+            <a:xfrm>
+              <a:off x="7552253" y="4454072"/>
+              <a:ext cx="304800" cy="384629"/>
+              <a:chOff x="1219200" y="4905375"/>
+              <a:chExt cx="152400" cy="200025"/>
+            </a:xfrm>
+          </p:grpSpPr>
+          <p:pic>
+            <p:nvPicPr>
+              <p:cNvPr id="35" name="Picture 4"/>
+              <p:cNvPicPr>
+                <a:picLocks noChangeAspect="1" noChangeArrowheads="1"/>
+              </p:cNvPicPr>
+              <p:nvPr/>
+            </p:nvPicPr>
+            <p:blipFill>
+              <a:blip r:embed="rId3" cstate="print"/>
+              <a:srcRect/>
+              <a:stretch>
+                <a:fillRect/>
+              </a:stretch>
+            </p:blipFill>
+            <p:spPr bwMode="auto">
+              <a:xfrm>
+                <a:off x="1286203" y="4905375"/>
+                <a:ext cx="85397" cy="123825"/>
+              </a:xfrm>
+              <a:prstGeom prst="rect">
+                <a:avLst/>
+              </a:prstGeom>
+              <a:noFill/>
+              <a:ln w="9525">
+                <a:noFill/>
+                <a:miter lim="800000"/>
+                <a:headEnd/>
+                <a:tailEnd/>
+              </a:ln>
+            </p:spPr>
+          </p:pic>
+          <p:sp>
+            <p:nvSpPr>
+              <p:cNvPr id="36" name="Isosceles Triangle 35"/>
+              <p:cNvSpPr/>
+              <p:nvPr/>
+            </p:nvSpPr>
+            <p:spPr>
+              <a:xfrm>
+                <a:off x="1219057" y="4953378"/>
+                <a:ext cx="152394" cy="151935"/>
+              </a:xfrm>
+              <a:prstGeom prst="triangle">
+                <a:avLst/>
+              </a:prstGeom>
+            </p:spPr>
+            <p:style>
+              <a:lnRef idx="1">
+                <a:schemeClr val="accent2"/>
+              </a:lnRef>
+              <a:fillRef idx="2">
+                <a:schemeClr val="accent2"/>
+              </a:fillRef>
+              <a:effectRef idx="1">
+                <a:schemeClr val="accent2"/>
+              </a:effectRef>
+              <a:fontRef idx="minor">
+                <a:schemeClr val="dk1"/>
+              </a:fontRef>
+            </p:style>
+            <p:txBody>
+              <a:bodyPr anchor="ctr"/>
+              <a:lstStyle/>
+              <a:p>
+                <a:pPr algn="ctr">
+                  <a:defRPr/>
+                </a:pPr>
+                <a:r>
+                  <a:rPr lang="en-US" sz="1050" dirty="0"/>
+                  <a:t>B</a:t>
+                </a:r>
+                <a:endParaRPr lang="nl-BE" sz="1050" dirty="0"/>
+              </a:p>
+            </p:txBody>
+          </p:sp>
+        </p:grpSp>
+        <p:grpSp>
+          <p:nvGrpSpPr>
+            <p:cNvPr id="29" name="Group 134"/>
+            <p:cNvGrpSpPr>
+              <a:grpSpLocks/>
+            </p:cNvGrpSpPr>
+            <p:nvPr/>
+          </p:nvGrpSpPr>
+          <p:grpSpPr bwMode="auto">
+            <a:xfrm>
+              <a:off x="8314253" y="3234872"/>
+              <a:ext cx="304800" cy="384629"/>
+              <a:chOff x="1219200" y="4905375"/>
+              <a:chExt cx="152400" cy="200025"/>
+            </a:xfrm>
+          </p:grpSpPr>
+          <p:pic>
+            <p:nvPicPr>
+              <p:cNvPr id="33" name="Picture 4"/>
+              <p:cNvPicPr>
+                <a:picLocks noChangeAspect="1" noChangeArrowheads="1"/>
+              </p:cNvPicPr>
+              <p:nvPr/>
+            </p:nvPicPr>
+            <p:blipFill>
+              <a:blip r:embed="rId3" cstate="print"/>
+              <a:srcRect/>
+              <a:stretch>
+                <a:fillRect/>
+              </a:stretch>
+            </p:blipFill>
+            <p:spPr bwMode="auto">
+              <a:xfrm>
+                <a:off x="1286203" y="4905375"/>
+                <a:ext cx="85397" cy="123825"/>
+              </a:xfrm>
+              <a:prstGeom prst="rect">
+                <a:avLst/>
+              </a:prstGeom>
+              <a:noFill/>
+              <a:ln w="9525">
+                <a:noFill/>
+                <a:miter lim="800000"/>
+                <a:headEnd/>
+                <a:tailEnd/>
+              </a:ln>
+            </p:spPr>
+          </p:pic>
+          <p:sp>
+            <p:nvSpPr>
+              <p:cNvPr id="34" name="Isosceles Triangle 33"/>
+              <p:cNvSpPr/>
+              <p:nvPr/>
+            </p:nvSpPr>
+            <p:spPr>
+              <a:xfrm>
+                <a:off x="1219042" y="4953257"/>
+                <a:ext cx="152394" cy="151935"/>
+              </a:xfrm>
+              <a:prstGeom prst="triangle">
+                <a:avLst/>
+              </a:prstGeom>
+            </p:spPr>
+            <p:style>
+              <a:lnRef idx="1">
+                <a:schemeClr val="accent2"/>
+              </a:lnRef>
+              <a:fillRef idx="2">
+                <a:schemeClr val="accent2"/>
+              </a:fillRef>
+              <a:effectRef idx="1">
+                <a:schemeClr val="accent2"/>
+              </a:effectRef>
+              <a:fontRef idx="minor">
+                <a:schemeClr val="dk1"/>
+              </a:fontRef>
+            </p:style>
+            <p:txBody>
+              <a:bodyPr anchor="ctr"/>
+              <a:lstStyle/>
+              <a:p>
+                <a:pPr algn="ctr">
+                  <a:defRPr/>
+                </a:pPr>
+                <a:r>
+                  <a:rPr lang="en-US" sz="1050" dirty="0"/>
+                  <a:t>B</a:t>
+                </a:r>
+                <a:endParaRPr lang="nl-BE" sz="1050" dirty="0"/>
+              </a:p>
+            </p:txBody>
+          </p:sp>
+        </p:grpSp>
+        <p:sp>
+          <p:nvSpPr>
+            <p:cNvPr id="30" name="TextBox 137"/>
+            <p:cNvSpPr txBox="1">
+              <a:spLocks noChangeArrowheads="1"/>
+            </p:cNvSpPr>
+            <p:nvPr/>
+          </p:nvSpPr>
+          <p:spPr bwMode="auto">
+            <a:xfrm>
+              <a:off x="8190845" y="4437875"/>
+              <a:ext cx="735842" cy="307777"/>
+            </a:xfrm>
+            <a:prstGeom prst="rect">
+              <a:avLst/>
+            </a:prstGeom>
+            <a:noFill/>
+            <a:ln w="9525">
+              <a:noFill/>
+              <a:miter lim="800000"/>
+              <a:headEnd/>
+              <a:tailEnd/>
+            </a:ln>
+          </p:spPr>
+          <p:txBody>
+            <a:bodyPr wrap="none">
+              <a:spAutoFit/>
+            </a:bodyPr>
+            <a:lstStyle/>
+            <a:p>
+              <a:r>
+                <a:rPr lang="en-US" sz="1400" b="1" dirty="0"/>
+                <a:t>Sink A</a:t>
+              </a:r>
+              <a:endParaRPr lang="nl-BE" sz="1800" b="1"/>
+            </a:p>
+          </p:txBody>
+        </p:sp>
+        <p:sp>
+          <p:nvSpPr>
+            <p:cNvPr id="31" name="TextBox 138"/>
+            <p:cNvSpPr txBox="1">
+              <a:spLocks noChangeArrowheads="1"/>
+            </p:cNvSpPr>
+            <p:nvPr/>
+          </p:nvSpPr>
+          <p:spPr bwMode="auto">
+            <a:xfrm>
+              <a:off x="471296" y="4562474"/>
+              <a:ext cx="797153" cy="307777"/>
+            </a:xfrm>
+            <a:prstGeom prst="rect">
+              <a:avLst/>
+            </a:prstGeom>
+            <a:noFill/>
+            <a:ln w="9525">
+              <a:noFill/>
+              <a:miter lim="800000"/>
+              <a:headEnd/>
+              <a:tailEnd/>
+            </a:ln>
+          </p:spPr>
+          <p:txBody>
+            <a:bodyPr>
+              <a:spAutoFit/>
+            </a:bodyPr>
+            <a:lstStyle/>
+            <a:p>
+              <a:r>
+                <a:rPr lang="en-US" sz="1400" b="1" dirty="0"/>
+                <a:t>Sink B</a:t>
+              </a:r>
+              <a:endParaRPr lang="nl-BE" sz="1800" b="1"/>
+            </a:p>
+          </p:txBody>
+        </p:sp>
+        <p:sp>
+          <p:nvSpPr>
+            <p:cNvPr id="32" name="Rectangle 31"/>
+            <p:cNvSpPr/>
+            <p:nvPr/>
+          </p:nvSpPr>
+          <p:spPr>
+            <a:xfrm>
+              <a:off x="1075227" y="5019544"/>
+              <a:ext cx="3771749" cy="685932"/>
+            </a:xfrm>
+            <a:prstGeom prst="rect">
+              <a:avLst/>
+            </a:prstGeom>
+            <a:noFill/>
+            <a:ln w="3175">
+              <a:solidFill>
+                <a:schemeClr val="tx1"/>
+              </a:solidFill>
+            </a:ln>
+          </p:spPr>
+          <p:style>
+            <a:lnRef idx="2">
+              <a:schemeClr val="accent1">
+                <a:shade val="50000"/>
+              </a:schemeClr>
+            </a:lnRef>
+            <a:fillRef idx="1">
+              <a:schemeClr val="accent1"/>
+            </a:fillRef>
+            <a:effectRef idx="0">
+              <a:schemeClr val="accent1"/>
+            </a:effectRef>
+            <a:fontRef idx="minor">
+              <a:schemeClr val="lt1"/>
+            </a:fontRef>
+          </p:style>
+          <p:txBody>
+            <a:bodyPr anchor="ctr"/>
+            <a:lstStyle/>
+            <a:p>
+              <a:pPr algn="ctr">
+                <a:defRPr/>
+              </a:pPr>
+              <a:endParaRPr lang="nl-BE"/>
+            </a:p>
+          </p:txBody>
+        </p:sp>
+      </p:grpSp>
+    </p:spTree>
+  </p:cSld>
+  <p:clrMapOvr>
+    <a:masterClrMapping/>
+  </p:clrMapOvr>
+</p:sld>
+</file>
+
+<file path=ppt/slides/slide45.xml><?xml version="1.0" encoding="utf-8"?>
+<p:sld xmlns:a="http://schemas.openxmlformats.org/drawingml/2006/main" xmlns:r="http://schemas.openxmlformats.org/officeDocument/2006/relationships" xmlns:p="http://schemas.openxmlformats.org/presentationml/2006/main">
+  <p:cSld>
+    <p:spTree>
+      <p:nvGrpSpPr>
+        <p:cNvPr id="1" name=""/>
+        <p:cNvGrpSpPr/>
+        <p:nvPr/>
+      </p:nvGrpSpPr>
+      <p:grpSpPr>
+        <a:xfrm>
+          <a:off x="0" y="0"/>
+          <a:ext cx="0" cy="0"/>
+          <a:chOff x="0" y="0"/>
+          <a:chExt cx="0" cy="0"/>
+        </a:xfrm>
+      </p:grpSpPr>
+      <p:sp>
+        <p:nvSpPr>
+          <p:cNvPr id="2" name="Title 1"/>
+          <p:cNvSpPr>
+            <a:spLocks noGrp="1"/>
+          </p:cNvSpPr>
+          <p:nvPr>
+            <p:ph type="title"/>
+          </p:nvPr>
+        </p:nvSpPr>
+        <p:spPr/>
+        <p:txBody>
+          <a:bodyPr>
+            <a:noAutofit/>
+          </a:bodyPr>
+          <a:lstStyle/>
+          <a:p>
+            <a:r>
+              <a:rPr lang="en-US" sz="4800" dirty="0" smtClean="0">
+                <a:cs typeface="Times New Roman" pitchFamily="18" charset="0"/>
+              </a:rPr>
+              <a:t>Implementation – </a:t>
+            </a:r>
+            <a:r>
+              <a:rPr lang="en-US" sz="3200" dirty="0" smtClean="0">
+                <a:cs typeface="Times New Roman" pitchFamily="18" charset="0"/>
+              </a:rPr>
+              <a:t>an even more complex use case</a:t>
+            </a:r>
+            <a:endParaRPr lang="en-US" sz="3200" dirty="0"/>
+          </a:p>
+        </p:txBody>
+      </p:sp>
+      <p:sp>
+        <p:nvSpPr>
+          <p:cNvPr id="3" name="Content Placeholder 2"/>
+          <p:cNvSpPr>
+            <a:spLocks noGrp="1"/>
+          </p:cNvSpPr>
+          <p:nvPr>
+            <p:ph idx="1"/>
+          </p:nvPr>
+        </p:nvSpPr>
+        <p:spPr/>
+        <p:txBody>
+          <a:bodyPr/>
+          <a:lstStyle/>
+          <a:p>
+            <a:r>
+              <a:rPr lang="en-US" dirty="0" smtClean="0"/>
+              <a:t>Exploration phase results:</a:t>
+            </a:r>
+          </a:p>
+          <a:p>
+            <a:endParaRPr lang="en-US" dirty="0"/>
+          </a:p>
+        </p:txBody>
+      </p:sp>
+      <p:pic>
+        <p:nvPicPr>
+          <p:cNvPr id="4" name="Picture 3" descr="Exploration - SOFTMAX.jpg"/>
+          <p:cNvPicPr>
+            <a:picLocks noChangeAspect="1"/>
+          </p:cNvPicPr>
+          <p:nvPr/>
+        </p:nvPicPr>
+        <p:blipFill>
+          <a:blip r:embed="rId2" cstate="print"/>
+          <a:stretch>
+            <a:fillRect/>
+          </a:stretch>
+        </p:blipFill>
+        <p:spPr>
+          <a:xfrm>
+            <a:off x="1981200" y="2362200"/>
+            <a:ext cx="5715666" cy="3676650"/>
+          </a:xfrm>
+          <a:prstGeom prst="rect">
+            <a:avLst/>
+          </a:prstGeom>
+        </p:spPr>
+      </p:pic>
+    </p:spTree>
+  </p:cSld>
+  <p:clrMapOvr>
+    <a:masterClrMapping/>
+  </p:clrMapOvr>
+</p:sld>
+</file>
+
+<file path=ppt/slides/slide46.xml><?xml version="1.0" encoding="utf-8"?>
+<p:sld xmlns:a="http://schemas.openxmlformats.org/drawingml/2006/main" xmlns:r="http://schemas.openxmlformats.org/officeDocument/2006/relationships" xmlns:p="http://schemas.openxmlformats.org/presentationml/2006/main">
+  <p:cSld>
+    <p:spTree>
+      <p:nvGrpSpPr>
+        <p:cNvPr id="1" name=""/>
+        <p:cNvGrpSpPr/>
+        <p:nvPr/>
+      </p:nvGrpSpPr>
+      <p:grpSpPr>
+        <a:xfrm>
+          <a:off x="0" y="0"/>
+          <a:ext cx="0" cy="0"/>
+          <a:chOff x="0" y="0"/>
+          <a:chExt cx="0" cy="0"/>
+        </a:xfrm>
+      </p:grpSpPr>
+      <p:sp>
+        <p:nvSpPr>
+          <p:cNvPr id="2" name="Title 1"/>
+          <p:cNvSpPr>
+            <a:spLocks noGrp="1"/>
+          </p:cNvSpPr>
+          <p:nvPr>
+            <p:ph type="title"/>
+          </p:nvPr>
+        </p:nvSpPr>
+        <p:spPr/>
+        <p:txBody>
+          <a:bodyPr>
+            <a:noAutofit/>
+          </a:bodyPr>
+          <a:lstStyle/>
+          <a:p>
+            <a:r>
+              <a:rPr lang="en-US" sz="4800" dirty="0" smtClean="0">
+                <a:cs typeface="Times New Roman" pitchFamily="18" charset="0"/>
+              </a:rPr>
+              <a:t>Implementation – </a:t>
+            </a:r>
+            <a:r>
+              <a:rPr lang="en-US" sz="3200" dirty="0" smtClean="0">
+                <a:cs typeface="Times New Roman" pitchFamily="18" charset="0"/>
+              </a:rPr>
+              <a:t>an even more complex use case</a:t>
+            </a:r>
+            <a:endParaRPr lang="en-US" sz="3200" dirty="0">
+              <a:latin typeface="+mn-lt"/>
+            </a:endParaRPr>
+          </a:p>
+        </p:txBody>
+      </p:sp>
+      <p:sp>
+        <p:nvSpPr>
+          <p:cNvPr id="3" name="Content Placeholder 2"/>
+          <p:cNvSpPr>
+            <a:spLocks noGrp="1"/>
+          </p:cNvSpPr>
+          <p:nvPr>
+            <p:ph idx="1"/>
+          </p:nvPr>
+        </p:nvSpPr>
+        <p:spPr>
+          <a:xfrm>
+            <a:off x="457200" y="1371600"/>
+            <a:ext cx="8229600" cy="4525963"/>
+          </a:xfrm>
+        </p:spPr>
+        <p:txBody>
+          <a:bodyPr/>
+          <a:lstStyle/>
+          <a:p>
+            <a:r>
+              <a:rPr lang="en-US" sz="2800" dirty="0" smtClean="0">
+                <a:cs typeface="Times New Roman" pitchFamily="18" charset="0"/>
+              </a:rPr>
+              <a:t>Exploration phase results - steady </a:t>
+            </a:r>
+            <a:r>
+              <a:rPr lang="en-US" sz="2800" dirty="0" smtClean="0">
+                <a:cs typeface="Times New Roman" pitchFamily="18" charset="0"/>
+              </a:rPr>
+              <a:t>network conditions:</a:t>
+            </a:r>
+          </a:p>
+          <a:p>
+            <a:endParaRPr lang="en-US" dirty="0">
+              <a:latin typeface="Times New Roman" pitchFamily="18" charset="0"/>
+              <a:cs typeface="Times New Roman" pitchFamily="18" charset="0"/>
+            </a:endParaRPr>
+          </a:p>
+        </p:txBody>
+      </p:sp>
+      <p:sp>
+        <p:nvSpPr>
+          <p:cNvPr id="4" name="Slide Number Placeholder 3"/>
+          <p:cNvSpPr>
+            <a:spLocks noGrp="1"/>
+          </p:cNvSpPr>
+          <p:nvPr>
+            <p:ph type="sldNum" sz="quarter" idx="11"/>
+          </p:nvPr>
+        </p:nvSpPr>
+        <p:spPr/>
+        <p:txBody>
+          <a:bodyPr/>
+          <a:lstStyle/>
+          <a:p>
+            <a:pPr>
+              <a:defRPr/>
+            </a:pPr>
+            <a:fld id="{754A60F7-74A3-481B-8EFE-A8A39D7A3B96}" type="slidenum">
+              <a:rPr lang="en-US" smtClean="0">
+                <a:solidFill>
+                  <a:srgbClr val="000000"/>
+                </a:solidFill>
+              </a:rPr>
+              <a:pPr>
+                <a:defRPr/>
+              </a:pPr>
+              <a:t>46</a:t>
+            </a:fld>
+            <a:endParaRPr lang="en-US">
+              <a:solidFill>
+                <a:srgbClr val="000000"/>
+              </a:solidFill>
+            </a:endParaRPr>
+          </a:p>
+        </p:txBody>
+      </p:sp>
+      <p:pic>
+        <p:nvPicPr>
+          <p:cNvPr id="6" name="Picture 5" descr="Duty.png"/>
+          <p:cNvPicPr>
+            <a:picLocks noChangeAspect="1"/>
+          </p:cNvPicPr>
+          <p:nvPr/>
+        </p:nvPicPr>
+        <p:blipFill>
+          <a:blip r:embed="rId2" cstate="print"/>
+          <a:stretch>
+            <a:fillRect/>
+          </a:stretch>
+        </p:blipFill>
+        <p:spPr>
+          <a:xfrm>
+            <a:off x="381000" y="2534247"/>
+            <a:ext cx="4114800" cy="1725246"/>
+          </a:xfrm>
+          <a:prstGeom prst="rect">
+            <a:avLst/>
+          </a:prstGeom>
+        </p:spPr>
+      </p:pic>
+      <p:pic>
+        <p:nvPicPr>
+          <p:cNvPr id="7" name="Picture 6" descr="Hops.png"/>
+          <p:cNvPicPr>
+            <a:picLocks noChangeAspect="1"/>
+          </p:cNvPicPr>
+          <p:nvPr/>
+        </p:nvPicPr>
+        <p:blipFill>
+          <a:blip r:embed="rId3" cstate="print"/>
+          <a:stretch>
+            <a:fillRect/>
+          </a:stretch>
+        </p:blipFill>
+        <p:spPr>
+          <a:xfrm>
+            <a:off x="4800600" y="2503726"/>
+            <a:ext cx="4059560" cy="1740116"/>
+          </a:xfrm>
+          <a:prstGeom prst="rect">
+            <a:avLst/>
+          </a:prstGeom>
+        </p:spPr>
+      </p:pic>
+      <p:pic>
+        <p:nvPicPr>
+          <p:cNvPr id="8" name="Picture 7" descr="Reliability.png"/>
+          <p:cNvPicPr>
+            <a:picLocks noChangeAspect="1"/>
+          </p:cNvPicPr>
+          <p:nvPr/>
+        </p:nvPicPr>
+        <p:blipFill>
+          <a:blip r:embed="rId4" cstate="print"/>
+          <a:stretch>
+            <a:fillRect/>
+          </a:stretch>
+        </p:blipFill>
+        <p:spPr>
+          <a:xfrm>
+            <a:off x="2438400" y="4495800"/>
+            <a:ext cx="4474840" cy="1918125"/>
+          </a:xfrm>
+          <a:prstGeom prst="rect">
+            <a:avLst/>
+          </a:prstGeom>
+        </p:spPr>
+      </p:pic>
+    </p:spTree>
+  </p:cSld>
+  <p:clrMapOvr>
+    <a:masterClrMapping/>
+  </p:clrMapOvr>
+  <p:timing>
+    <p:tnLst>
+      <p:par>
+        <p:cTn id="1" dur="indefinite" restart="never" nodeType="tmRoot"/>
+      </p:par>
+    </p:tnLst>
+  </p:timing>
+</p:sld>
+</file>
+
+<file path=ppt/slides/slide47.xml><?xml version="1.0" encoding="utf-8"?>
+<p:sld xmlns:a="http://schemas.openxmlformats.org/drawingml/2006/main" xmlns:r="http://schemas.openxmlformats.org/officeDocument/2006/relationships" xmlns:p="http://schemas.openxmlformats.org/presentationml/2006/main">
+  <p:cSld>
+    <p:spTree>
+      <p:nvGrpSpPr>
+        <p:cNvPr id="1" name=""/>
+        <p:cNvGrpSpPr/>
+        <p:nvPr/>
+      </p:nvGrpSpPr>
+      <p:grpSpPr>
+        <a:xfrm>
+          <a:off x="0" y="0"/>
+          <a:ext cx="0" cy="0"/>
+          <a:chOff x="0" y="0"/>
+          <a:chExt cx="0" cy="0"/>
+        </a:xfrm>
+      </p:grpSpPr>
+      <p:sp>
+        <p:nvSpPr>
+          <p:cNvPr id="2" name="Title 1"/>
+          <p:cNvSpPr>
+            <a:spLocks noGrp="1"/>
+          </p:cNvSpPr>
+          <p:nvPr>
+            <p:ph type="title"/>
+          </p:nvPr>
+        </p:nvSpPr>
+        <p:spPr/>
+        <p:txBody>
+          <a:bodyPr>
+            <a:normAutofit fontScale="90000"/>
+          </a:bodyPr>
+          <a:lstStyle/>
+          <a:p>
+            <a:r>
+              <a:rPr lang="en-US" dirty="0" smtClean="0">
+                <a:latin typeface="+mn-lt"/>
+                <a:cs typeface="Times New Roman" pitchFamily="18" charset="0"/>
+              </a:rPr>
+              <a:t>Implementation – </a:t>
+            </a:r>
+            <a:r>
+              <a:rPr lang="en-US" sz="3600" dirty="0" smtClean="0">
+                <a:latin typeface="+mn-lt"/>
+                <a:cs typeface="Times New Roman" pitchFamily="18" charset="0"/>
+              </a:rPr>
+              <a:t>an even more complex use case</a:t>
+            </a:r>
+            <a:endParaRPr lang="en-US" dirty="0">
+              <a:latin typeface="+mn-lt"/>
+            </a:endParaRPr>
+          </a:p>
+        </p:txBody>
+      </p:sp>
+      <p:sp>
+        <p:nvSpPr>
+          <p:cNvPr id="3" name="Content Placeholder 2"/>
+          <p:cNvSpPr>
+            <a:spLocks noGrp="1"/>
+          </p:cNvSpPr>
+          <p:nvPr>
+            <p:ph idx="1"/>
+          </p:nvPr>
+        </p:nvSpPr>
+        <p:spPr/>
+        <p:txBody>
+          <a:bodyPr>
+            <a:normAutofit fontScale="85000" lnSpcReduction="20000"/>
+          </a:bodyPr>
+          <a:lstStyle/>
+          <a:p>
+            <a:r>
+              <a:rPr lang="en-US" dirty="0" smtClean="0">
+                <a:cs typeface="Times New Roman" pitchFamily="18" charset="0"/>
+              </a:rPr>
+              <a:t>Steady network conditions:</a:t>
+            </a:r>
+          </a:p>
+          <a:p>
+            <a:endParaRPr lang="en-US" dirty="0" smtClean="0">
+              <a:latin typeface="Times New Roman" pitchFamily="18" charset="0"/>
+              <a:cs typeface="Times New Roman" pitchFamily="18" charset="0"/>
+            </a:endParaRPr>
+          </a:p>
+          <a:p>
+            <a:endParaRPr lang="en-US" dirty="0" smtClean="0">
+              <a:latin typeface="Times New Roman" pitchFamily="18" charset="0"/>
+              <a:cs typeface="Times New Roman" pitchFamily="18" charset="0"/>
+            </a:endParaRPr>
+          </a:p>
+          <a:p>
+            <a:endParaRPr lang="en-US" dirty="0" smtClean="0">
+              <a:latin typeface="Times New Roman" pitchFamily="18" charset="0"/>
+              <a:cs typeface="Times New Roman" pitchFamily="18" charset="0"/>
+            </a:endParaRPr>
+          </a:p>
+          <a:p>
+            <a:endParaRPr lang="en-US" dirty="0" smtClean="0">
+              <a:latin typeface="Times New Roman" pitchFamily="18" charset="0"/>
+              <a:cs typeface="Times New Roman" pitchFamily="18" charset="0"/>
+            </a:endParaRPr>
+          </a:p>
+          <a:p>
+            <a:endParaRPr lang="en-US" dirty="0" smtClean="0">
+              <a:latin typeface="Times New Roman" pitchFamily="18" charset="0"/>
+              <a:cs typeface="Times New Roman" pitchFamily="18" charset="0"/>
+            </a:endParaRPr>
+          </a:p>
+          <a:p>
+            <a:endParaRPr lang="en-US" dirty="0" smtClean="0">
+              <a:latin typeface="Times New Roman" pitchFamily="18" charset="0"/>
+              <a:cs typeface="Times New Roman" pitchFamily="18" charset="0"/>
+            </a:endParaRPr>
+          </a:p>
+          <a:p>
+            <a:endParaRPr lang="en-US" dirty="0" smtClean="0">
+              <a:latin typeface="Times New Roman" pitchFamily="18" charset="0"/>
+              <a:cs typeface="Times New Roman" pitchFamily="18" charset="0"/>
+            </a:endParaRPr>
+          </a:p>
+          <a:p>
+            <a:r>
+              <a:rPr lang="en-US" sz="2000" b="0" dirty="0" smtClean="0">
+                <a:cs typeface="Times New Roman" pitchFamily="18" charset="0"/>
+              </a:rPr>
+              <a:t>For the temperature factor values &lt; 1, SOFTMAX enforces the optimal service combination for over than 90% of time</a:t>
+            </a:r>
+          </a:p>
+          <a:p>
+            <a:endParaRPr lang="en-US" sz="2000" b="0" dirty="0" smtClean="0">
+              <a:cs typeface="Times New Roman" pitchFamily="18" charset="0"/>
+            </a:endParaRPr>
+          </a:p>
+          <a:p>
+            <a:r>
+              <a:rPr lang="en-US" sz="2000" b="0" dirty="0" smtClean="0">
+                <a:cs typeface="Times New Roman" pitchFamily="18" charset="0"/>
+              </a:rPr>
+              <a:t>For comparison, for values higher than 2.5, the percentage drops below 75%</a:t>
+            </a:r>
+          </a:p>
+          <a:p>
+            <a:endParaRPr lang="en-US" dirty="0" smtClean="0">
+              <a:latin typeface="Times New Roman" pitchFamily="18" charset="0"/>
+              <a:cs typeface="Times New Roman" pitchFamily="18" charset="0"/>
+            </a:endParaRPr>
+          </a:p>
+          <a:p>
+            <a:endParaRPr lang="en-US" dirty="0" smtClean="0">
+              <a:latin typeface="Times New Roman" pitchFamily="18" charset="0"/>
+              <a:cs typeface="Times New Roman" pitchFamily="18" charset="0"/>
+            </a:endParaRPr>
+          </a:p>
+        </p:txBody>
+      </p:sp>
+      <p:sp>
+        <p:nvSpPr>
+          <p:cNvPr id="4" name="Slide Number Placeholder 3"/>
+          <p:cNvSpPr>
+            <a:spLocks noGrp="1"/>
+          </p:cNvSpPr>
+          <p:nvPr>
+            <p:ph type="sldNum" sz="quarter" idx="11"/>
+          </p:nvPr>
+        </p:nvSpPr>
+        <p:spPr/>
+        <p:txBody>
+          <a:bodyPr/>
+          <a:lstStyle/>
+          <a:p>
+            <a:pPr>
+              <a:defRPr/>
+            </a:pPr>
+            <a:fld id="{754A60F7-74A3-481B-8EFE-A8A39D7A3B96}" type="slidenum">
+              <a:rPr lang="en-US" smtClean="0">
+                <a:solidFill>
+                  <a:srgbClr val="000000"/>
+                </a:solidFill>
+              </a:rPr>
+              <a:pPr>
+                <a:defRPr/>
+              </a:pPr>
+              <a:t>47</a:t>
+            </a:fld>
+            <a:endParaRPr lang="en-US">
+              <a:solidFill>
+                <a:srgbClr val="000000"/>
+              </a:solidFill>
+            </a:endParaRPr>
+          </a:p>
+        </p:txBody>
+      </p:sp>
+      <p:pic>
+        <p:nvPicPr>
+          <p:cNvPr id="8" name="Picture 7" descr="PercentageOfTime.jpg"/>
+          <p:cNvPicPr>
+            <a:picLocks noChangeAspect="1"/>
+          </p:cNvPicPr>
+          <p:nvPr/>
+        </p:nvPicPr>
+        <p:blipFill>
+          <a:blip r:embed="rId2" cstate="print"/>
+          <a:stretch>
+            <a:fillRect/>
+          </a:stretch>
+        </p:blipFill>
+        <p:spPr>
+          <a:xfrm>
+            <a:off x="2590800" y="2133600"/>
+            <a:ext cx="4042969" cy="2667000"/>
+          </a:xfrm>
+          <a:prstGeom prst="rect">
+            <a:avLst/>
+          </a:prstGeom>
+        </p:spPr>
+      </p:pic>
+    </p:spTree>
+  </p:cSld>
+  <p:clrMapOvr>
+    <a:masterClrMapping/>
+  </p:clrMapOvr>
+</p:sld>
+</file>
+
+<file path=ppt/slides/slide48.xml><?xml version="1.0" encoding="utf-8"?>
+<p:sld xmlns:a="http://schemas.openxmlformats.org/drawingml/2006/main" xmlns:r="http://schemas.openxmlformats.org/officeDocument/2006/relationships" xmlns:p="http://schemas.openxmlformats.org/presentationml/2006/main">
+  <p:cSld>
+    <p:spTree>
+      <p:nvGrpSpPr>
+        <p:cNvPr id="1" name=""/>
+        <p:cNvGrpSpPr/>
+        <p:nvPr/>
+      </p:nvGrpSpPr>
+      <p:grpSpPr>
+        <a:xfrm>
+          <a:off x="0" y="0"/>
+          <a:ext cx="0" cy="0"/>
+          <a:chOff x="0" y="0"/>
+          <a:chExt cx="0" cy="0"/>
+        </a:xfrm>
+      </p:grpSpPr>
+      <p:sp>
+        <p:nvSpPr>
+          <p:cNvPr id="2" name="Title 1"/>
+          <p:cNvSpPr>
+            <a:spLocks noGrp="1"/>
+          </p:cNvSpPr>
+          <p:nvPr>
+            <p:ph type="title"/>
+          </p:nvPr>
+        </p:nvSpPr>
+        <p:spPr/>
+        <p:txBody>
+          <a:bodyPr>
+            <a:noAutofit/>
+          </a:bodyPr>
+          <a:lstStyle/>
+          <a:p>
+            <a:r>
+              <a:rPr lang="en-US" dirty="0" smtClean="0">
+                <a:cs typeface="Times New Roman" pitchFamily="18" charset="0"/>
+              </a:rPr>
+              <a:t>Implementation – </a:t>
+            </a:r>
+            <a:r>
+              <a:rPr lang="en-US" sz="3200" dirty="0" smtClean="0">
+                <a:cs typeface="Times New Roman" pitchFamily="18" charset="0"/>
+              </a:rPr>
+              <a:t>an even more complex use case</a:t>
+            </a:r>
+            <a:endParaRPr lang="en-US" sz="3200" dirty="0"/>
+          </a:p>
+        </p:txBody>
+      </p:sp>
+      <p:pic>
+        <p:nvPicPr>
+          <p:cNvPr id="4" name="Content Placeholder 3" descr="Before and after cooperation.jpg"/>
+          <p:cNvPicPr>
+            <a:picLocks noGrp="1" noChangeAspect="1"/>
+          </p:cNvPicPr>
+          <p:nvPr>
+            <p:ph idx="1"/>
+          </p:nvPr>
+        </p:nvPicPr>
+        <p:blipFill>
+          <a:blip r:embed="rId2" cstate="print"/>
+          <a:stretch>
+            <a:fillRect/>
+          </a:stretch>
+        </p:blipFill>
+        <p:spPr>
+          <a:xfrm>
+            <a:off x="1676400" y="1676400"/>
+            <a:ext cx="5530318" cy="3768992"/>
+          </a:xfrm>
+        </p:spPr>
+      </p:pic>
+      <p:sp>
+        <p:nvSpPr>
+          <p:cNvPr id="5" name="TextBox 4"/>
+          <p:cNvSpPr txBox="1"/>
+          <p:nvPr/>
+        </p:nvSpPr>
+        <p:spPr>
+          <a:xfrm>
+            <a:off x="533400" y="5715000"/>
+            <a:ext cx="8043869" cy="923330"/>
+          </a:xfrm>
+          <a:prstGeom prst="rect">
+            <a:avLst/>
+          </a:prstGeom>
+          <a:noFill/>
+        </p:spPr>
+        <p:txBody>
+          <a:bodyPr wrap="none" rtlCol="0">
+            <a:spAutoFit/>
+          </a:bodyPr>
+          <a:lstStyle/>
+          <a:p>
+            <a:r>
+              <a:rPr lang="en-US" dirty="0" smtClean="0"/>
+              <a:t>Performances of the (a</a:t>
+            </a:r>
+            <a:r>
+              <a:rPr lang="en-US" dirty="0" smtClean="0"/>
+              <a:t>) Security network and (b) temperature </a:t>
+            </a:r>
+            <a:r>
+              <a:rPr lang="en-US" dirty="0" smtClean="0"/>
+              <a:t>monitoring </a:t>
+            </a:r>
+            <a:r>
+              <a:rPr lang="en-US" dirty="0" smtClean="0"/>
+              <a:t>network, </a:t>
+            </a:r>
+            <a:endParaRPr lang="en-US" dirty="0" smtClean="0"/>
+          </a:p>
+          <a:p>
+            <a:r>
+              <a:rPr lang="en-US" dirty="0" smtClean="0"/>
+              <a:t>in </a:t>
+            </a:r>
+            <a:r>
+              <a:rPr lang="en-US" dirty="0" smtClean="0"/>
+              <a:t>terms of a duty cycle and reliability metrics, in situations with and without</a:t>
+            </a:r>
+          </a:p>
+          <a:p>
+            <a:r>
+              <a:rPr lang="en-US" dirty="0" smtClean="0"/>
+              <a:t>influences </a:t>
+            </a:r>
+            <a:r>
+              <a:rPr lang="en-US" dirty="0" smtClean="0"/>
+              <a:t>of co-located devices. </a:t>
+            </a:r>
+            <a:endParaRPr lang="en-US" dirty="0"/>
+          </a:p>
+        </p:txBody>
+      </p:sp>
+    </p:spTree>
+  </p:cSld>
+  <p:clrMapOvr>
+    <a:masterClrMapping/>
+  </p:clrMapOvr>
 </p:sld>
 </file>
 

</xml_diff>

<commit_message>
Prezentacija za Mobile Day event. Verzija v1.3
</commit_message>
<xml_diff>
--- a/Mobile Day presentation.pptx
+++ b/Mobile Day presentation.pptx
@@ -11,48 +11,51 @@
     <p:sldId id="261" r:id="rId5"/>
     <p:sldId id="262" r:id="rId6"/>
     <p:sldId id="259" r:id="rId7"/>
-    <p:sldId id="269" r:id="rId8"/>
-    <p:sldId id="266" r:id="rId9"/>
-    <p:sldId id="267" r:id="rId10"/>
-    <p:sldId id="268" r:id="rId11"/>
-    <p:sldId id="270" r:id="rId12"/>
+    <p:sldId id="266" r:id="rId8"/>
+    <p:sldId id="267" r:id="rId9"/>
+    <p:sldId id="268" r:id="rId10"/>
+    <p:sldId id="270" r:id="rId11"/>
+    <p:sldId id="260" r:id="rId12"/>
     <p:sldId id="263" r:id="rId13"/>
     <p:sldId id="264" r:id="rId14"/>
     <p:sldId id="265" r:id="rId15"/>
-    <p:sldId id="260" r:id="rId16"/>
-    <p:sldId id="271" r:id="rId17"/>
-    <p:sldId id="275" r:id="rId18"/>
-    <p:sldId id="272" r:id="rId19"/>
-    <p:sldId id="276" r:id="rId20"/>
-    <p:sldId id="273" r:id="rId21"/>
-    <p:sldId id="277" r:id="rId22"/>
-    <p:sldId id="278" r:id="rId23"/>
-    <p:sldId id="280" r:id="rId24"/>
-    <p:sldId id="281" r:id="rId25"/>
-    <p:sldId id="284" r:id="rId26"/>
-    <p:sldId id="283" r:id="rId27"/>
-    <p:sldId id="282" r:id="rId28"/>
-    <p:sldId id="285" r:id="rId29"/>
-    <p:sldId id="287" r:id="rId30"/>
-    <p:sldId id="286" r:id="rId31"/>
-    <p:sldId id="288" r:id="rId32"/>
-    <p:sldId id="289" r:id="rId33"/>
-    <p:sldId id="290" r:id="rId34"/>
-    <p:sldId id="292" r:id="rId35"/>
-    <p:sldId id="293" r:id="rId36"/>
-    <p:sldId id="294" r:id="rId37"/>
-    <p:sldId id="295" r:id="rId38"/>
-    <p:sldId id="296" r:id="rId39"/>
-    <p:sldId id="297" r:id="rId40"/>
-    <p:sldId id="298" r:id="rId41"/>
-    <p:sldId id="299" r:id="rId42"/>
-    <p:sldId id="300" r:id="rId43"/>
-    <p:sldId id="301" r:id="rId44"/>
-    <p:sldId id="304" r:id="rId45"/>
-    <p:sldId id="305" r:id="rId46"/>
-    <p:sldId id="303" r:id="rId47"/>
-    <p:sldId id="302" r:id="rId48"/>
-    <p:sldId id="306" r:id="rId49"/>
+    <p:sldId id="271" r:id="rId16"/>
+    <p:sldId id="275" r:id="rId17"/>
+    <p:sldId id="272" r:id="rId18"/>
+    <p:sldId id="276" r:id="rId19"/>
+    <p:sldId id="273" r:id="rId20"/>
+    <p:sldId id="277" r:id="rId21"/>
+    <p:sldId id="278" r:id="rId22"/>
+    <p:sldId id="280" r:id="rId23"/>
+    <p:sldId id="281" r:id="rId24"/>
+    <p:sldId id="284" r:id="rId25"/>
+    <p:sldId id="283" r:id="rId26"/>
+    <p:sldId id="282" r:id="rId27"/>
+    <p:sldId id="285" r:id="rId28"/>
+    <p:sldId id="287" r:id="rId29"/>
+    <p:sldId id="286" r:id="rId30"/>
+    <p:sldId id="288" r:id="rId31"/>
+    <p:sldId id="289" r:id="rId32"/>
+    <p:sldId id="290" r:id="rId33"/>
+    <p:sldId id="292" r:id="rId34"/>
+    <p:sldId id="293" r:id="rId35"/>
+    <p:sldId id="294" r:id="rId36"/>
+    <p:sldId id="295" r:id="rId37"/>
+    <p:sldId id="296" r:id="rId38"/>
+    <p:sldId id="297" r:id="rId39"/>
+    <p:sldId id="298" r:id="rId40"/>
+    <p:sldId id="299" r:id="rId41"/>
+    <p:sldId id="300" r:id="rId42"/>
+    <p:sldId id="301" r:id="rId43"/>
+    <p:sldId id="304" r:id="rId44"/>
+    <p:sldId id="305" r:id="rId45"/>
+    <p:sldId id="303" r:id="rId46"/>
+    <p:sldId id="302" r:id="rId47"/>
+    <p:sldId id="306" r:id="rId48"/>
+    <p:sldId id="307" r:id="rId49"/>
+    <p:sldId id="308" r:id="rId50"/>
+    <p:sldId id="309" r:id="rId51"/>
+    <p:sldId id="310" r:id="rId52"/>
   </p:sldIdLst>
   <p:sldSz cx="9144000" cy="6858000" type="screen4x3"/>
   <p:notesSz cx="6858000" cy="9144000"/>
@@ -336,7 +339,7 @@
             <a:fld id="{728CDCE0-B3CA-4E31-BE8F-C371E524937F}" type="datetimeFigureOut">
               <a:rPr lang="en-US" smtClean="0"/>
               <a:pPr/>
-              <a:t>6/19/2014</a:t>
+              <a:t>6/21/2014</a:t>
             </a:fld>
             <a:endParaRPr lang="en-US"/>
           </a:p>
@@ -503,7 +506,7 @@
             <a:fld id="{728CDCE0-B3CA-4E31-BE8F-C371E524937F}" type="datetimeFigureOut">
               <a:rPr lang="en-US" smtClean="0"/>
               <a:pPr/>
-              <a:t>6/19/2014</a:t>
+              <a:t>6/21/2014</a:t>
             </a:fld>
             <a:endParaRPr lang="en-US"/>
           </a:p>
@@ -680,7 +683,7 @@
             <a:fld id="{728CDCE0-B3CA-4E31-BE8F-C371E524937F}" type="datetimeFigureOut">
               <a:rPr lang="en-US" smtClean="0"/>
               <a:pPr/>
-              <a:t>6/19/2014</a:t>
+              <a:t>6/21/2014</a:t>
             </a:fld>
             <a:endParaRPr lang="en-US"/>
           </a:p>
@@ -847,7 +850,7 @@
             <a:fld id="{728CDCE0-B3CA-4E31-BE8F-C371E524937F}" type="datetimeFigureOut">
               <a:rPr lang="en-US" smtClean="0"/>
               <a:pPr/>
-              <a:t>6/19/2014</a:t>
+              <a:t>6/21/2014</a:t>
             </a:fld>
             <a:endParaRPr lang="en-US"/>
           </a:p>
@@ -1090,7 +1093,7 @@
             <a:fld id="{728CDCE0-B3CA-4E31-BE8F-C371E524937F}" type="datetimeFigureOut">
               <a:rPr lang="en-US" smtClean="0"/>
               <a:pPr/>
-              <a:t>6/19/2014</a:t>
+              <a:t>6/21/2014</a:t>
             </a:fld>
             <a:endParaRPr lang="en-US"/>
           </a:p>
@@ -1375,7 +1378,7 @@
             <a:fld id="{728CDCE0-B3CA-4E31-BE8F-C371E524937F}" type="datetimeFigureOut">
               <a:rPr lang="en-US" smtClean="0"/>
               <a:pPr/>
-              <a:t>6/19/2014</a:t>
+              <a:t>6/21/2014</a:t>
             </a:fld>
             <a:endParaRPr lang="en-US"/>
           </a:p>
@@ -1794,7 +1797,7 @@
             <a:fld id="{728CDCE0-B3CA-4E31-BE8F-C371E524937F}" type="datetimeFigureOut">
               <a:rPr lang="en-US" smtClean="0"/>
               <a:pPr/>
-              <a:t>6/19/2014</a:t>
+              <a:t>6/21/2014</a:t>
             </a:fld>
             <a:endParaRPr lang="en-US"/>
           </a:p>
@@ -1909,7 +1912,7 @@
             <a:fld id="{728CDCE0-B3CA-4E31-BE8F-C371E524937F}" type="datetimeFigureOut">
               <a:rPr lang="en-US" smtClean="0"/>
               <a:pPr/>
-              <a:t>6/19/2014</a:t>
+              <a:t>6/21/2014</a:t>
             </a:fld>
             <a:endParaRPr lang="en-US"/>
           </a:p>
@@ -2001,7 +2004,7 @@
             <a:fld id="{728CDCE0-B3CA-4E31-BE8F-C371E524937F}" type="datetimeFigureOut">
               <a:rPr lang="en-US" smtClean="0"/>
               <a:pPr/>
-              <a:t>6/19/2014</a:t>
+              <a:t>6/21/2014</a:t>
             </a:fld>
             <a:endParaRPr lang="en-US"/>
           </a:p>
@@ -2275,7 +2278,7 @@
             <a:fld id="{728CDCE0-B3CA-4E31-BE8F-C371E524937F}" type="datetimeFigureOut">
               <a:rPr lang="en-US" smtClean="0"/>
               <a:pPr/>
-              <a:t>6/19/2014</a:t>
+              <a:t>6/21/2014</a:t>
             </a:fld>
             <a:endParaRPr lang="en-US"/>
           </a:p>
@@ -2525,7 +2528,7 @@
             <a:fld id="{728CDCE0-B3CA-4E31-BE8F-C371E524937F}" type="datetimeFigureOut">
               <a:rPr lang="en-US" smtClean="0"/>
               <a:pPr/>
-              <a:t>6/19/2014</a:t>
+              <a:t>6/21/2014</a:t>
             </a:fld>
             <a:endParaRPr lang="en-US"/>
           </a:p>
@@ -2735,7 +2738,7 @@
             <a:fld id="{728CDCE0-B3CA-4E31-BE8F-C371E524937F}" type="datetimeFigureOut">
               <a:rPr lang="en-US" smtClean="0"/>
               <a:pPr/>
-              <a:t>6/19/2014</a:t>
+              <a:t>6/21/2014</a:t>
             </a:fld>
             <a:endParaRPr lang="en-US"/>
           </a:p>
@@ -3156,7 +3159,26 @@
               <a:rPr lang="en-US" dirty="0" err="1" smtClean="0"/>
               <a:t>Rovcanin</a:t>
             </a:r>
-            <a:endParaRPr lang="en-US" dirty="0"/>
+            <a:endParaRPr lang="en-US" dirty="0" smtClean="0"/>
+          </a:p>
+          <a:p>
+            <a:r>
+              <a:rPr lang="en-US" sz="2000" dirty="0" smtClean="0"/>
+              <a:t>IBCN </a:t>
+            </a:r>
+            <a:r>
+              <a:rPr lang="en-US" sz="2000" dirty="0" err="1" smtClean="0"/>
+              <a:t>reasearch</a:t>
+            </a:r>
+            <a:r>
+              <a:rPr lang="en-US" sz="2000" dirty="0" smtClean="0"/>
+              <a:t> group, INTEC, </a:t>
+            </a:r>
+            <a:r>
+              <a:rPr lang="en-US" sz="2000" dirty="0" err="1" smtClean="0"/>
+              <a:t>UGhent</a:t>
+            </a:r>
+            <a:endParaRPr lang="en-US" sz="2000" dirty="0"/>
           </a:p>
         </p:txBody>
       </p:sp>
@@ -3225,37 +3247,29 @@
           </a:bodyPr>
           <a:lstStyle/>
           <a:p>
+            <a:endParaRPr lang="en-US" dirty="0" smtClean="0"/>
+          </a:p>
+          <a:p>
             <a:r>
               <a:rPr lang="en-US" dirty="0" smtClean="0"/>
-              <a:t>Whereas incentives indicate network goals, network services are means to realize these goals</a:t>
-            </a:r>
-          </a:p>
-          <a:p>
+              <a:t>Activating </a:t>
+            </a:r>
             <a:r>
               <a:rPr lang="en-US" dirty="0" smtClean="0"/>
-              <a:t>Network services should be understood as optimization techniques that have influence over one or more incentives</a:t>
-            </a:r>
-          </a:p>
-          <a:p>
-            <a:pPr>
-              <a:buNone/>
-            </a:pPr>
+              <a:t>network services has (positive or negative) influence not only in a network where the service is activated</a:t>
+            </a:r>
             <a:r>
               <a:rPr lang="en-US" dirty="0" smtClean="0"/>
-              <a:t>Examples:</a:t>
-            </a:r>
-          </a:p>
-          <a:p>
-            <a:pPr>
-              <a:buNone/>
-            </a:pPr>
+              <a:t>.</a:t>
+            </a:r>
+          </a:p>
+          <a:p>
+            <a:endParaRPr lang="en-US" dirty="0" smtClean="0"/>
+          </a:p>
+          <a:p>
             <a:r>
               <a:rPr lang="en-US" dirty="0" smtClean="0"/>
-              <a:t>	</a:t>
-            </a:r>
-            <a:r>
-              <a:rPr lang="en-US" sz="2400" dirty="0" smtClean="0"/>
-              <a:t>packet aggregation and sharing, MAC protocols, interference avoidance techniques …</a:t>
+              <a:t>By carefully choosing which service to activate, networks can improve not only their own, but the neighboring network’s performance as well.</a:t>
             </a:r>
             <a:endParaRPr lang="en-US" dirty="0"/>
           </a:p>
@@ -3301,7 +3315,11 @@
           <a:bodyPr/>
           <a:lstStyle/>
           <a:p>
-            <a:endParaRPr lang="en-US"/>
+            <a:r>
+              <a:rPr lang="en-US" dirty="0" smtClean="0"/>
+              <a:t>The major issue</a:t>
+            </a:r>
+            <a:endParaRPr lang="en-US" dirty="0"/>
           </a:p>
         </p:txBody>
       </p:sp>
@@ -3320,16 +3338,25 @@
           <a:bodyPr/>
           <a:lstStyle/>
           <a:p>
+            <a:pPr>
+              <a:buNone/>
+            </a:pPr>
+            <a:endParaRPr lang="en-US" dirty="0" smtClean="0"/>
+          </a:p>
+          <a:p>
+            <a:pPr algn="just">
+              <a:buNone/>
+            </a:pPr>
+            <a:r>
+              <a:rPr lang="en-US" dirty="0"/>
+              <a:t>	</a:t>
+            </a:r>
             <a:r>
               <a:rPr lang="en-US" dirty="0" smtClean="0"/>
-              <a:t>Activating network services has (positive or negative) influence not only in a network where the service is activated.</a:t>
-            </a:r>
-          </a:p>
-          <a:p>
-            <a:r>
-              <a:rPr lang="en-US" dirty="0" smtClean="0"/>
-              <a:t>By carefully choosing which service to activate, networks can improve not only their own, but the neighboring network’s performance as well.</a:t>
-            </a:r>
+              <a:t>How to efficiently determine the optimal configuration parameters for all the participating networks, considering their high level goals and ensuring that the cooperation in mutually beneficial?</a:t>
+            </a:r>
+          </a:p>
+          <a:p>
             <a:endParaRPr lang="en-US" dirty="0"/>
           </a:p>
         </p:txBody>
@@ -3439,7 +3466,7 @@
       </p:pic>
       <p:pic>
         <p:nvPicPr>
-          <p:cNvPr id="7" name="Picture 6" descr="Incentive driven networking  step 2.jpg"/>
+          <p:cNvPr id="8" name="Picture 7" descr="Incentive driven networking  step 1.jpg"/>
           <p:cNvPicPr>
             <a:picLocks noChangeAspect="1"/>
           </p:cNvPicPr>
@@ -3453,8 +3480,8 @@
         </p:blipFill>
         <p:spPr>
           <a:xfrm>
-            <a:off x="3581400" y="3276600"/>
-            <a:ext cx="2152650" cy="2286209"/>
+            <a:off x="3657600" y="3429000"/>
+            <a:ext cx="1781175" cy="2169662"/>
           </a:xfrm>
           <a:prstGeom prst="rect">
             <a:avLst/>
@@ -3544,7 +3571,7 @@
       </p:sp>
       <p:pic>
         <p:nvPicPr>
-          <p:cNvPr id="6" name="Picture 5" descr="Incentive driven networking  step 3.jpg"/>
+          <p:cNvPr id="7" name="Picture 6" descr="Legenda.jpg"/>
           <p:cNvPicPr>
             <a:picLocks noChangeAspect="1"/>
           </p:cNvPicPr>
@@ -3558,8 +3585,8 @@
         </p:blipFill>
         <p:spPr>
           <a:xfrm>
-            <a:off x="3810000" y="3429000"/>
-            <a:ext cx="1828800" cy="2362875"/>
+            <a:off x="95250" y="5867400"/>
+            <a:ext cx="9048750" cy="876300"/>
           </a:xfrm>
           <a:prstGeom prst="rect">
             <a:avLst/>
@@ -3568,7 +3595,7 @@
       </p:pic>
       <p:pic>
         <p:nvPicPr>
-          <p:cNvPr id="7" name="Picture 6" descr="Legenda.jpg"/>
+          <p:cNvPr id="9" name="Picture 8" descr="Incentive driven networking  step 3.jpg"/>
           <p:cNvPicPr>
             <a:picLocks noChangeAspect="1"/>
           </p:cNvPicPr>
@@ -3582,8 +3609,8 @@
         </p:blipFill>
         <p:spPr>
           <a:xfrm>
-            <a:off x="95250" y="5867400"/>
-            <a:ext cx="9048750" cy="876300"/>
+            <a:off x="3657600" y="3581400"/>
+            <a:ext cx="1784046" cy="2305050"/>
           </a:xfrm>
           <a:prstGeom prst="rect">
             <a:avLst/>
@@ -3695,6 +3722,30 @@
           </a:prstGeom>
         </p:spPr>
       </p:pic>
+      <p:pic>
+        <p:nvPicPr>
+          <p:cNvPr id="6" name="Picture 5" descr="Incentive driven networking  step 3.jpg"/>
+          <p:cNvPicPr>
+            <a:picLocks noChangeAspect="1"/>
+          </p:cNvPicPr>
+          <p:nvPr/>
+        </p:nvPicPr>
+        <p:blipFill>
+          <a:blip r:embed="rId3" cstate="print"/>
+          <a:stretch>
+            <a:fillRect/>
+          </a:stretch>
+        </p:blipFill>
+        <p:spPr>
+          <a:xfrm>
+            <a:off x="3657600" y="3505200"/>
+            <a:ext cx="1685925" cy="2178275"/>
+          </a:xfrm>
+          <a:prstGeom prst="rect">
+            <a:avLst/>
+          </a:prstGeom>
+        </p:spPr>
+      </p:pic>
     </p:spTree>
   </p:cSld>
   <p:clrMapOvr>
@@ -3737,93 +3788,11 @@
           <a:p>
             <a:r>
               <a:rPr lang="en-US" dirty="0" smtClean="0"/>
-              <a:t>The major issue</a:t>
-            </a:r>
-            <a:endParaRPr lang="en-US" dirty="0"/>
-          </a:p>
-        </p:txBody>
-      </p:sp>
-      <p:sp>
-        <p:nvSpPr>
-          <p:cNvPr id="3" name="Content Placeholder 2"/>
-          <p:cNvSpPr>
-            <a:spLocks noGrp="1"/>
-          </p:cNvSpPr>
-          <p:nvPr>
-            <p:ph idx="1"/>
-          </p:nvPr>
-        </p:nvSpPr>
-        <p:spPr/>
-        <p:txBody>
-          <a:bodyPr/>
-          <a:lstStyle/>
-          <a:p>
-            <a:pPr>
-              <a:buNone/>
-            </a:pPr>
-            <a:endParaRPr lang="en-US" dirty="0" smtClean="0"/>
-          </a:p>
-          <a:p>
-            <a:pPr algn="just">
-              <a:buNone/>
-            </a:pPr>
-            <a:r>
-              <a:rPr lang="en-US" dirty="0"/>
-              <a:t>	</a:t>
+              <a:t>A self learning </a:t>
             </a:r>
             <a:r>
               <a:rPr lang="en-US" dirty="0" smtClean="0"/>
-              <a:t>How to efficiently determine the optimal configuration parameters for all the participating networks, considering their high level goals and ensuring that the cooperation in mutually beneficial?</a:t>
-            </a:r>
-          </a:p>
-          <a:p>
-            <a:endParaRPr lang="en-US" dirty="0"/>
-          </a:p>
-        </p:txBody>
-      </p:sp>
-    </p:spTree>
-  </p:cSld>
-  <p:clrMapOvr>
-    <a:masterClrMapping/>
-  </p:clrMapOvr>
-</p:sld>
-</file>
-
-<file path=ppt/slides/slide16.xml><?xml version="1.0" encoding="utf-8"?>
-<p:sld xmlns:a="http://schemas.openxmlformats.org/drawingml/2006/main" xmlns:r="http://schemas.openxmlformats.org/officeDocument/2006/relationships" xmlns:p="http://schemas.openxmlformats.org/presentationml/2006/main">
-  <p:cSld>
-    <p:spTree>
-      <p:nvGrpSpPr>
-        <p:cNvPr id="1" name=""/>
-        <p:cNvGrpSpPr/>
-        <p:nvPr/>
-      </p:nvGrpSpPr>
-      <p:grpSpPr>
-        <a:xfrm>
-          <a:off x="0" y="0"/>
-          <a:ext cx="0" cy="0"/>
-          <a:chOff x="0" y="0"/>
-          <a:chExt cx="0" cy="0"/>
-        </a:xfrm>
-      </p:grpSpPr>
-      <p:sp>
-        <p:nvSpPr>
-          <p:cNvPr id="2" name="Title 1"/>
-          <p:cNvSpPr>
-            <a:spLocks noGrp="1"/>
-          </p:cNvSpPr>
-          <p:nvPr>
-            <p:ph type="title"/>
-          </p:nvPr>
-        </p:nvSpPr>
-        <p:spPr/>
-        <p:txBody>
-          <a:bodyPr/>
-          <a:lstStyle/>
-          <a:p>
-            <a:r>
-              <a:rPr lang="en-US" dirty="0" smtClean="0"/>
-              <a:t>A self learning approach</a:t>
+              <a:t>decision maker</a:t>
             </a:r>
             <a:endParaRPr lang="en-US" dirty="0"/>
           </a:p>
@@ -3865,7 +3834,15 @@
           <a:p>
             <a:r>
               <a:rPr lang="en-US" sz="2800" dirty="0" smtClean="0"/>
-              <a:t>It will use certain performance metric to make an assessment of every relevant and utilized service combination, over an entire symbiotic network.</a:t>
+              <a:t>It will use certain performance </a:t>
+            </a:r>
+            <a:r>
+              <a:rPr lang="en-US" sz="2800" dirty="0" smtClean="0"/>
+              <a:t>metrics </a:t>
+            </a:r>
+            <a:r>
+              <a:rPr lang="en-US" sz="2800" dirty="0" smtClean="0"/>
+              <a:t>to make an assessment of every relevant and utilized service combination, over an entire symbiotic network.</a:t>
             </a:r>
           </a:p>
           <a:p>
@@ -3891,7 +3868,7 @@
 </p:sld>
 </file>
 
-<file path=ppt/slides/slide17.xml><?xml version="1.0" encoding="utf-8"?>
+<file path=ppt/slides/slide16.xml><?xml version="1.0" encoding="utf-8"?>
 <p:sld xmlns:a="http://schemas.openxmlformats.org/drawingml/2006/main" xmlns:r="http://schemas.openxmlformats.org/officeDocument/2006/relationships" xmlns:p="http://schemas.openxmlformats.org/presentationml/2006/main">
   <p:cSld>
     <p:spTree>
@@ -6087,28 +6064,45 @@
           <a:p>
             <a:r>
               <a:rPr lang="en-US" sz="2000" dirty="0" smtClean="0"/>
-              <a:t>Final goal: three-tiered approach</a:t>
-            </a:r>
+              <a:t>Final goal: three-tiered </a:t>
+            </a:r>
+            <a:r>
+              <a:rPr lang="en-US" sz="2000" dirty="0" smtClean="0"/>
+              <a:t>learning paradigm</a:t>
+            </a:r>
+            <a:endParaRPr lang="en-US" sz="2000" dirty="0" smtClean="0"/>
           </a:p>
           <a:p>
             <a:pPr lvl="1"/>
             <a:r>
               <a:rPr lang="en-US" sz="1800" dirty="0" smtClean="0"/>
-              <a:t>Phase 1: Optimization of service settings (in-layer)</a:t>
+              <a:t>Tier </a:t>
+            </a:r>
+            <a:r>
+              <a:rPr lang="en-US" sz="1800" dirty="0" smtClean="0"/>
+              <a:t>1: Optimization of service settings (in-layer)</a:t>
             </a:r>
           </a:p>
           <a:p>
             <a:pPr lvl="1"/>
             <a:r>
               <a:rPr lang="en-US" sz="1800" dirty="0" smtClean="0"/>
-              <a:t>Phase 2: Selection of optimal service sets (cross-layer)</a:t>
+              <a:t>Tier </a:t>
+            </a:r>
+            <a:r>
+              <a:rPr lang="en-US" sz="1800" dirty="0" smtClean="0"/>
+              <a:t>2: Selection of optimal service sets (cross-layer)</a:t>
             </a:r>
           </a:p>
           <a:p>
             <a:pPr lvl="1"/>
             <a:r>
               <a:rPr lang="en-US" sz="1800" dirty="0" smtClean="0"/>
-              <a:t>Phase 3: Cross-network negotiation (cross-network)</a:t>
+              <a:t>Tier </a:t>
+            </a:r>
+            <a:r>
+              <a:rPr lang="en-US" sz="1800" dirty="0" smtClean="0"/>
+              <a:t>3: Cross-network negotiation (cross-network)</a:t>
             </a:r>
           </a:p>
           <a:p>
@@ -6144,7 +6138,7 @@
               <a:pPr>
                 <a:defRPr/>
               </a:pPr>
-              <a:t>17</a:t>
+              <a:t>16</a:t>
             </a:fld>
             <a:endParaRPr lang="en-US" dirty="0"/>
           </a:p>
@@ -6301,6 +6295,146 @@
 </p:sld>
 </file>
 
+<file path=ppt/slides/slide17.xml><?xml version="1.0" encoding="utf-8"?>
+<p:sld xmlns:a="http://schemas.openxmlformats.org/drawingml/2006/main" xmlns:r="http://schemas.openxmlformats.org/officeDocument/2006/relationships" xmlns:p="http://schemas.openxmlformats.org/presentationml/2006/main">
+  <p:cSld>
+    <p:spTree>
+      <p:nvGrpSpPr>
+        <p:cNvPr id="1" name=""/>
+        <p:cNvGrpSpPr/>
+        <p:nvPr/>
+      </p:nvGrpSpPr>
+      <p:grpSpPr>
+        <a:xfrm>
+          <a:off x="0" y="0"/>
+          <a:ext cx="0" cy="0"/>
+          <a:chOff x="0" y="0"/>
+          <a:chExt cx="0" cy="0"/>
+        </a:xfrm>
+      </p:grpSpPr>
+      <p:sp>
+        <p:nvSpPr>
+          <p:cNvPr id="2" name="Title 1"/>
+          <p:cNvSpPr>
+            <a:spLocks noGrp="1"/>
+          </p:cNvSpPr>
+          <p:nvPr>
+            <p:ph type="title"/>
+          </p:nvPr>
+        </p:nvSpPr>
+        <p:spPr/>
+        <p:txBody>
+          <a:bodyPr/>
+          <a:lstStyle/>
+          <a:p>
+            <a:r>
+              <a:rPr lang="en-US" smtClean="0"/>
+              <a:t>The initial </a:t>
+            </a:r>
+            <a:r>
+              <a:rPr lang="en-US" dirty="0" smtClean="0"/>
+              <a:t>approach</a:t>
+            </a:r>
+            <a:endParaRPr lang="en-US" dirty="0"/>
+          </a:p>
+        </p:txBody>
+      </p:sp>
+      <p:sp>
+        <p:nvSpPr>
+          <p:cNvPr id="3" name="Content Placeholder 2"/>
+          <p:cNvSpPr>
+            <a:spLocks noGrp="1"/>
+          </p:cNvSpPr>
+          <p:nvPr>
+            <p:ph idx="1"/>
+          </p:nvPr>
+        </p:nvSpPr>
+        <p:spPr/>
+        <p:txBody>
+          <a:bodyPr>
+            <a:normAutofit fontScale="92500" lnSpcReduction="10000"/>
+          </a:bodyPr>
+          <a:lstStyle/>
+          <a:p>
+            <a:r>
+              <a:rPr lang="en-US" dirty="0" smtClean="0">
+                <a:cs typeface="Times New Roman" pitchFamily="18" charset="0"/>
+              </a:rPr>
+              <a:t>Linear programming (LP)</a:t>
+            </a:r>
+          </a:p>
+          <a:p>
+            <a:pPr>
+              <a:buNone/>
+            </a:pPr>
+            <a:endParaRPr lang="en-US" sz="2400" dirty="0" smtClean="0"/>
+          </a:p>
+          <a:p>
+            <a:pPr>
+              <a:buNone/>
+            </a:pPr>
+            <a:endParaRPr lang="en-US" sz="2400" dirty="0" smtClean="0"/>
+          </a:p>
+          <a:p>
+            <a:pPr>
+              <a:buNone/>
+            </a:pPr>
+            <a:endParaRPr lang="en-US" dirty="0" smtClean="0"/>
+          </a:p>
+          <a:p>
+            <a:pPr>
+              <a:buNone/>
+            </a:pPr>
+            <a:endParaRPr lang="en-US" sz="2400" dirty="0" smtClean="0"/>
+          </a:p>
+          <a:p>
+            <a:endParaRPr lang="en-US" sz="2400" dirty="0" smtClean="0">
+              <a:cs typeface="Times New Roman" pitchFamily="18" charset="0"/>
+            </a:endParaRPr>
+          </a:p>
+          <a:p>
+            <a:r>
+              <a:rPr lang="en-US" dirty="0" smtClean="0"/>
+              <a:t>Negotiation entity (NE) collects network’s service profiles and “calculates” the optimal service set for every sub-net using an IBM’s linear programming engine </a:t>
+            </a:r>
+          </a:p>
+          <a:p>
+            <a:endParaRPr lang="en-US" dirty="0"/>
+          </a:p>
+        </p:txBody>
+      </p:sp>
+      <p:pic>
+        <p:nvPicPr>
+          <p:cNvPr id="4" name="Picture 3" descr="Solver.jpg"/>
+          <p:cNvPicPr>
+            <a:picLocks noChangeAspect="1"/>
+          </p:cNvPicPr>
+          <p:nvPr/>
+        </p:nvPicPr>
+        <p:blipFill>
+          <a:blip r:embed="rId2" cstate="print"/>
+          <a:stretch>
+            <a:fillRect/>
+          </a:stretch>
+        </p:blipFill>
+        <p:spPr>
+          <a:xfrm>
+            <a:off x="1066800" y="2667000"/>
+            <a:ext cx="7225395" cy="1404938"/>
+          </a:xfrm>
+          <a:prstGeom prst="rect">
+            <a:avLst/>
+          </a:prstGeom>
+        </p:spPr>
+      </p:pic>
+    </p:spTree>
+  </p:cSld>
+  <p:clrMapOvr>
+    <a:masterClrMapping/>
+  </p:clrMapOvr>
+</p:sld>
+</file>
+
 <file path=ppt/slides/slide18.xml><?xml version="1.0" encoding="utf-8"?>
 <p:sld xmlns:a="http://schemas.openxmlformats.org/drawingml/2006/main" xmlns:r="http://schemas.openxmlformats.org/officeDocument/2006/relationships" xmlns:p="http://schemas.openxmlformats.org/presentationml/2006/main">
   <p:cSld>
@@ -6333,13 +6467,10 @@
           <a:bodyPr/>
           <a:lstStyle/>
           <a:p>
-            <a:r>
-              <a:rPr lang="en-US" smtClean="0"/>
-              <a:t>The initial </a:t>
-            </a:r>
+            <a:pPr algn="ctr"/>
             <a:r>
               <a:rPr lang="en-US" dirty="0" smtClean="0"/>
-              <a:t>approach</a:t>
+              <a:t>Disadvantages</a:t>
             </a:r>
             <a:endParaRPr lang="en-US" dirty="0"/>
           </a:p>
@@ -6355,63 +6486,119 @@
             <p:ph idx="1"/>
           </p:nvPr>
         </p:nvSpPr>
-        <p:spPr/>
+        <p:spPr>
+          <a:xfrm>
+            <a:off x="457200" y="1600200"/>
+            <a:ext cx="8229600" cy="4953000"/>
+          </a:xfrm>
+        </p:spPr>
         <p:txBody>
           <a:bodyPr>
-            <a:normAutofit fontScale="92500" lnSpcReduction="10000"/>
+            <a:normAutofit/>
           </a:bodyPr>
           <a:lstStyle/>
           <a:p>
             <a:r>
-              <a:rPr lang="en-US" dirty="0" smtClean="0">
-                <a:cs typeface="Times New Roman" pitchFamily="18" charset="0"/>
-              </a:rPr>
-              <a:t>Linear programming (LP)</a:t>
-            </a:r>
-          </a:p>
-          <a:p>
-            <a:pPr>
+              <a:rPr lang="en-US" sz="2800" dirty="0" smtClean="0"/>
+              <a:t>Requires a priori knowledge - fixed benefits </a:t>
+            </a:r>
+            <a:r>
+              <a:rPr lang="en-US" sz="2800" dirty="0"/>
+              <a:t>and costs </a:t>
+            </a:r>
+            <a:r>
+              <a:rPr lang="en-US" sz="2800" dirty="0" smtClean="0"/>
+              <a:t> for activating each service:</a:t>
+            </a:r>
+          </a:p>
+          <a:p>
+            <a:endParaRPr lang="en-US" sz="2800" dirty="0" smtClean="0"/>
+          </a:p>
+          <a:p>
+            <a:endParaRPr lang="en-US" sz="2800" dirty="0" smtClean="0"/>
+          </a:p>
+          <a:p>
+            <a:endParaRPr lang="en-US" sz="2800" dirty="0" smtClean="0"/>
+          </a:p>
+          <a:p>
+            <a:endParaRPr lang="en-US" sz="2800" dirty="0" smtClean="0"/>
+          </a:p>
+          <a:p>
+            <a:endParaRPr lang="en-US" sz="2800" dirty="0" smtClean="0"/>
+          </a:p>
+          <a:p>
+            <a:endParaRPr lang="en-US" sz="2800" dirty="0" smtClean="0"/>
+          </a:p>
+          <a:p>
+            <a:pPr algn="just">
               <a:buNone/>
             </a:pPr>
-            <a:endParaRPr lang="en-US" sz="2400" dirty="0" smtClean="0"/>
-          </a:p>
-          <a:p>
-            <a:pPr>
-              <a:buNone/>
-            </a:pPr>
-            <a:endParaRPr lang="en-US" sz="2400" dirty="0" smtClean="0"/>
-          </a:p>
-          <a:p>
-            <a:pPr>
-              <a:buNone/>
-            </a:pPr>
-            <a:endParaRPr lang="en-US" dirty="0" smtClean="0"/>
-          </a:p>
-          <a:p>
-            <a:pPr>
-              <a:buNone/>
-            </a:pPr>
-            <a:endParaRPr lang="en-US" sz="2400" dirty="0" smtClean="0"/>
-          </a:p>
-          <a:p>
-            <a:endParaRPr lang="en-US" sz="2400" dirty="0" smtClean="0">
-              <a:cs typeface="Times New Roman" pitchFamily="18" charset="0"/>
-            </a:endParaRPr>
-          </a:p>
-          <a:p>
-            <a:r>
-              <a:rPr lang="en-US" dirty="0" smtClean="0"/>
-              <a:t>Negotiation entity (NE) collects network’s service profiles and “calculates” the optimal service set for every sub-net using an IBM’s linear programming engine </a:t>
-            </a:r>
-          </a:p>
-          <a:p>
-            <a:endParaRPr lang="en-US" dirty="0"/>
+            <a:r>
+              <a:rPr lang="en-US" sz="1500" dirty="0" smtClean="0"/>
+              <a:t>Eli de </a:t>
+            </a:r>
+            <a:r>
+              <a:rPr lang="en-US" sz="1500" dirty="0" err="1" smtClean="0"/>
+              <a:t>Poorter</a:t>
+            </a:r>
+            <a:r>
+              <a:rPr lang="en-US" sz="1500" dirty="0" smtClean="0"/>
+              <a:t>, Pieter </a:t>
+            </a:r>
+            <a:r>
+              <a:rPr lang="en-US" sz="1500" dirty="0" err="1" smtClean="0"/>
+              <a:t>Becue</a:t>
+            </a:r>
+            <a:r>
+              <a:rPr lang="en-US" sz="1500" dirty="0" smtClean="0"/>
+              <a:t>, </a:t>
+            </a:r>
+            <a:r>
+              <a:rPr lang="en-US" sz="1500" dirty="0" err="1" smtClean="0"/>
+              <a:t>Milos</a:t>
+            </a:r>
+            <a:r>
+              <a:rPr lang="en-US" sz="1500" dirty="0" smtClean="0"/>
+              <a:t> </a:t>
+            </a:r>
+            <a:r>
+              <a:rPr lang="en-US" sz="1500" dirty="0" err="1" smtClean="0"/>
+              <a:t>Rovcanin</a:t>
+            </a:r>
+            <a:r>
+              <a:rPr lang="en-US" sz="1500" dirty="0" smtClean="0"/>
+              <a:t>, </a:t>
+            </a:r>
+            <a:r>
+              <a:rPr lang="en-US" sz="1500" dirty="0" err="1" smtClean="0"/>
+              <a:t>ingrid</a:t>
+            </a:r>
+            <a:r>
+              <a:rPr lang="en-US" sz="1500" dirty="0" smtClean="0"/>
+              <a:t> </a:t>
+            </a:r>
+            <a:r>
+              <a:rPr lang="en-US" sz="1500" dirty="0" err="1" smtClean="0"/>
+              <a:t>Moerman</a:t>
+            </a:r>
+            <a:r>
+              <a:rPr lang="en-US" sz="1500" dirty="0" smtClean="0"/>
+              <a:t>, Piet </a:t>
+            </a:r>
+            <a:r>
+              <a:rPr lang="en-US" sz="1500" dirty="0" err="1" smtClean="0"/>
+              <a:t>Demeester</a:t>
+            </a:r>
+            <a:r>
+              <a:rPr lang="en-US" sz="1500" dirty="0" smtClean="0"/>
+              <a:t>, “A negotiation-based networking methodology to enable cooperation across heterogeneous co-located networks”</a:t>
+            </a:r>
           </a:p>
         </p:txBody>
       </p:sp>
       <p:pic>
         <p:nvPicPr>
-          <p:cNvPr id="4" name="Picture 3" descr="Solver.jpg"/>
+          <p:cNvPr id="4" name="Picture 3" descr="PS influence .jpg"/>
           <p:cNvPicPr>
             <a:picLocks noChangeAspect="1"/>
           </p:cNvPicPr>
@@ -6425,8 +6612,8 @@
         </p:blipFill>
         <p:spPr>
           <a:xfrm>
-            <a:off x="1066800" y="2667000"/>
-            <a:ext cx="7225395" cy="1404938"/>
+            <a:off x="1600200" y="2514600"/>
+            <a:ext cx="5593814" cy="2958986"/>
           </a:xfrm>
           <a:prstGeom prst="rect">
             <a:avLst/>
@@ -6473,7 +6660,6 @@
           <a:bodyPr/>
           <a:lstStyle/>
           <a:p>
-            <a:pPr algn="ctr"/>
             <a:r>
               <a:rPr lang="en-US" dirty="0" smtClean="0"/>
               <a:t>Disadvantages</a:t>
@@ -6492,140 +6678,80 @@
             <p:ph idx="1"/>
           </p:nvPr>
         </p:nvSpPr>
-        <p:spPr>
-          <a:xfrm>
-            <a:off x="457200" y="1600200"/>
-            <a:ext cx="8229600" cy="4953000"/>
-          </a:xfrm>
-        </p:spPr>
+        <p:spPr/>
         <p:txBody>
           <a:bodyPr>
-            <a:normAutofit/>
+            <a:normAutofit lnSpcReduction="10000"/>
           </a:bodyPr>
           <a:lstStyle/>
           <a:p>
             <a:r>
-              <a:rPr lang="en-US" sz="2800" dirty="0" smtClean="0"/>
-              <a:t>Requires a priori knowledge - fixed benefits </a:t>
-            </a:r>
-            <a:r>
-              <a:rPr lang="en-US" sz="2800" dirty="0"/>
-              <a:t>and costs </a:t>
-            </a:r>
-            <a:r>
-              <a:rPr lang="en-US" sz="2800" dirty="0" smtClean="0"/>
-              <a:t> for activating each service:</a:t>
-            </a:r>
-          </a:p>
-          <a:p>
-            <a:endParaRPr lang="en-US" sz="2800" dirty="0" smtClean="0"/>
-          </a:p>
-          <a:p>
-            <a:endParaRPr lang="en-US" sz="2800" dirty="0" smtClean="0"/>
-          </a:p>
-          <a:p>
-            <a:endParaRPr lang="en-US" sz="2800" dirty="0" smtClean="0"/>
-          </a:p>
-          <a:p>
-            <a:endParaRPr lang="en-US" sz="2800" dirty="0" smtClean="0"/>
-          </a:p>
-          <a:p>
-            <a:endParaRPr lang="en-US" sz="2800" dirty="0" smtClean="0"/>
-          </a:p>
-          <a:p>
-            <a:endParaRPr lang="en-US" sz="2800" dirty="0" smtClean="0"/>
-          </a:p>
-          <a:p>
-            <a:pPr algn="just">
+              <a:rPr lang="en-US" dirty="0" smtClean="0"/>
+              <a:t>Information about the service influences is extremely difficult to obtain:</a:t>
+            </a:r>
+          </a:p>
+          <a:p>
+            <a:pPr lvl="1"/>
+            <a:r>
+              <a:rPr lang="en-US" sz="2000" dirty="0" smtClean="0"/>
+              <a:t>Simulation </a:t>
+            </a:r>
+          </a:p>
+          <a:p>
+            <a:pPr lvl="1"/>
+            <a:r>
+              <a:rPr lang="en-US" sz="2000" dirty="0" smtClean="0"/>
+              <a:t>From a literature</a:t>
+            </a:r>
+          </a:p>
+          <a:p>
+            <a:pPr lvl="1"/>
+            <a:r>
+              <a:rPr lang="en-US" sz="2000" dirty="0" smtClean="0"/>
+              <a:t>Assumed …</a:t>
+            </a:r>
+          </a:p>
+          <a:p>
+            <a:pPr lvl="1">
               <a:buNone/>
             </a:pPr>
-            <a:r>
-              <a:rPr lang="en-US" sz="1500" dirty="0" smtClean="0"/>
-              <a:t>Eli de </a:t>
-            </a:r>
-            <a:r>
-              <a:rPr lang="en-US" sz="1500" dirty="0" err="1" smtClean="0"/>
-              <a:t>Poorter</a:t>
-            </a:r>
-            <a:r>
-              <a:rPr lang="en-US" sz="1500" dirty="0" smtClean="0"/>
-              <a:t>, Pieter </a:t>
-            </a:r>
-            <a:r>
-              <a:rPr lang="en-US" sz="1500" dirty="0" err="1" smtClean="0"/>
-              <a:t>Becue</a:t>
-            </a:r>
-            <a:r>
-              <a:rPr lang="en-US" sz="1500" dirty="0" smtClean="0"/>
-              <a:t>, </a:t>
-            </a:r>
-            <a:r>
-              <a:rPr lang="en-US" sz="1500" dirty="0" err="1" smtClean="0"/>
-              <a:t>Milos</a:t>
-            </a:r>
-            <a:r>
-              <a:rPr lang="en-US" sz="1500" dirty="0" smtClean="0"/>
-              <a:t> </a:t>
-            </a:r>
-            <a:r>
-              <a:rPr lang="en-US" sz="1500" dirty="0" err="1" smtClean="0"/>
-              <a:t>Rovcanin</a:t>
-            </a:r>
-            <a:r>
-              <a:rPr lang="en-US" sz="1500" dirty="0" smtClean="0"/>
-              <a:t>, </a:t>
-            </a:r>
-            <a:r>
-              <a:rPr lang="en-US" sz="1500" dirty="0" err="1" smtClean="0"/>
-              <a:t>ingrid</a:t>
-            </a:r>
-            <a:r>
-              <a:rPr lang="en-US" sz="1500" dirty="0" smtClean="0"/>
-              <a:t> </a:t>
-            </a:r>
-            <a:r>
-              <a:rPr lang="en-US" sz="1500" dirty="0" err="1" smtClean="0"/>
-              <a:t>Moerman</a:t>
-            </a:r>
-            <a:r>
-              <a:rPr lang="en-US" sz="1500" dirty="0" smtClean="0"/>
-              <a:t>, Piet </a:t>
-            </a:r>
-            <a:r>
-              <a:rPr lang="en-US" sz="1500" dirty="0" err="1" smtClean="0"/>
-              <a:t>Demeester</a:t>
-            </a:r>
-            <a:r>
-              <a:rPr lang="en-US" sz="1500" dirty="0" smtClean="0"/>
-              <a:t>, “A negotiation-based networking methodology to enable cooperation across heterogeneous co-located networks”</a:t>
-            </a:r>
+            <a:endParaRPr lang="en-US" sz="2000" dirty="0" smtClean="0"/>
+          </a:p>
+          <a:p>
+            <a:r>
+              <a:rPr lang="en-US" sz="2400" dirty="0" smtClean="0"/>
+              <a:t>Most of this data relates to static networking cases and change drastically when some of the network parameters change. </a:t>
+            </a:r>
+          </a:p>
+          <a:p>
+            <a:r>
+              <a:rPr lang="en-US" sz="2400" dirty="0" smtClean="0"/>
+              <a:t>Conclusion:</a:t>
+            </a:r>
+          </a:p>
+          <a:p>
+            <a:pPr>
+              <a:buNone/>
+            </a:pPr>
+            <a:r>
+              <a:rPr lang="en-US" sz="2400" dirty="0" smtClean="0"/>
+              <a:t>		ILP solver is a poor solution for dynamic environments </a:t>
+            </a:r>
+          </a:p>
+          <a:p>
+            <a:pPr>
+              <a:buNone/>
+            </a:pPr>
+            <a:endParaRPr lang="en-US" sz="2400" dirty="0" smtClean="0"/>
+          </a:p>
+          <a:p>
+            <a:pPr lvl="1">
+              <a:buNone/>
+            </a:pPr>
+            <a:endParaRPr lang="en-US" dirty="0" smtClean="0"/>
           </a:p>
         </p:txBody>
       </p:sp>
-      <p:pic>
-        <p:nvPicPr>
-          <p:cNvPr id="4" name="Picture 3" descr="PS influence .jpg"/>
-          <p:cNvPicPr>
-            <a:picLocks noChangeAspect="1"/>
-          </p:cNvPicPr>
-          <p:nvPr/>
-        </p:nvPicPr>
-        <p:blipFill>
-          <a:blip r:embed="rId2" cstate="print"/>
-          <a:stretch>
-            <a:fillRect/>
-          </a:stretch>
-        </p:blipFill>
-        <p:spPr>
-          <a:xfrm>
-            <a:off x="1600200" y="2514600"/>
-            <a:ext cx="5593814" cy="2958986"/>
-          </a:xfrm>
-          <a:prstGeom prst="rect">
-            <a:avLst/>
-          </a:prstGeom>
-        </p:spPr>
-      </p:pic>
     </p:spTree>
   </p:cSld>
   <p:clrMapOvr>
@@ -6706,7 +6832,7 @@
         <p:spPr>
           <a:xfrm>
             <a:off x="1295400" y="5486400"/>
-            <a:ext cx="6799362" cy="369332"/>
+            <a:ext cx="7020576" cy="369332"/>
           </a:xfrm>
           <a:prstGeom prst="rect">
             <a:avLst/>
@@ -6721,7 +6847,15 @@
           <a:p>
             <a:r>
               <a:rPr lang="en-US" dirty="0" smtClean="0"/>
-              <a:t>Enormous increase in a density of co-located, multi-purpose networks.</a:t>
+              <a:t>Enormous increase </a:t>
+            </a:r>
+            <a:r>
+              <a:rPr lang="en-US" dirty="0" smtClean="0"/>
+              <a:t>of the density </a:t>
+            </a:r>
+            <a:r>
+              <a:rPr lang="en-US" dirty="0" smtClean="0"/>
+              <a:t>of co-located, multi-purpose networks.</a:t>
             </a:r>
             <a:endParaRPr lang="en-US" dirty="0"/>
           </a:p>
@@ -6767,9 +6901,10 @@
           <a:bodyPr/>
           <a:lstStyle/>
           <a:p>
+            <a:pPr algn="ctr"/>
             <a:r>
               <a:rPr lang="en-US" dirty="0" smtClean="0"/>
-              <a:t>Disadvantages</a:t>
+              <a:t>Possible alternatives</a:t>
             </a:r>
             <a:endParaRPr lang="en-US" dirty="0"/>
           </a:p>
@@ -6788,74 +6923,60 @@
         <p:spPr/>
         <p:txBody>
           <a:bodyPr>
-            <a:normAutofit lnSpcReduction="10000"/>
+            <a:normAutofit fontScale="85000" lnSpcReduction="20000"/>
           </a:bodyPr>
           <a:lstStyle/>
           <a:p>
             <a:r>
               <a:rPr lang="en-US" dirty="0" smtClean="0"/>
-              <a:t>Information about the service influences is extremely difficult to obtain:</a:t>
-            </a:r>
-          </a:p>
-          <a:p>
-            <a:pPr lvl="1"/>
-            <a:r>
-              <a:rPr lang="en-US" sz="2000" dirty="0" smtClean="0"/>
-              <a:t>Simulation </a:t>
-            </a:r>
-          </a:p>
-          <a:p>
-            <a:pPr lvl="1"/>
-            <a:r>
-              <a:rPr lang="en-US" sz="2000" dirty="0" smtClean="0"/>
-              <a:t>From a literature</a:t>
-            </a:r>
-          </a:p>
-          <a:p>
-            <a:pPr lvl="1"/>
-            <a:r>
-              <a:rPr lang="en-US" sz="2000" dirty="0" smtClean="0"/>
-              <a:t>Assumed …</a:t>
-            </a:r>
-          </a:p>
-          <a:p>
-            <a:pPr lvl="1">
-              <a:buNone/>
-            </a:pPr>
-            <a:endParaRPr lang="en-US" sz="2000" dirty="0" smtClean="0"/>
-          </a:p>
-          <a:p>
-            <a:r>
-              <a:rPr lang="en-US" sz="2400" dirty="0" smtClean="0"/>
-              <a:t>Most of this data relates to static networking cases and change drastically when some of the network parameters change. </a:t>
-            </a:r>
-          </a:p>
-          <a:p>
-            <a:r>
-              <a:rPr lang="en-US" sz="2400" dirty="0" smtClean="0"/>
-              <a:t>Conclusion:</a:t>
+              <a:t>More adaptable to environments with fast changing parameters and much less demanding when it comes to a priory input information</a:t>
             </a:r>
           </a:p>
           <a:p>
             <a:pPr>
               <a:buNone/>
             </a:pPr>
-            <a:r>
-              <a:rPr lang="en-US" sz="2400" dirty="0" smtClean="0"/>
-              <a:t>		ILP solver is a poor solution for dynamic environments </a:t>
-            </a:r>
-          </a:p>
-          <a:p>
-            <a:pPr>
-              <a:buNone/>
-            </a:pPr>
-            <a:endParaRPr lang="en-US" sz="2400" dirty="0" smtClean="0"/>
-          </a:p>
-          <a:p>
-            <a:pPr lvl="1">
-              <a:buNone/>
-            </a:pPr>
             <a:endParaRPr lang="en-US" dirty="0" smtClean="0"/>
+          </a:p>
+          <a:p>
+            <a:pPr lvl="1"/>
+            <a:r>
+              <a:rPr lang="en-US" dirty="0" smtClean="0"/>
+              <a:t>Simulators</a:t>
+            </a:r>
+          </a:p>
+          <a:p>
+            <a:endParaRPr lang="en-US" dirty="0" smtClean="0"/>
+          </a:p>
+          <a:p>
+            <a:pPr lvl="1"/>
+            <a:r>
+              <a:rPr lang="en-US" dirty="0" smtClean="0"/>
+              <a:t>Mathematical modeling</a:t>
+            </a:r>
+          </a:p>
+          <a:p>
+            <a:endParaRPr lang="en-US" dirty="0" smtClean="0"/>
+          </a:p>
+          <a:p>
+            <a:pPr lvl="1"/>
+            <a:r>
+              <a:rPr lang="en-US" dirty="0" smtClean="0"/>
+              <a:t>Game theory</a:t>
+            </a:r>
+          </a:p>
+          <a:p>
+            <a:endParaRPr lang="en-US" dirty="0" smtClean="0"/>
+          </a:p>
+          <a:p>
+            <a:pPr lvl="1"/>
+            <a:r>
+              <a:rPr lang="en-US" dirty="0" smtClean="0"/>
+              <a:t>Machine – reinforcement learning </a:t>
+            </a:r>
+          </a:p>
+          <a:p>
+            <a:endParaRPr lang="en-US" dirty="0"/>
           </a:p>
         </p:txBody>
       </p:sp>
@@ -6902,7 +7023,7 @@
             <a:pPr algn="ctr"/>
             <a:r>
               <a:rPr lang="en-US" dirty="0" smtClean="0"/>
-              <a:t>Possible alternatives</a:t>
+              <a:t>Cognition cycle	</a:t>
             </a:r>
             <a:endParaRPr lang="en-US" dirty="0"/>
           </a:p>
@@ -6920,64 +7041,69 @@
         </p:nvSpPr>
         <p:spPr/>
         <p:txBody>
-          <a:bodyPr>
-            <a:normAutofit fontScale="85000" lnSpcReduction="20000"/>
-          </a:bodyPr>
+          <a:bodyPr/>
           <a:lstStyle/>
           <a:p>
             <a:r>
               <a:rPr lang="en-US" dirty="0" smtClean="0"/>
-              <a:t>More adaptable to environments with fast changing parameters and much less demanding when it comes to a priory input information</a:t>
-            </a:r>
-          </a:p>
-          <a:p>
-            <a:pPr>
-              <a:buNone/>
-            </a:pPr>
-            <a:endParaRPr lang="en-US" dirty="0" smtClean="0"/>
+              <a:t>4-steps: </a:t>
+            </a:r>
           </a:p>
           <a:p>
             <a:pPr lvl="1"/>
             <a:r>
               <a:rPr lang="en-US" dirty="0" smtClean="0"/>
-              <a:t>Simulators</a:t>
-            </a:r>
-          </a:p>
-          <a:p>
-            <a:endParaRPr lang="en-US" dirty="0" smtClean="0"/>
+              <a:t>Gathering Information (GI)</a:t>
+            </a:r>
           </a:p>
           <a:p>
             <a:pPr lvl="1"/>
             <a:r>
               <a:rPr lang="en-US" dirty="0" smtClean="0"/>
-              <a:t>Mathematical modeling</a:t>
-            </a:r>
-          </a:p>
-          <a:p>
-            <a:endParaRPr lang="en-US" dirty="0" smtClean="0"/>
+              <a:t>Planning Actions (PA)</a:t>
+            </a:r>
           </a:p>
           <a:p>
             <a:pPr lvl="1"/>
             <a:r>
               <a:rPr lang="en-US" dirty="0" smtClean="0"/>
-              <a:t>Game theory</a:t>
-            </a:r>
-          </a:p>
-          <a:p>
-            <a:endParaRPr lang="en-US" dirty="0" smtClean="0"/>
+              <a:t>Act (A)</a:t>
+            </a:r>
           </a:p>
           <a:p>
             <a:pPr lvl="1"/>
             <a:r>
               <a:rPr lang="en-US" dirty="0" smtClean="0"/>
-              <a:t>Machine – reinforcement learning </a:t>
-            </a:r>
-          </a:p>
-          <a:p>
+              <a:t>Collecting Feedback</a:t>
+            </a:r>
             <a:endParaRPr lang="en-US" dirty="0"/>
           </a:p>
         </p:txBody>
       </p:sp>
+      <p:pic>
+        <p:nvPicPr>
+          <p:cNvPr id="4" name="Picture 3" descr="Cognitive_cycle.jpg"/>
+          <p:cNvPicPr>
+            <a:picLocks noChangeAspect="1"/>
+          </p:cNvPicPr>
+          <p:nvPr/>
+        </p:nvPicPr>
+        <p:blipFill>
+          <a:blip r:embed="rId2" cstate="print"/>
+          <a:stretch>
+            <a:fillRect/>
+          </a:stretch>
+        </p:blipFill>
+        <p:spPr>
+          <a:xfrm>
+            <a:off x="4648200" y="2667000"/>
+            <a:ext cx="3895724" cy="3895724"/>
+          </a:xfrm>
+          <a:prstGeom prst="rect">
+            <a:avLst/>
+          </a:prstGeom>
+        </p:spPr>
+      </p:pic>
     </p:spTree>
   </p:cSld>
   <p:clrMapOvr>
@@ -7021,130 +7147,6 @@
             <a:pPr algn="ctr"/>
             <a:r>
               <a:rPr lang="en-US" dirty="0" smtClean="0"/>
-              <a:t>Cognition cycle	</a:t>
-            </a:r>
-            <a:endParaRPr lang="en-US" dirty="0"/>
-          </a:p>
-        </p:txBody>
-      </p:sp>
-      <p:sp>
-        <p:nvSpPr>
-          <p:cNvPr id="3" name="Content Placeholder 2"/>
-          <p:cNvSpPr>
-            <a:spLocks noGrp="1"/>
-          </p:cNvSpPr>
-          <p:nvPr>
-            <p:ph idx="1"/>
-          </p:nvPr>
-        </p:nvSpPr>
-        <p:spPr/>
-        <p:txBody>
-          <a:bodyPr/>
-          <a:lstStyle/>
-          <a:p>
-            <a:r>
-              <a:rPr lang="en-US" dirty="0" smtClean="0"/>
-              <a:t>4-steps: </a:t>
-            </a:r>
-          </a:p>
-          <a:p>
-            <a:pPr lvl="1"/>
-            <a:r>
-              <a:rPr lang="en-US" dirty="0" smtClean="0"/>
-              <a:t>Gathering Information (GI)</a:t>
-            </a:r>
-          </a:p>
-          <a:p>
-            <a:pPr lvl="1"/>
-            <a:r>
-              <a:rPr lang="en-US" dirty="0" smtClean="0"/>
-              <a:t>Planning Actions (PA)</a:t>
-            </a:r>
-          </a:p>
-          <a:p>
-            <a:pPr lvl="1"/>
-            <a:r>
-              <a:rPr lang="en-US" dirty="0" smtClean="0"/>
-              <a:t>Act (A)</a:t>
-            </a:r>
-          </a:p>
-          <a:p>
-            <a:pPr lvl="1"/>
-            <a:r>
-              <a:rPr lang="en-US" dirty="0" smtClean="0"/>
-              <a:t>Collecting Feedback</a:t>
-            </a:r>
-            <a:endParaRPr lang="en-US" dirty="0"/>
-          </a:p>
-        </p:txBody>
-      </p:sp>
-      <p:pic>
-        <p:nvPicPr>
-          <p:cNvPr id="4" name="Picture 3" descr="Cognitive_cycle.jpg"/>
-          <p:cNvPicPr>
-            <a:picLocks noChangeAspect="1"/>
-          </p:cNvPicPr>
-          <p:nvPr/>
-        </p:nvPicPr>
-        <p:blipFill>
-          <a:blip r:embed="rId2" cstate="print"/>
-          <a:stretch>
-            <a:fillRect/>
-          </a:stretch>
-        </p:blipFill>
-        <p:spPr>
-          <a:xfrm>
-            <a:off x="4648200" y="2667000"/>
-            <a:ext cx="3895724" cy="3895724"/>
-          </a:xfrm>
-          <a:prstGeom prst="rect">
-            <a:avLst/>
-          </a:prstGeom>
-        </p:spPr>
-      </p:pic>
-    </p:spTree>
-  </p:cSld>
-  <p:clrMapOvr>
-    <a:masterClrMapping/>
-  </p:clrMapOvr>
-</p:sld>
-</file>
-
-<file path=ppt/slides/slide23.xml><?xml version="1.0" encoding="utf-8"?>
-<p:sld xmlns:a="http://schemas.openxmlformats.org/drawingml/2006/main" xmlns:r="http://schemas.openxmlformats.org/officeDocument/2006/relationships" xmlns:p="http://schemas.openxmlformats.org/presentationml/2006/main">
-  <p:cSld>
-    <p:spTree>
-      <p:nvGrpSpPr>
-        <p:cNvPr id="1" name=""/>
-        <p:cNvGrpSpPr/>
-        <p:nvPr/>
-      </p:nvGrpSpPr>
-      <p:grpSpPr>
-        <a:xfrm>
-          <a:off x="0" y="0"/>
-          <a:ext cx="0" cy="0"/>
-          <a:chOff x="0" y="0"/>
-          <a:chExt cx="0" cy="0"/>
-        </a:xfrm>
-      </p:grpSpPr>
-      <p:sp>
-        <p:nvSpPr>
-          <p:cNvPr id="2" name="Title 1"/>
-          <p:cNvSpPr>
-            <a:spLocks noGrp="1"/>
-          </p:cNvSpPr>
-          <p:nvPr>
-            <p:ph type="title"/>
-          </p:nvPr>
-        </p:nvSpPr>
-        <p:spPr/>
-        <p:txBody>
-          <a:bodyPr/>
-          <a:lstStyle/>
-          <a:p>
-            <a:pPr algn="ctr"/>
-            <a:r>
-              <a:rPr lang="en-US" dirty="0" smtClean="0"/>
               <a:t>Reinforcement learning </a:t>
             </a:r>
             <a:endParaRPr lang="en-US" dirty="0"/>
@@ -7309,7 +7311,7 @@
 </p:sld>
 </file>
 
-<file path=ppt/slides/slide24.xml><?xml version="1.0" encoding="utf-8"?>
+<file path=ppt/slides/slide23.xml><?xml version="1.0" encoding="utf-8"?>
 <p:sld xmlns:a="http://schemas.openxmlformats.org/drawingml/2006/main" xmlns:r="http://schemas.openxmlformats.org/officeDocument/2006/relationships" xmlns:p="http://schemas.openxmlformats.org/presentationml/2006/main">
   <p:cSld>
     <p:spTree>
@@ -7530,7 +7532,7 @@
 </p:sld>
 </file>
 
-<file path=ppt/slides/slide25.xml><?xml version="1.0" encoding="utf-8"?>
+<file path=ppt/slides/slide24.xml><?xml version="1.0" encoding="utf-8"?>
 <p:sld xmlns:a="http://schemas.openxmlformats.org/drawingml/2006/main" xmlns:r="http://schemas.openxmlformats.org/officeDocument/2006/relationships" xmlns:p="http://schemas.openxmlformats.org/presentationml/2006/main">
   <p:cSld>
     <p:spTree>
@@ -7617,7 +7619,7 @@
 </p:sld>
 </file>
 
-<file path=ppt/slides/slide26.xml><?xml version="1.0" encoding="utf-8"?>
+<file path=ppt/slides/slide25.xml><?xml version="1.0" encoding="utf-8"?>
 <p:sld xmlns:a="http://schemas.openxmlformats.org/drawingml/2006/main" xmlns:r="http://schemas.openxmlformats.org/officeDocument/2006/relationships" xmlns:p="http://schemas.openxmlformats.org/presentationml/2006/main">
   <p:cSld>
     <p:spTree>
@@ -7724,7 +7726,19 @@
               <a:rPr lang="en-US" sz="2400" dirty="0" smtClean="0">
                 <a:cs typeface="Times New Roman" pitchFamily="18" charset="0"/>
               </a:rPr>
-              <a:t>Instead of relying on a pre-learned MDP model, an agent collect process samples</a:t>
+              <a:t>Instead of relying on a pre-learned MDP model, an agent </a:t>
+            </a:r>
+            <a:r>
+              <a:rPr lang="en-US" sz="2400" dirty="0" smtClean="0">
+                <a:cs typeface="Times New Roman" pitchFamily="18" charset="0"/>
+              </a:rPr>
+              <a:t>collects </a:t>
+            </a:r>
+            <a:r>
+              <a:rPr lang="en-US" sz="2400" dirty="0" smtClean="0">
+                <a:cs typeface="Times New Roman" pitchFamily="18" charset="0"/>
+              </a:rPr>
+              <a:t>process samples</a:t>
             </a:r>
           </a:p>
           <a:p>
@@ -7825,7 +7839,7 @@
 </p:sld>
 </file>
 
-<file path=ppt/slides/slide27.xml><?xml version="1.0" encoding="utf-8"?>
+<file path=ppt/slides/slide26.xml><?xml version="1.0" encoding="utf-8"?>
 <p:sld xmlns:a="http://schemas.openxmlformats.org/drawingml/2006/main" xmlns:r="http://schemas.openxmlformats.org/officeDocument/2006/relationships" xmlns:p="http://schemas.openxmlformats.org/presentationml/2006/main">
   <p:cSld>
     <p:spTree>
@@ -8020,7 +8034,7 @@
 </p:sld>
 </file>
 
-<file path=ppt/slides/slide28.xml><?xml version="1.0" encoding="utf-8"?>
+<file path=ppt/slides/slide27.xml><?xml version="1.0" encoding="utf-8"?>
 <p:sld xmlns:a="http://schemas.openxmlformats.org/drawingml/2006/main" xmlns:r="http://schemas.openxmlformats.org/officeDocument/2006/relationships" xmlns:p="http://schemas.openxmlformats.org/presentationml/2006/main">
   <p:cSld>
     <p:spTree>
@@ -8197,6 +8211,240 @@
 </p:sld>
 </file>
 
+<file path=ppt/slides/slide28.xml><?xml version="1.0" encoding="utf-8"?>
+<p:sld xmlns:a="http://schemas.openxmlformats.org/drawingml/2006/main" xmlns:r="http://schemas.openxmlformats.org/officeDocument/2006/relationships" xmlns:p="http://schemas.openxmlformats.org/presentationml/2006/main">
+  <p:cSld>
+    <p:spTree>
+      <p:nvGrpSpPr>
+        <p:cNvPr id="1" name=""/>
+        <p:cNvGrpSpPr/>
+        <p:nvPr/>
+      </p:nvGrpSpPr>
+      <p:grpSpPr>
+        <a:xfrm>
+          <a:off x="0" y="0"/>
+          <a:ext cx="0" cy="0"/>
+          <a:chOff x="0" y="0"/>
+          <a:chExt cx="0" cy="0"/>
+        </a:xfrm>
+      </p:grpSpPr>
+      <p:sp>
+        <p:nvSpPr>
+          <p:cNvPr id="2" name="Title 1"/>
+          <p:cNvSpPr>
+            <a:spLocks noGrp="1"/>
+          </p:cNvSpPr>
+          <p:nvPr>
+            <p:ph type="title"/>
+          </p:nvPr>
+        </p:nvSpPr>
+        <p:spPr/>
+        <p:txBody>
+          <a:bodyPr/>
+          <a:lstStyle/>
+          <a:p>
+            <a:pPr algn="ctr"/>
+            <a:r>
+              <a:rPr lang="en-US" dirty="0" smtClean="0"/>
+              <a:t>Least Squares Policy Iteration - LSPI</a:t>
+            </a:r>
+            <a:endParaRPr lang="en-US" dirty="0"/>
+          </a:p>
+        </p:txBody>
+      </p:sp>
+      <p:sp>
+        <p:nvSpPr>
+          <p:cNvPr id="3" name="Content Placeholder 2"/>
+          <p:cNvSpPr>
+            <a:spLocks noGrp="1"/>
+          </p:cNvSpPr>
+          <p:nvPr>
+            <p:ph idx="1"/>
+          </p:nvPr>
+        </p:nvSpPr>
+        <p:spPr>
+          <a:xfrm>
+            <a:off x="755576" y="1340768"/>
+            <a:ext cx="8151813" cy="5203825"/>
+          </a:xfrm>
+        </p:spPr>
+        <p:txBody>
+          <a:bodyPr/>
+          <a:lstStyle/>
+          <a:p>
+            <a:r>
+              <a:rPr lang="en-US" sz="2400" dirty="0" smtClean="0"/>
+              <a:t>Approximated values for matrices</a:t>
+            </a:r>
+            <a:r>
+              <a:rPr lang="en-US" sz="2000" dirty="0" smtClean="0"/>
+              <a:t>:</a:t>
+            </a:r>
+          </a:p>
+          <a:p>
+            <a:endParaRPr lang="en-US" sz="2000" dirty="0" smtClean="0"/>
+          </a:p>
+          <a:p>
+            <a:endParaRPr lang="en-US" sz="2000" dirty="0" smtClean="0"/>
+          </a:p>
+          <a:p>
+            <a:endParaRPr lang="en-US" sz="2000" dirty="0" smtClean="0"/>
+          </a:p>
+          <a:p>
+            <a:endParaRPr lang="en-US" sz="2000" dirty="0" smtClean="0"/>
+          </a:p>
+          <a:p>
+            <a:endParaRPr lang="en-US" sz="2000" dirty="0" smtClean="0"/>
+          </a:p>
+          <a:p>
+            <a:pPr>
+              <a:buNone/>
+            </a:pPr>
+            <a:endParaRPr lang="en-US" sz="1600" dirty="0" smtClean="0"/>
+          </a:p>
+          <a:p>
+            <a:pPr>
+              <a:buNone/>
+            </a:pPr>
+            <a:endParaRPr lang="en-US" sz="1600" dirty="0" smtClean="0"/>
+          </a:p>
+          <a:p>
+            <a:r>
+              <a:rPr lang="en-US" sz="2400" dirty="0" smtClean="0"/>
+              <a:t>To improve consistency between the approximated and the actual values:</a:t>
+            </a:r>
+            <a:r>
+              <a:rPr lang="en-US" sz="1800" dirty="0" smtClean="0"/>
+              <a:t> </a:t>
+            </a:r>
+          </a:p>
+          <a:p>
+            <a:pPr>
+              <a:buNone/>
+            </a:pPr>
+            <a:endParaRPr lang="en-US" sz="1600" dirty="0" smtClean="0"/>
+          </a:p>
+          <a:p>
+            <a:pPr>
+              <a:buNone/>
+            </a:pPr>
+            <a:endParaRPr lang="en-US" sz="2000" dirty="0"/>
+          </a:p>
+        </p:txBody>
+      </p:sp>
+      <p:sp>
+        <p:nvSpPr>
+          <p:cNvPr id="4" name="Date Placeholder 3"/>
+          <p:cNvSpPr>
+            <a:spLocks noGrp="1"/>
+          </p:cNvSpPr>
+          <p:nvPr>
+            <p:ph type="dt" sz="half" idx="10"/>
+          </p:nvPr>
+        </p:nvSpPr>
+        <p:spPr>
+          <a:xfrm>
+            <a:off x="0" y="6332538"/>
+            <a:ext cx="1008063" cy="365125"/>
+          </a:xfrm>
+          <a:prstGeom prst="rect">
+            <a:avLst/>
+          </a:prstGeom>
+        </p:spPr>
+        <p:txBody>
+          <a:bodyPr/>
+          <a:lstStyle/>
+          <a:p>
+            <a:fld id="{71A8F685-8706-447C-ADBE-376EAB5A8D5E}" type="datetime1">
+              <a:rPr lang="nl-BE" smtClean="0"/>
+              <a:pPr/>
+              <a:t>21/06/2014</a:t>
+            </a:fld>
+            <a:endParaRPr lang="nl-BE"/>
+          </a:p>
+        </p:txBody>
+      </p:sp>
+      <p:sp>
+        <p:nvSpPr>
+          <p:cNvPr id="5" name="Slide Number Placeholder 4"/>
+          <p:cNvSpPr>
+            <a:spLocks noGrp="1"/>
+          </p:cNvSpPr>
+          <p:nvPr>
+            <p:ph type="sldNum" sz="quarter" idx="11"/>
+          </p:nvPr>
+        </p:nvSpPr>
+        <p:spPr/>
+        <p:txBody>
+          <a:bodyPr/>
+          <a:lstStyle/>
+          <a:p>
+            <a:fld id="{99447BFD-27A8-46CA-98C0-E2987161CF3F}" type="slidenum">
+              <a:rPr lang="nl-BE" smtClean="0"/>
+              <a:pPr/>
+              <a:t>28</a:t>
+            </a:fld>
+            <a:endParaRPr lang="nl-BE"/>
+          </a:p>
+        </p:txBody>
+      </p:sp>
+      <p:pic>
+        <p:nvPicPr>
+          <p:cNvPr id="7" name="Picture 6" descr="Matrice - Aproksimacije.jpg"/>
+          <p:cNvPicPr>
+            <a:picLocks noChangeAspect="1"/>
+          </p:cNvPicPr>
+          <p:nvPr/>
+        </p:nvPicPr>
+        <p:blipFill>
+          <a:blip r:embed="rId2" cstate="print"/>
+          <a:stretch>
+            <a:fillRect/>
+          </a:stretch>
+        </p:blipFill>
+        <p:spPr>
+          <a:xfrm>
+            <a:off x="1981200" y="1981200"/>
+            <a:ext cx="5290393" cy="1905000"/>
+          </a:xfrm>
+          <a:prstGeom prst="rect">
+            <a:avLst/>
+          </a:prstGeom>
+        </p:spPr>
+      </p:pic>
+      <p:pic>
+        <p:nvPicPr>
+          <p:cNvPr id="9" name="Picture 8" descr="Approx expectations.jpg"/>
+          <p:cNvPicPr>
+            <a:picLocks noChangeAspect="1"/>
+          </p:cNvPicPr>
+          <p:nvPr/>
+        </p:nvPicPr>
+        <p:blipFill>
+          <a:blip r:embed="rId3" cstate="print"/>
+          <a:stretch>
+            <a:fillRect/>
+          </a:stretch>
+        </p:blipFill>
+        <p:spPr>
+          <a:xfrm>
+            <a:off x="1752600" y="5181600"/>
+            <a:ext cx="5791200" cy="962025"/>
+          </a:xfrm>
+          <a:prstGeom prst="rect">
+            <a:avLst/>
+          </a:prstGeom>
+        </p:spPr>
+      </p:pic>
+    </p:spTree>
+  </p:cSld>
+  <p:clrMapOvr>
+    <a:masterClrMapping/>
+  </p:clrMapOvr>
+  <p:transition/>
+</p:sld>
+</file>
+
 <file path=ppt/slides/slide29.xml><?xml version="1.0" encoding="utf-8"?>
 <p:sld xmlns:a="http://schemas.openxmlformats.org/drawingml/2006/main" xmlns:r="http://schemas.openxmlformats.org/officeDocument/2006/relationships" xmlns:p="http://schemas.openxmlformats.org/presentationml/2006/main">
   <p:cSld>
@@ -8248,238 +8496,64 @@
             <p:ph idx="1"/>
           </p:nvPr>
         </p:nvSpPr>
-        <p:spPr>
-          <a:xfrm>
-            <a:off x="755576" y="1340768"/>
-            <a:ext cx="8151813" cy="5203825"/>
-          </a:xfrm>
-        </p:spPr>
-        <p:txBody>
-          <a:bodyPr/>
-          <a:lstStyle/>
-          <a:p>
-            <a:r>
-              <a:rPr lang="en-US" sz="2400" dirty="0" smtClean="0"/>
-              <a:t>Approximated values for matrices</a:t>
-            </a:r>
-            <a:r>
-              <a:rPr lang="en-US" sz="2000" dirty="0" smtClean="0"/>
-              <a:t>:</a:t>
-            </a:r>
-          </a:p>
-          <a:p>
-            <a:endParaRPr lang="en-US" sz="2000" dirty="0" smtClean="0"/>
-          </a:p>
-          <a:p>
-            <a:endParaRPr lang="en-US" sz="2000" dirty="0" smtClean="0"/>
-          </a:p>
-          <a:p>
-            <a:endParaRPr lang="en-US" sz="2000" dirty="0" smtClean="0"/>
-          </a:p>
-          <a:p>
-            <a:endParaRPr lang="en-US" sz="2000" dirty="0" smtClean="0"/>
-          </a:p>
-          <a:p>
-            <a:endParaRPr lang="en-US" sz="2000" dirty="0" smtClean="0"/>
-          </a:p>
-          <a:p>
-            <a:endParaRPr lang="en-US" sz="2000" dirty="0" smtClean="0"/>
-          </a:p>
-          <a:p>
-            <a:pPr>
-              <a:buNone/>
-            </a:pPr>
-            <a:r>
-              <a:rPr lang="en-US" sz="2000" dirty="0" smtClean="0"/>
-              <a:t>	        - </a:t>
-            </a:r>
-            <a:r>
-              <a:rPr lang="en-US" sz="1600" dirty="0" smtClean="0"/>
-              <a:t>In fact</a:t>
-            </a:r>
-            <a:r>
-              <a:rPr lang="en-US" sz="2000" dirty="0" smtClean="0"/>
-              <a:t> </a:t>
-            </a:r>
-            <a:r>
-              <a:rPr lang="en-US" sz="1600" dirty="0" smtClean="0"/>
-              <a:t>represents a probability P((</a:t>
-            </a:r>
-            <a:r>
-              <a:rPr lang="en-US" sz="1600" dirty="0" err="1" smtClean="0"/>
-              <a:t>s’,a</a:t>
-            </a:r>
-            <a:r>
-              <a:rPr lang="en-US" sz="1600" dirty="0" smtClean="0"/>
-              <a:t>’) | (</a:t>
-            </a:r>
-            <a:r>
-              <a:rPr lang="en-US" sz="1600" dirty="0" err="1" smtClean="0"/>
-              <a:t>s,a</a:t>
-            </a:r>
-            <a:r>
-              <a:rPr lang="en-US" sz="1600" dirty="0" smtClean="0"/>
-              <a:t>))</a:t>
-            </a:r>
-          </a:p>
-          <a:p>
-            <a:pPr>
-              <a:buNone/>
-            </a:pPr>
-            <a:endParaRPr lang="en-US" sz="1600" dirty="0" smtClean="0"/>
-          </a:p>
-          <a:p>
-            <a:r>
-              <a:rPr lang="en-US" sz="2400" dirty="0" smtClean="0"/>
-              <a:t>To improve consistency between the approximated and the actual values:</a:t>
-            </a:r>
-            <a:r>
-              <a:rPr lang="en-US" sz="1800" dirty="0" smtClean="0"/>
-              <a:t> </a:t>
-            </a:r>
-          </a:p>
-          <a:p>
-            <a:pPr>
-              <a:buNone/>
-            </a:pPr>
-            <a:endParaRPr lang="en-US" sz="1600" dirty="0" smtClean="0"/>
-          </a:p>
-          <a:p>
-            <a:pPr>
-              <a:buNone/>
-            </a:pPr>
-            <a:endParaRPr lang="en-US" sz="2000" dirty="0"/>
-          </a:p>
-        </p:txBody>
-      </p:sp>
-      <p:sp>
-        <p:nvSpPr>
-          <p:cNvPr id="4" name="Date Placeholder 3"/>
-          <p:cNvSpPr>
-            <a:spLocks noGrp="1"/>
-          </p:cNvSpPr>
-          <p:nvPr>
-            <p:ph type="dt" sz="half" idx="10"/>
-          </p:nvPr>
-        </p:nvSpPr>
-        <p:spPr>
-          <a:xfrm>
-            <a:off x="0" y="6332538"/>
-            <a:ext cx="1008063" cy="365125"/>
-          </a:xfrm>
-          <a:prstGeom prst="rect">
-            <a:avLst/>
-          </a:prstGeom>
-        </p:spPr>
-        <p:txBody>
-          <a:bodyPr/>
-          <a:lstStyle/>
-          <a:p>
-            <a:fld id="{71A8F685-8706-447C-ADBE-376EAB5A8D5E}" type="datetime1">
-              <a:rPr lang="nl-BE" smtClean="0"/>
-              <a:pPr/>
-              <a:t>19/06/2014</a:t>
-            </a:fld>
-            <a:endParaRPr lang="nl-BE"/>
-          </a:p>
-        </p:txBody>
-      </p:sp>
-      <p:sp>
-        <p:nvSpPr>
-          <p:cNvPr id="5" name="Slide Number Placeholder 4"/>
-          <p:cNvSpPr>
-            <a:spLocks noGrp="1"/>
-          </p:cNvSpPr>
-          <p:nvPr>
-            <p:ph type="sldNum" sz="quarter" idx="11"/>
-          </p:nvPr>
-        </p:nvSpPr>
         <p:spPr/>
         <p:txBody>
           <a:bodyPr/>
           <a:lstStyle/>
           <a:p>
-            <a:fld id="{99447BFD-27A8-46CA-98C0-E2987161CF3F}" type="slidenum">
-              <a:rPr lang="nl-BE" smtClean="0"/>
-              <a:pPr/>
-              <a:t>29</a:t>
-            </a:fld>
-            <a:endParaRPr lang="nl-BE"/>
+            <a:pPr>
+              <a:buNone/>
+            </a:pPr>
+            <a:r>
+              <a:rPr lang="en-US" u="sng" dirty="0" smtClean="0"/>
+              <a:t>LSPI - strong points</a:t>
+            </a:r>
+            <a:r>
+              <a:rPr lang="en-US" dirty="0" smtClean="0"/>
+              <a:t>: </a:t>
+            </a:r>
+          </a:p>
+          <a:p>
+            <a:pPr>
+              <a:buNone/>
+            </a:pPr>
+            <a:endParaRPr lang="en-US" sz="2400" dirty="0" smtClean="0"/>
+          </a:p>
+          <a:p>
+            <a:r>
+              <a:rPr lang="en-US" sz="1800" dirty="0" smtClean="0"/>
+              <a:t>It converges faster than all other known algorithms, since the samples are used more efficiently.</a:t>
+            </a:r>
+          </a:p>
+          <a:p>
+            <a:endParaRPr lang="en-US" sz="1800" dirty="0" smtClean="0"/>
+          </a:p>
+          <a:p>
+            <a:r>
+              <a:rPr lang="en-US" sz="1800" dirty="0" smtClean="0"/>
+              <a:t>It does not require fine tuning of the initial parameters such as learning rate</a:t>
+            </a:r>
+          </a:p>
+          <a:p>
+            <a:endParaRPr lang="en-US" sz="1800" dirty="0" smtClean="0"/>
+          </a:p>
+          <a:p>
+            <a:r>
+              <a:rPr lang="en-US" sz="1800" dirty="0" smtClean="0"/>
+              <a:t>LSPI learns the weights of the linear functions and updates Q-values based on the most updated information regarding the features, while in other approaches agents make decisions directly based on Q-values, which may be outdated, depending on the network dynamics.</a:t>
+            </a:r>
+          </a:p>
+          <a:p>
+            <a:endParaRPr lang="en-US" sz="1800" dirty="0" smtClean="0"/>
+          </a:p>
+          <a:p>
+            <a:r>
+              <a:rPr lang="en-US" sz="1800" dirty="0" smtClean="0"/>
+              <a:t>The same set of samples is used to evaluate different policies</a:t>
+            </a:r>
           </a:p>
         </p:txBody>
       </p:sp>
-      <p:pic>
-        <p:nvPicPr>
-          <p:cNvPr id="7" name="Picture 6" descr="Matrice - Aproksimacije.jpg"/>
-          <p:cNvPicPr>
-            <a:picLocks noChangeAspect="1"/>
-          </p:cNvPicPr>
-          <p:nvPr/>
-        </p:nvPicPr>
-        <p:blipFill>
-          <a:blip r:embed="rId2" cstate="print"/>
-          <a:stretch>
-            <a:fillRect/>
-          </a:stretch>
-        </p:blipFill>
-        <p:spPr>
-          <a:xfrm>
-            <a:off x="1981200" y="1981200"/>
-            <a:ext cx="5290393" cy="1905000"/>
-          </a:xfrm>
-          <a:prstGeom prst="rect">
-            <a:avLst/>
-          </a:prstGeom>
-        </p:spPr>
-      </p:pic>
-      <p:pic>
-        <p:nvPicPr>
-          <p:cNvPr id="8" name="Picture 7" descr="Pphi.jpg"/>
-          <p:cNvPicPr>
-            <a:picLocks noChangeAspect="1"/>
-          </p:cNvPicPr>
-          <p:nvPr/>
-        </p:nvPicPr>
-        <p:blipFill>
-          <a:blip r:embed="rId3" cstate="print"/>
-          <a:stretch>
-            <a:fillRect/>
-          </a:stretch>
-        </p:blipFill>
-        <p:spPr>
-          <a:xfrm>
-            <a:off x="914400" y="3886200"/>
-            <a:ext cx="710032" cy="576064"/>
-          </a:xfrm>
-          <a:prstGeom prst="rect">
-            <a:avLst/>
-          </a:prstGeom>
-        </p:spPr>
-      </p:pic>
-      <p:pic>
-        <p:nvPicPr>
-          <p:cNvPr id="9" name="Picture 8" descr="Approx expectations.jpg"/>
-          <p:cNvPicPr>
-            <a:picLocks noChangeAspect="1"/>
-          </p:cNvPicPr>
-          <p:nvPr/>
-        </p:nvPicPr>
-        <p:blipFill>
-          <a:blip r:embed="rId4" cstate="print"/>
-          <a:stretch>
-            <a:fillRect/>
-          </a:stretch>
-        </p:blipFill>
-        <p:spPr>
-          <a:xfrm>
-            <a:off x="1752600" y="5410200"/>
-            <a:ext cx="5791200" cy="962025"/>
-          </a:xfrm>
-          <a:prstGeom prst="rect">
-            <a:avLst/>
-          </a:prstGeom>
-        </p:spPr>
-      </p:pic>
     </p:spTree>
   </p:cSld>
   <p:clrMapOvr>
@@ -8561,7 +8635,7 @@
         <p:spPr>
           <a:xfrm>
             <a:off x="1371600" y="5410200"/>
-            <a:ext cx="6957546" cy="923330"/>
+            <a:ext cx="6859442" cy="923330"/>
           </a:xfrm>
           <a:prstGeom prst="rect">
             <a:avLst/>
@@ -8576,7 +8650,11 @@
           <a:p>
             <a:r>
               <a:rPr lang="en-US" dirty="0" smtClean="0"/>
-              <a:t>Pretty soon, a typical household unit will be equipped with a number of </a:t>
+              <a:t>A typical household will (is) be </a:t>
+            </a:r>
+            <a:r>
+              <a:rPr lang="en-US" dirty="0" smtClean="0"/>
+              <a:t>equipped with a number of </a:t>
             </a:r>
           </a:p>
           <a:p>
@@ -8634,124 +8712,6 @@
           <a:bodyPr/>
           <a:lstStyle/>
           <a:p>
-            <a:pPr algn="ctr"/>
-            <a:r>
-              <a:rPr lang="en-US" dirty="0" smtClean="0"/>
-              <a:t>Least Squares Policy Iteration - LSPI</a:t>
-            </a:r>
-            <a:endParaRPr lang="en-US" dirty="0"/>
-          </a:p>
-        </p:txBody>
-      </p:sp>
-      <p:sp>
-        <p:nvSpPr>
-          <p:cNvPr id="3" name="Content Placeholder 2"/>
-          <p:cNvSpPr>
-            <a:spLocks noGrp="1"/>
-          </p:cNvSpPr>
-          <p:nvPr>
-            <p:ph idx="1"/>
-          </p:nvPr>
-        </p:nvSpPr>
-        <p:spPr/>
-        <p:txBody>
-          <a:bodyPr/>
-          <a:lstStyle/>
-          <a:p>
-            <a:pPr>
-              <a:buNone/>
-            </a:pPr>
-            <a:r>
-              <a:rPr lang="en-US" u="sng" dirty="0" smtClean="0"/>
-              <a:t>LSPI - strong points</a:t>
-            </a:r>
-            <a:r>
-              <a:rPr lang="en-US" dirty="0" smtClean="0"/>
-              <a:t>: </a:t>
-            </a:r>
-          </a:p>
-          <a:p>
-            <a:pPr>
-              <a:buNone/>
-            </a:pPr>
-            <a:endParaRPr lang="en-US" sz="2400" dirty="0" smtClean="0"/>
-          </a:p>
-          <a:p>
-            <a:r>
-              <a:rPr lang="en-US" sz="1800" dirty="0" smtClean="0"/>
-              <a:t>It converges faster than all other known algorithms, since the samples are used more efficiently.</a:t>
-            </a:r>
-          </a:p>
-          <a:p>
-            <a:endParaRPr lang="en-US" sz="1800" dirty="0" smtClean="0"/>
-          </a:p>
-          <a:p>
-            <a:r>
-              <a:rPr lang="en-US" sz="1800" dirty="0" smtClean="0"/>
-              <a:t>It does not require fine tuning of the initial parameters such as learning rate</a:t>
-            </a:r>
-          </a:p>
-          <a:p>
-            <a:endParaRPr lang="en-US" sz="1800" dirty="0" smtClean="0"/>
-          </a:p>
-          <a:p>
-            <a:r>
-              <a:rPr lang="en-US" sz="1800" dirty="0" smtClean="0"/>
-              <a:t>LSPI learns the weights of the linear functions and updates Q-values based on the most updated information regarding the features, while in other approaches agents make decisions directly based on Q-values, which may be outdated, depending on the network dynamics.</a:t>
-            </a:r>
-          </a:p>
-          <a:p>
-            <a:endParaRPr lang="en-US" sz="1800" dirty="0" smtClean="0"/>
-          </a:p>
-          <a:p>
-            <a:r>
-              <a:rPr lang="en-US" sz="1800" dirty="0" smtClean="0"/>
-              <a:t>The same set of samples is used to evaluate different policies</a:t>
-            </a:r>
-          </a:p>
-        </p:txBody>
-      </p:sp>
-    </p:spTree>
-  </p:cSld>
-  <p:clrMapOvr>
-    <a:masterClrMapping/>
-  </p:clrMapOvr>
-  <p:transition/>
-</p:sld>
-</file>
-
-<file path=ppt/slides/slide31.xml><?xml version="1.0" encoding="utf-8"?>
-<p:sld xmlns:a="http://schemas.openxmlformats.org/drawingml/2006/main" xmlns:r="http://schemas.openxmlformats.org/officeDocument/2006/relationships" xmlns:p="http://schemas.openxmlformats.org/presentationml/2006/main">
-  <p:cSld>
-    <p:spTree>
-      <p:nvGrpSpPr>
-        <p:cNvPr id="1" name=""/>
-        <p:cNvGrpSpPr/>
-        <p:nvPr/>
-      </p:nvGrpSpPr>
-      <p:grpSpPr>
-        <a:xfrm>
-          <a:off x="0" y="0"/>
-          <a:ext cx="0" cy="0"/>
-          <a:chOff x="0" y="0"/>
-          <a:chExt cx="0" cy="0"/>
-        </a:xfrm>
-      </p:grpSpPr>
-      <p:sp>
-        <p:nvSpPr>
-          <p:cNvPr id="2" name="Title 1"/>
-          <p:cNvSpPr>
-            <a:spLocks noGrp="1"/>
-          </p:cNvSpPr>
-          <p:nvPr>
-            <p:ph type="title"/>
-          </p:nvPr>
-        </p:nvSpPr>
-        <p:spPr/>
-        <p:txBody>
-          <a:bodyPr/>
-          <a:lstStyle/>
-          <a:p>
             <a:r>
               <a:rPr lang="en-US" dirty="0" smtClean="0"/>
               <a:t>Implementation	</a:t>
@@ -8926,7 +8886,23 @@
                   <a:srgbClr val="E72D00"/>
                 </a:solidFill>
               </a:rPr>
-              <a:t>Sub-net  B: temperature sensor nodes</a:t>
+              <a:t>Sub-net  B: </a:t>
+            </a:r>
+            <a:r>
+              <a:rPr lang="en-US" sz="1800" dirty="0" smtClean="0">
+                <a:solidFill>
+                  <a:srgbClr val="E72D00"/>
+                </a:solidFill>
+              </a:rPr>
+              <a:t>intrusion detection </a:t>
+            </a:r>
+            <a:r>
+              <a:rPr lang="en-US" sz="1800" dirty="0" smtClean="0">
+                <a:solidFill>
+                  <a:srgbClr val="E72D00"/>
+                </a:solidFill>
+              </a:rPr>
+              <a:t>sensor nodes</a:t>
             </a:r>
           </a:p>
           <a:p>
@@ -11116,7 +11092,7 @@
 </p:sld>
 </file>
 
-<file path=ppt/slides/slide32.xml><?xml version="1.0" encoding="utf-8"?>
+<file path=ppt/slides/slide31.xml><?xml version="1.0" encoding="utf-8"?>
 <p:sld xmlns:a="http://schemas.openxmlformats.org/drawingml/2006/main" xmlns:r="http://schemas.openxmlformats.org/officeDocument/2006/relationships" xmlns:p="http://schemas.openxmlformats.org/presentationml/2006/main">
   <p:cSld>
     <p:spTree>
@@ -11355,6 +11331,201 @@
 </p:sld>
 </file>
 
+<file path=ppt/slides/slide32.xml><?xml version="1.0" encoding="utf-8"?>
+<p:sld xmlns:a="http://schemas.openxmlformats.org/drawingml/2006/main" xmlns:r="http://schemas.openxmlformats.org/officeDocument/2006/relationships" xmlns:p="http://schemas.openxmlformats.org/presentationml/2006/main">
+  <p:cSld>
+    <p:spTree>
+      <p:nvGrpSpPr>
+        <p:cNvPr id="1" name=""/>
+        <p:cNvGrpSpPr/>
+        <p:nvPr/>
+      </p:nvGrpSpPr>
+      <p:grpSpPr>
+        <a:xfrm>
+          <a:off x="0" y="0"/>
+          <a:ext cx="0" cy="0"/>
+          <a:chOff x="0" y="0"/>
+          <a:chExt cx="0" cy="0"/>
+        </a:xfrm>
+      </p:grpSpPr>
+      <p:sp>
+        <p:nvSpPr>
+          <p:cNvPr id="2" name="Title 1"/>
+          <p:cNvSpPr>
+            <a:spLocks noGrp="1"/>
+          </p:cNvSpPr>
+          <p:nvPr>
+            <p:ph type="title"/>
+          </p:nvPr>
+        </p:nvSpPr>
+        <p:spPr/>
+        <p:txBody>
+          <a:bodyPr/>
+          <a:lstStyle/>
+          <a:p>
+            <a:r>
+              <a:rPr lang="en-US" dirty="0" smtClean="0"/>
+              <a:t>Implementation</a:t>
+            </a:r>
+            <a:endParaRPr lang="en-US" dirty="0"/>
+          </a:p>
+        </p:txBody>
+      </p:sp>
+      <p:sp>
+        <p:nvSpPr>
+          <p:cNvPr id="3" name="Content Placeholder 2"/>
+          <p:cNvSpPr>
+            <a:spLocks noGrp="1"/>
+          </p:cNvSpPr>
+          <p:nvPr>
+            <p:ph idx="1"/>
+          </p:nvPr>
+        </p:nvSpPr>
+        <p:spPr/>
+        <p:txBody>
+          <a:bodyPr>
+            <a:normAutofit lnSpcReduction="10000"/>
+          </a:bodyPr>
+          <a:lstStyle/>
+          <a:p>
+            <a:r>
+              <a:rPr lang="en-US" dirty="0" smtClean="0">
+                <a:cs typeface="Times New Roman" pitchFamily="18" charset="0"/>
+              </a:rPr>
+              <a:t>Two phase process: </a:t>
+            </a:r>
+            <a:endParaRPr lang="en-US" dirty="0" smtClean="0">
+              <a:cs typeface="Times New Roman" pitchFamily="18" charset="0"/>
+            </a:endParaRPr>
+          </a:p>
+          <a:p>
+            <a:endParaRPr lang="en-US" dirty="0" smtClean="0">
+              <a:cs typeface="Times New Roman" pitchFamily="18" charset="0"/>
+            </a:endParaRPr>
+          </a:p>
+          <a:p>
+            <a:pPr lvl="1"/>
+            <a:r>
+              <a:rPr lang="en-US" dirty="0" smtClean="0">
+                <a:cs typeface="Times New Roman" pitchFamily="18" charset="0"/>
+              </a:rPr>
+              <a:t> </a:t>
+            </a:r>
+            <a:r>
+              <a:rPr lang="en-US" b="1" dirty="0" smtClean="0">
+                <a:cs typeface="Times New Roman" pitchFamily="18" charset="0"/>
+              </a:rPr>
+              <a:t>Exploration</a:t>
+            </a:r>
+            <a:r>
+              <a:rPr lang="en-US" dirty="0" smtClean="0">
+                <a:cs typeface="Times New Roman" pitchFamily="18" charset="0"/>
+              </a:rPr>
+              <a:t> phase – </a:t>
+            </a:r>
+            <a:r>
+              <a:rPr lang="en-US" b="0" dirty="0" smtClean="0">
+                <a:cs typeface="Times New Roman" pitchFamily="18" charset="0"/>
+              </a:rPr>
+              <a:t>Exhaustive search through the state problem space, investigating every service </a:t>
+            </a:r>
+            <a:r>
+              <a:rPr lang="en-US" b="0" dirty="0" smtClean="0">
+                <a:cs typeface="Times New Roman" pitchFamily="18" charset="0"/>
+              </a:rPr>
+              <a:t>combination</a:t>
+            </a:r>
+          </a:p>
+          <a:p>
+            <a:pPr lvl="1"/>
+            <a:endParaRPr lang="en-US" b="0" dirty="0" smtClean="0">
+              <a:cs typeface="Times New Roman" pitchFamily="18" charset="0"/>
+            </a:endParaRPr>
+          </a:p>
+          <a:p>
+            <a:pPr lvl="1"/>
+            <a:r>
+              <a:rPr lang="en-US" dirty="0" smtClean="0">
+                <a:cs typeface="Times New Roman" pitchFamily="18" charset="0"/>
+              </a:rPr>
+              <a:t> </a:t>
+            </a:r>
+            <a:r>
+              <a:rPr lang="en-US" b="1" dirty="0" smtClean="0">
+                <a:cs typeface="Times New Roman" pitchFamily="18" charset="0"/>
+              </a:rPr>
+              <a:t>Exploitation</a:t>
+            </a:r>
+            <a:r>
+              <a:rPr lang="en-US" dirty="0" smtClean="0">
+                <a:cs typeface="Times New Roman" pitchFamily="18" charset="0"/>
+              </a:rPr>
+              <a:t> phase – </a:t>
+            </a:r>
+            <a:r>
+              <a:rPr lang="en-US" b="0" dirty="0" smtClean="0">
+                <a:cs typeface="Times New Roman" pitchFamily="18" charset="0"/>
+              </a:rPr>
+              <a:t>use “Epsilon greedy” algorithm to enforce optimal decisions, while staying versatile to adapt to possible network condition changes</a:t>
+            </a:r>
+            <a:endParaRPr lang="en-US" b="0" dirty="0">
+              <a:cs typeface="Times New Roman" pitchFamily="18" charset="0"/>
+            </a:endParaRPr>
+          </a:p>
+        </p:txBody>
+      </p:sp>
+      <p:sp>
+        <p:nvSpPr>
+          <p:cNvPr id="4" name="Slide Number Placeholder 3"/>
+          <p:cNvSpPr>
+            <a:spLocks noGrp="1"/>
+          </p:cNvSpPr>
+          <p:nvPr>
+            <p:ph type="sldNum" sz="quarter" idx="11"/>
+          </p:nvPr>
+        </p:nvSpPr>
+        <p:spPr/>
+        <p:txBody>
+          <a:bodyPr/>
+          <a:lstStyle/>
+          <a:p>
+            <a:pPr>
+              <a:defRPr/>
+            </a:pPr>
+            <a:fld id="{754A60F7-74A3-481B-8EFE-A8A39D7A3B96}" type="slidenum">
+              <a:rPr lang="en-US" smtClean="0">
+                <a:solidFill>
+                  <a:srgbClr val="000000"/>
+                </a:solidFill>
+              </a:rPr>
+              <a:pPr>
+                <a:defRPr/>
+              </a:pPr>
+              <a:t>32</a:t>
+            </a:fld>
+            <a:endParaRPr lang="en-US" dirty="0">
+              <a:solidFill>
+                <a:srgbClr val="000000"/>
+              </a:solidFill>
+            </a:endParaRPr>
+          </a:p>
+        </p:txBody>
+      </p:sp>
+    </p:spTree>
+  </p:cSld>
+  <p:clrMapOvr>
+    <a:masterClrMapping/>
+  </p:clrMapOvr>
+  <p:timing>
+    <p:tnLst>
+      <p:par>
+        <p:cTn id="1" dur="indefinite" restart="never" nodeType="tmRoot"/>
+      </p:par>
+    </p:tnLst>
+  </p:timing>
+</p:sld>
+</file>
+
 <file path=ppt/slides/slide33.xml><?xml version="1.0" encoding="utf-8"?>
 <p:sld xmlns:a="http://schemas.openxmlformats.org/drawingml/2006/main" xmlns:r="http://schemas.openxmlformats.org/officeDocument/2006/relationships" xmlns:p="http://schemas.openxmlformats.org/presentationml/2006/main">
   <p:cSld>
@@ -11405,186 +11576,6 @@
             <p:ph idx="1"/>
           </p:nvPr>
         </p:nvSpPr>
-        <p:spPr/>
-        <p:txBody>
-          <a:bodyPr>
-            <a:normAutofit/>
-          </a:bodyPr>
-          <a:lstStyle/>
-          <a:p>
-            <a:r>
-              <a:rPr lang="en-US" dirty="0" smtClean="0">
-                <a:cs typeface="Times New Roman" pitchFamily="18" charset="0"/>
-              </a:rPr>
-              <a:t>Two phase process: </a:t>
-            </a:r>
-          </a:p>
-          <a:p>
-            <a:endParaRPr lang="en-US" dirty="0" smtClean="0">
-              <a:cs typeface="Times New Roman" pitchFamily="18" charset="0"/>
-            </a:endParaRPr>
-          </a:p>
-          <a:p>
-            <a:pPr lvl="1"/>
-            <a:r>
-              <a:rPr lang="en-US" dirty="0" smtClean="0">
-                <a:cs typeface="Times New Roman" pitchFamily="18" charset="0"/>
-              </a:rPr>
-              <a:t> </a:t>
-            </a:r>
-            <a:r>
-              <a:rPr lang="en-US" b="1" dirty="0" smtClean="0">
-                <a:cs typeface="Times New Roman" pitchFamily="18" charset="0"/>
-              </a:rPr>
-              <a:t>Exploration</a:t>
-            </a:r>
-            <a:r>
-              <a:rPr lang="en-US" dirty="0" smtClean="0">
-                <a:cs typeface="Times New Roman" pitchFamily="18" charset="0"/>
-              </a:rPr>
-              <a:t> phase – </a:t>
-            </a:r>
-            <a:r>
-              <a:rPr lang="en-US" b="0" dirty="0" smtClean="0">
-                <a:cs typeface="Times New Roman" pitchFamily="18" charset="0"/>
-              </a:rPr>
-              <a:t>Exhaustive search through the state problem space, investigating every service combination</a:t>
-            </a:r>
-          </a:p>
-          <a:p>
-            <a:pPr lvl="1"/>
-            <a:r>
-              <a:rPr lang="en-US" dirty="0" smtClean="0">
-                <a:cs typeface="Times New Roman" pitchFamily="18" charset="0"/>
-              </a:rPr>
-              <a:t> </a:t>
-            </a:r>
-            <a:r>
-              <a:rPr lang="en-US" b="1" dirty="0" smtClean="0">
-                <a:cs typeface="Times New Roman" pitchFamily="18" charset="0"/>
-              </a:rPr>
-              <a:t>Exploitation</a:t>
-            </a:r>
-            <a:r>
-              <a:rPr lang="en-US" dirty="0" smtClean="0">
-                <a:cs typeface="Times New Roman" pitchFamily="18" charset="0"/>
-              </a:rPr>
-              <a:t> phase – </a:t>
-            </a:r>
-            <a:r>
-              <a:rPr lang="en-US" b="0" dirty="0" smtClean="0">
-                <a:cs typeface="Times New Roman" pitchFamily="18" charset="0"/>
-              </a:rPr>
-              <a:t>use “Epsilon greedy” algorithm to enforce optimal decisions, while staying versatile to adapt to possible network condition changes</a:t>
-            </a:r>
-            <a:endParaRPr lang="en-US" b="0" dirty="0">
-              <a:cs typeface="Times New Roman" pitchFamily="18" charset="0"/>
-            </a:endParaRPr>
-          </a:p>
-        </p:txBody>
-      </p:sp>
-      <p:sp>
-        <p:nvSpPr>
-          <p:cNvPr id="4" name="Slide Number Placeholder 3"/>
-          <p:cNvSpPr>
-            <a:spLocks noGrp="1"/>
-          </p:cNvSpPr>
-          <p:nvPr>
-            <p:ph type="sldNum" sz="quarter" idx="11"/>
-          </p:nvPr>
-        </p:nvSpPr>
-        <p:spPr/>
-        <p:txBody>
-          <a:bodyPr/>
-          <a:lstStyle/>
-          <a:p>
-            <a:pPr>
-              <a:defRPr/>
-            </a:pPr>
-            <a:fld id="{754A60F7-74A3-481B-8EFE-A8A39D7A3B96}" type="slidenum">
-              <a:rPr lang="en-US" smtClean="0">
-                <a:solidFill>
-                  <a:srgbClr val="000000"/>
-                </a:solidFill>
-              </a:rPr>
-              <a:pPr>
-                <a:defRPr/>
-              </a:pPr>
-              <a:t>33</a:t>
-            </a:fld>
-            <a:endParaRPr lang="en-US" dirty="0">
-              <a:solidFill>
-                <a:srgbClr val="000000"/>
-              </a:solidFill>
-            </a:endParaRPr>
-          </a:p>
-        </p:txBody>
-      </p:sp>
-    </p:spTree>
-  </p:cSld>
-  <p:clrMapOvr>
-    <a:masterClrMapping/>
-  </p:clrMapOvr>
-  <p:timing>
-    <p:tnLst>
-      <p:par>
-        <p:cTn id="1" dur="indefinite" restart="never" nodeType="tmRoot"/>
-      </p:par>
-    </p:tnLst>
-  </p:timing>
-</p:sld>
-</file>
-
-<file path=ppt/slides/slide34.xml><?xml version="1.0" encoding="utf-8"?>
-<p:sld xmlns:a="http://schemas.openxmlformats.org/drawingml/2006/main" xmlns:r="http://schemas.openxmlformats.org/officeDocument/2006/relationships" xmlns:p="http://schemas.openxmlformats.org/presentationml/2006/main">
-  <p:cSld>
-    <p:spTree>
-      <p:nvGrpSpPr>
-        <p:cNvPr id="1" name=""/>
-        <p:cNvGrpSpPr/>
-        <p:nvPr/>
-      </p:nvGrpSpPr>
-      <p:grpSpPr>
-        <a:xfrm>
-          <a:off x="0" y="0"/>
-          <a:ext cx="0" cy="0"/>
-          <a:chOff x="0" y="0"/>
-          <a:chExt cx="0" cy="0"/>
-        </a:xfrm>
-      </p:grpSpPr>
-      <p:sp>
-        <p:nvSpPr>
-          <p:cNvPr id="2" name="Title 1"/>
-          <p:cNvSpPr>
-            <a:spLocks noGrp="1"/>
-          </p:cNvSpPr>
-          <p:nvPr>
-            <p:ph type="title"/>
-          </p:nvPr>
-        </p:nvSpPr>
-        <p:spPr/>
-        <p:txBody>
-          <a:bodyPr/>
-          <a:lstStyle/>
-          <a:p>
-            <a:r>
-              <a:rPr lang="en-US" dirty="0" smtClean="0"/>
-              <a:t>Implementation</a:t>
-            </a:r>
-            <a:endParaRPr lang="en-US" dirty="0"/>
-          </a:p>
-        </p:txBody>
-      </p:sp>
-      <p:sp>
-        <p:nvSpPr>
-          <p:cNvPr id="3" name="Content Placeholder 2"/>
-          <p:cNvSpPr>
-            <a:spLocks noGrp="1"/>
-          </p:cNvSpPr>
-          <p:nvPr>
-            <p:ph idx="1"/>
-          </p:nvPr>
-        </p:nvSpPr>
         <p:spPr>
           <a:xfrm>
             <a:off x="457200" y="1447800"/>
@@ -11604,9 +11595,17 @@
           </a:p>
           <a:p>
             <a:pPr lvl="1"/>
+            <a:endParaRPr lang="en-US" sz="1800" dirty="0" smtClean="0"/>
+          </a:p>
+          <a:p>
+            <a:pPr lvl="1"/>
             <a:r>
               <a:rPr lang="en-US" sz="1800" dirty="0" smtClean="0"/>
-              <a:t>Collect the information about </a:t>
+              <a:t>Collect </a:t>
+            </a:r>
+            <a:r>
+              <a:rPr lang="en-US" sz="1800" dirty="0" smtClean="0"/>
+              <a:t>the information about </a:t>
             </a:r>
           </a:p>
           <a:p>
@@ -11615,24 +11614,17 @@
             </a:pPr>
             <a:r>
               <a:rPr lang="en-US" sz="1800" dirty="0" smtClean="0"/>
-              <a:t>every state/action pair, using the</a:t>
+              <a:t>every state/action </a:t>
+            </a:r>
+            <a:r>
+              <a:rPr lang="en-US" sz="1800" dirty="0" smtClean="0"/>
+              <a:t>pair</a:t>
             </a:r>
           </a:p>
           <a:p>
             <a:pPr lvl="1">
               <a:buNone/>
             </a:pPr>
-            <a:r>
-              <a:rPr lang="en-US" sz="1800" dirty="0" err="1" smtClean="0"/>
-              <a:t>memoryless</a:t>
-            </a:r>
-            <a:r>
-              <a:rPr lang="en-US" sz="1800" dirty="0" smtClean="0"/>
-              <a:t> property of the MDP</a:t>
-            </a:r>
-          </a:p>
-          <a:p>
-            <a:pPr lvl="1"/>
             <a:endParaRPr lang="en-US" sz="1800" dirty="0" smtClean="0"/>
           </a:p>
           <a:p>
@@ -11706,6 +11698,112 @@
 </p:sld>
 </file>
 
+<file path=ppt/slides/slide34.xml><?xml version="1.0" encoding="utf-8"?>
+<p:sld xmlns:a="http://schemas.openxmlformats.org/drawingml/2006/main" xmlns:r="http://schemas.openxmlformats.org/officeDocument/2006/relationships" xmlns:p="http://schemas.openxmlformats.org/presentationml/2006/main">
+  <p:cSld>
+    <p:spTree>
+      <p:nvGrpSpPr>
+        <p:cNvPr id="1" name=""/>
+        <p:cNvGrpSpPr/>
+        <p:nvPr/>
+      </p:nvGrpSpPr>
+      <p:grpSpPr>
+        <a:xfrm>
+          <a:off x="0" y="0"/>
+          <a:ext cx="0" cy="0"/>
+          <a:chOff x="0" y="0"/>
+          <a:chExt cx="0" cy="0"/>
+        </a:xfrm>
+      </p:grpSpPr>
+      <p:sp>
+        <p:nvSpPr>
+          <p:cNvPr id="2" name="Title 1"/>
+          <p:cNvSpPr>
+            <a:spLocks noGrp="1"/>
+          </p:cNvSpPr>
+          <p:nvPr>
+            <p:ph type="title"/>
+          </p:nvPr>
+        </p:nvSpPr>
+        <p:spPr/>
+        <p:txBody>
+          <a:bodyPr/>
+          <a:lstStyle/>
+          <a:p>
+            <a:r>
+              <a:rPr lang="en-US" dirty="0" smtClean="0"/>
+              <a:t>Implementation</a:t>
+            </a:r>
+            <a:endParaRPr lang="en-US" dirty="0"/>
+          </a:p>
+        </p:txBody>
+      </p:sp>
+      <p:sp>
+        <p:nvSpPr>
+          <p:cNvPr id="3" name="Content Placeholder 2"/>
+          <p:cNvSpPr>
+            <a:spLocks noGrp="1"/>
+          </p:cNvSpPr>
+          <p:nvPr>
+            <p:ph idx="1"/>
+          </p:nvPr>
+        </p:nvSpPr>
+        <p:spPr/>
+        <p:txBody>
+          <a:bodyPr/>
+          <a:lstStyle/>
+          <a:p>
+            <a:r>
+              <a:rPr lang="en-US" dirty="0" smtClean="0"/>
+              <a:t>Exploitation phase:</a:t>
+            </a:r>
+          </a:p>
+          <a:p>
+            <a:pPr lvl="1"/>
+            <a:r>
+              <a:rPr lang="en-US" sz="2000" dirty="0" smtClean="0"/>
+              <a:t>Percentage of the number of episodes that system have spent in each state during a particular experimental run. Each run is characterized by a different value of the “epsilon” </a:t>
+            </a:r>
+            <a:r>
+              <a:rPr lang="pt-BR" sz="2000" dirty="0" smtClean="0"/>
+              <a:t>factor = (0.9, 0.7, 0.4, 0.1).</a:t>
+            </a:r>
+            <a:endParaRPr lang="en-US" sz="2000" dirty="0" smtClean="0"/>
+          </a:p>
+        </p:txBody>
+      </p:sp>
+      <p:pic>
+        <p:nvPicPr>
+          <p:cNvPr id="4" name="Picture 3" descr="Exploitation phase - greedy.jpg"/>
+          <p:cNvPicPr>
+            <a:picLocks noChangeAspect="1"/>
+          </p:cNvPicPr>
+          <p:nvPr/>
+        </p:nvPicPr>
+        <p:blipFill>
+          <a:blip r:embed="rId2" cstate="print"/>
+          <a:stretch>
+            <a:fillRect/>
+          </a:stretch>
+        </p:blipFill>
+        <p:spPr>
+          <a:xfrm>
+            <a:off x="1066800" y="3657600"/>
+            <a:ext cx="7271657" cy="1676400"/>
+          </a:xfrm>
+          <a:prstGeom prst="rect">
+            <a:avLst/>
+          </a:prstGeom>
+        </p:spPr>
+      </p:pic>
+    </p:spTree>
+  </p:cSld>
+  <p:clrMapOvr>
+    <a:masterClrMapping/>
+  </p:clrMapOvr>
+</p:sld>
+</file>
+
 <file path=ppt/slides/slide35.xml><?xml version="1.0" encoding="utf-8"?>
 <p:sld xmlns:a="http://schemas.openxmlformats.org/drawingml/2006/main" xmlns:r="http://schemas.openxmlformats.org/officeDocument/2006/relationships" xmlns:p="http://schemas.openxmlformats.org/presentationml/2006/main">
   <p:cSld>
@@ -11756,33 +11854,37 @@
             <p:ph idx="1"/>
           </p:nvPr>
         </p:nvSpPr>
-        <p:spPr/>
+        <p:spPr>
+          <a:xfrm>
+            <a:off x="457200" y="1371600"/>
+            <a:ext cx="8229600" cy="4525963"/>
+          </a:xfrm>
+        </p:spPr>
         <p:txBody>
           <a:bodyPr/>
           <a:lstStyle/>
           <a:p>
             <a:r>
               <a:rPr lang="en-US" dirty="0" smtClean="0"/>
-              <a:t>Exploitation phase:</a:t>
+              <a:t>The “worst case” scenario:</a:t>
             </a:r>
           </a:p>
           <a:p>
             <a:pPr lvl="1"/>
             <a:r>
               <a:rPr lang="en-US" sz="2000" dirty="0" smtClean="0"/>
-              <a:t>Percentage of the number of episodes that system have spent in each state during a particular experimental run. Each run is characterized by a different value of the “epsilon” </a:t>
-            </a:r>
-            <a:r>
-              <a:rPr lang="pt-BR" sz="2000" dirty="0" smtClean="0"/>
-              <a:t>factor = (0.9, 0.7, 0.4, 0.1).</a:t>
-            </a:r>
-            <a:endParaRPr lang="en-US" sz="2000" dirty="0" smtClean="0"/>
+              <a:t>The optimal and the worst performing service combinations switch performances (not highly probable – for a demonstration purpose only)</a:t>
+            </a:r>
+          </a:p>
+          <a:p>
+            <a:pPr lvl="1"/>
+            <a:endParaRPr lang="en-US" dirty="0"/>
           </a:p>
         </p:txBody>
       </p:sp>
       <p:pic>
         <p:nvPicPr>
-          <p:cNvPr id="4" name="Picture 3" descr="Exploitation phase - greedy.jpg"/>
+          <p:cNvPr id="4" name="Picture 3" descr="Condition change - GREEDY.jpg"/>
           <p:cNvPicPr>
             <a:picLocks noChangeAspect="1"/>
           </p:cNvPicPr>
@@ -11796,8 +11898,8 @@
         </p:blipFill>
         <p:spPr>
           <a:xfrm>
-            <a:off x="1066800" y="3657600"/>
-            <a:ext cx="7271657" cy="1676400"/>
+            <a:off x="2286000" y="3048000"/>
+            <a:ext cx="5029200" cy="3569802"/>
           </a:xfrm>
           <a:prstGeom prst="rect">
             <a:avLst/>
@@ -11846,7 +11948,7 @@
           <a:p>
             <a:r>
               <a:rPr lang="en-US" dirty="0" smtClean="0"/>
-              <a:t>Implementation</a:t>
+              <a:t>Open issues</a:t>
             </a:r>
             <a:endParaRPr lang="en-US" dirty="0"/>
           </a:p>
@@ -11862,58 +11964,56 @@
             <p:ph idx="1"/>
           </p:nvPr>
         </p:nvSpPr>
-        <p:spPr>
-          <a:xfrm>
-            <a:off x="457200" y="1371600"/>
-            <a:ext cx="8229600" cy="4525963"/>
-          </a:xfrm>
-        </p:spPr>
+        <p:spPr/>
         <p:txBody>
-          <a:bodyPr/>
+          <a:bodyPr>
+            <a:normAutofit lnSpcReduction="10000"/>
+          </a:bodyPr>
           <a:lstStyle/>
           <a:p>
             <a:r>
               <a:rPr lang="en-US" dirty="0" smtClean="0"/>
-              <a:t>The “worst case” scenario:</a:t>
+              <a:t>To find an optimal value for the “epsilon” factor: </a:t>
             </a:r>
           </a:p>
           <a:p>
             <a:pPr lvl="1"/>
             <a:r>
-              <a:rPr lang="en-US" sz="2000" dirty="0" smtClean="0"/>
-              <a:t>The optimal and the worst performing service combinations switch performances (not highly probable – for a demonstration purpose only)</a:t>
+              <a:rPr lang="en-US" sz="2400" dirty="0" smtClean="0"/>
+              <a:t>forcing the optimal service combination vs. versatility to condition changes</a:t>
+            </a:r>
+          </a:p>
+          <a:p>
+            <a:endParaRPr lang="en-US" dirty="0" smtClean="0"/>
+          </a:p>
+          <a:p>
+            <a:r>
+              <a:rPr lang="en-US" dirty="0" smtClean="0"/>
+              <a:t>Scalability of the algorithm:</a:t>
             </a:r>
           </a:p>
           <a:p>
             <a:pPr lvl="1"/>
+            <a:r>
+              <a:rPr lang="en-US" sz="2400" dirty="0" smtClean="0"/>
+              <a:t>emphasize on an exploration phase</a:t>
+            </a:r>
+            <a:endParaRPr lang="en-US" sz="3200" dirty="0" smtClean="0"/>
+          </a:p>
+          <a:p>
+            <a:endParaRPr lang="en-US" dirty="0" smtClean="0"/>
+          </a:p>
+          <a:p>
+            <a:r>
+              <a:rPr lang="en-US" dirty="0" smtClean="0"/>
+              <a:t>Stopping rules</a:t>
+            </a:r>
+          </a:p>
+          <a:p>
             <a:endParaRPr lang="en-US" dirty="0"/>
           </a:p>
         </p:txBody>
       </p:sp>
-      <p:pic>
-        <p:nvPicPr>
-          <p:cNvPr id="4" name="Picture 3" descr="Condition change - GREEDY.jpg"/>
-          <p:cNvPicPr>
-            <a:picLocks noChangeAspect="1"/>
-          </p:cNvPicPr>
-          <p:nvPr/>
-        </p:nvPicPr>
-        <p:blipFill>
-          <a:blip r:embed="rId2" cstate="print"/>
-          <a:stretch>
-            <a:fillRect/>
-          </a:stretch>
-        </p:blipFill>
-        <p:spPr>
-          <a:xfrm>
-            <a:off x="2286000" y="3048000"/>
-            <a:ext cx="5029200" cy="3569802"/>
-          </a:xfrm>
-          <a:prstGeom prst="rect">
-            <a:avLst/>
-          </a:prstGeom>
-        </p:spPr>
-      </p:pic>
     </p:spTree>
   </p:cSld>
   <p:clrMapOvr>
@@ -11951,12 +12051,18 @@
         </p:nvSpPr>
         <p:spPr/>
         <p:txBody>
-          <a:bodyPr/>
+          <a:bodyPr>
+            <a:normAutofit fontScale="90000"/>
+          </a:bodyPr>
           <a:lstStyle/>
           <a:p>
             <a:r>
               <a:rPr lang="en-US" dirty="0" smtClean="0"/>
-              <a:t>Open issues</a:t>
+              <a:t>Implementation – </a:t>
+            </a:r>
+            <a:r>
+              <a:rPr lang="en-US" sz="3600" dirty="0" smtClean="0"/>
+              <a:t>a more complex use case</a:t>
             </a:r>
             <a:endParaRPr lang="en-US" dirty="0"/>
           </a:p>
@@ -11972,49 +12078,81 @@
             <p:ph idx="1"/>
           </p:nvPr>
         </p:nvSpPr>
-        <p:spPr/>
+        <p:spPr>
+          <a:xfrm>
+            <a:off x="457200" y="1600200"/>
+            <a:ext cx="8229600" cy="5029200"/>
+          </a:xfrm>
+        </p:spPr>
         <p:txBody>
           <a:bodyPr>
-            <a:normAutofit lnSpcReduction="10000"/>
+            <a:normAutofit/>
           </a:bodyPr>
           <a:lstStyle/>
           <a:p>
             <a:r>
-              <a:rPr lang="en-US" dirty="0" smtClean="0"/>
-              <a:t>To find an optimal value for the “epsilon” factor: </a:t>
-            </a:r>
-          </a:p>
-          <a:p>
-            <a:pPr lvl="1"/>
-            <a:r>
               <a:rPr lang="en-US" sz="2400" dirty="0" smtClean="0"/>
-              <a:t>forcing the optimal service combination vs. versatility to condition changes</a:t>
-            </a:r>
-          </a:p>
-          <a:p>
-            <a:endParaRPr lang="en-US" dirty="0" smtClean="0"/>
-          </a:p>
-          <a:p>
-            <a:r>
-              <a:rPr lang="en-US" dirty="0" smtClean="0"/>
-              <a:t>Scalability of the algorithm:</a:t>
-            </a:r>
-          </a:p>
-          <a:p>
-            <a:pPr lvl="1"/>
+              <a:t>16 experimental service combinations (</a:t>
+            </a:r>
+            <a:r>
+              <a:rPr lang="en-US" sz="2400" dirty="0" err="1" smtClean="0"/>
+              <a:t>e.g</a:t>
+            </a:r>
             <a:r>
               <a:rPr lang="en-US" sz="2400" dirty="0" smtClean="0"/>
-              <a:t>emphasize on an exploration phase</a:t>
-            </a:r>
-            <a:endParaRPr lang="en-US" sz="3200" dirty="0" smtClean="0"/>
-          </a:p>
-          <a:p>
-            <a:endParaRPr lang="en-US" dirty="0" smtClean="0"/>
-          </a:p>
-          <a:p>
-            <a:r>
-              <a:rPr lang="en-US" dirty="0" smtClean="0"/>
-              <a:t>Stopping rules</a:t>
+              <a:t> A, CD, ABD …)</a:t>
+            </a:r>
+          </a:p>
+          <a:p>
+            <a:r>
+              <a:rPr lang="en-US" sz="2400" dirty="0" smtClean="0"/>
+              <a:t> Pre-estimated influences for each combination</a:t>
+            </a:r>
+          </a:p>
+          <a:p>
+            <a:r>
+              <a:rPr lang="en-US" sz="2400" dirty="0" smtClean="0"/>
+              <a:t>16 actions available at every state</a:t>
+            </a:r>
+          </a:p>
+          <a:p>
+            <a:endParaRPr lang="en-US" sz="2400" dirty="0" smtClean="0"/>
+          </a:p>
+          <a:p>
+            <a:endParaRPr lang="en-US" sz="2400" dirty="0" smtClean="0"/>
+          </a:p>
+          <a:p>
+            <a:endParaRPr lang="en-US" sz="2400" dirty="0" smtClean="0"/>
+          </a:p>
+          <a:p>
+            <a:endParaRPr lang="en-US" sz="2400" dirty="0" smtClean="0"/>
+          </a:p>
+          <a:p>
+            <a:endParaRPr lang="en-US" sz="2400" dirty="0" smtClean="0"/>
+          </a:p>
+          <a:p>
+            <a:endParaRPr lang="en-US" sz="2400" dirty="0" smtClean="0"/>
+          </a:p>
+          <a:p>
+            <a:r>
+              <a:rPr lang="en-US" sz="2400" dirty="0" smtClean="0"/>
+              <a:t>One basis function per incentive – Phi</a:t>
+            </a:r>
+            <a:r>
+              <a:rPr lang="en-US" sz="1800" dirty="0" smtClean="0"/>
+              <a:t>1</a:t>
+            </a:r>
+            <a:r>
+              <a:rPr lang="en-US" sz="2400" dirty="0" smtClean="0"/>
+              <a:t>, Phi</a:t>
+            </a:r>
+            <a:r>
+              <a:rPr lang="en-US" sz="1800" dirty="0" smtClean="0"/>
+              <a:t>2</a:t>
+            </a:r>
+            <a:r>
+              <a:rPr lang="en-US" sz="2400" dirty="0" smtClean="0"/>
+              <a:t> (e.g. end-to-end delay, average number of re-transmissions)</a:t>
             </a:r>
           </a:p>
           <a:p>
@@ -12022,6 +12160,30 @@
           </a:p>
         </p:txBody>
       </p:sp>
+      <p:pic>
+        <p:nvPicPr>
+          <p:cNvPr id="4" name="Picture 3" descr="Actions.png"/>
+          <p:cNvPicPr>
+            <a:picLocks noChangeAspect="1"/>
+          </p:cNvPicPr>
+          <p:nvPr/>
+        </p:nvPicPr>
+        <p:blipFill>
+          <a:blip r:embed="rId2" cstate="print"/>
+          <a:stretch>
+            <a:fillRect/>
+          </a:stretch>
+        </p:blipFill>
+        <p:spPr>
+          <a:xfrm>
+            <a:off x="3276600" y="2819400"/>
+            <a:ext cx="2511692" cy="2590800"/>
+          </a:xfrm>
+          <a:prstGeom prst="rect">
+            <a:avLst/>
+          </a:prstGeom>
+        </p:spPr>
+      </p:pic>
     </p:spTree>
   </p:cSld>
   <p:clrMapOvr>
@@ -12086,12 +12248,7 @@
             <p:ph idx="1"/>
           </p:nvPr>
         </p:nvSpPr>
-        <p:spPr>
-          <a:xfrm>
-            <a:off x="457200" y="1600200"/>
-            <a:ext cx="8229600" cy="5029200"/>
-          </a:xfrm>
-        </p:spPr>
+        <p:spPr/>
         <p:txBody>
           <a:bodyPr>
             <a:normAutofit/>
@@ -12099,78 +12256,52 @@
           <a:lstStyle/>
           <a:p>
             <a:r>
+              <a:rPr lang="en-US" dirty="0" smtClean="0"/>
+              <a:t>Exploration phase:</a:t>
+            </a:r>
+          </a:p>
+          <a:p>
+            <a:pPr>
+              <a:buFontTx/>
+              <a:buChar char="-"/>
+            </a:pPr>
+            <a:r>
               <a:rPr lang="en-US" sz="2400" dirty="0" smtClean="0"/>
-              <a:t>16 experimental service combinations (</a:t>
-            </a:r>
-            <a:r>
-              <a:rPr lang="en-US" sz="2400" dirty="0" err="1" smtClean="0"/>
-              <a:t>e.g</a:t>
+              <a:t>Calculate the initial set of weights (</a:t>
+            </a:r>
+            <a:r>
+              <a:rPr lang="el-GR" sz="2400" dirty="0" smtClean="0"/>
+              <a:t>ω</a:t>
             </a:r>
             <a:r>
               <a:rPr lang="en-US" sz="2400" dirty="0" smtClean="0"/>
-              <a:t> A, CD, ABD …)</a:t>
-            </a:r>
-          </a:p>
-          <a:p>
+              <a:t>1, w2)</a:t>
+            </a:r>
+          </a:p>
+          <a:p>
+            <a:pPr>
+              <a:buFontTx/>
+              <a:buChar char="-"/>
+            </a:pPr>
             <a:r>
               <a:rPr lang="en-US" sz="2400" dirty="0" smtClean="0"/>
-              <a:t> Pre-estimated influences for each combination</a:t>
-            </a:r>
-          </a:p>
-          <a:p>
-            <a:r>
-              <a:rPr lang="en-US" sz="2400" dirty="0" smtClean="0"/>
-              <a:t>16 actions available at every state</a:t>
-            </a:r>
-          </a:p>
-          <a:p>
-            <a:endParaRPr lang="en-US" sz="2400" dirty="0" smtClean="0"/>
-          </a:p>
-          <a:p>
-            <a:endParaRPr lang="en-US" sz="2400" dirty="0" smtClean="0"/>
-          </a:p>
-          <a:p>
-            <a:endParaRPr lang="en-US" sz="2400" dirty="0" smtClean="0"/>
-          </a:p>
-          <a:p>
-            <a:endParaRPr lang="en-US" sz="2400" dirty="0" smtClean="0"/>
-          </a:p>
-          <a:p>
-            <a:endParaRPr lang="en-US" sz="2400" dirty="0" smtClean="0"/>
-          </a:p>
-          <a:p>
-            <a:endParaRPr lang="en-US" sz="2400" dirty="0" smtClean="0"/>
-          </a:p>
-          <a:p>
-            <a:r>
-              <a:rPr lang="en-US" sz="2400" dirty="0" smtClean="0"/>
-              <a:t>One basis function per incentive – Phi</a:t>
-            </a:r>
-            <a:r>
-              <a:rPr lang="en-US" sz="1800" dirty="0" smtClean="0"/>
-              <a:t>1</a:t>
-            </a:r>
-            <a:r>
-              <a:rPr lang="en-US" sz="2400" dirty="0" smtClean="0"/>
-              <a:t>, Phi</a:t>
-            </a:r>
-            <a:r>
-              <a:rPr lang="en-US" sz="1800" dirty="0" smtClean="0"/>
-              <a:t>2</a:t>
-            </a:r>
-            <a:r>
-              <a:rPr lang="en-US" sz="2400" dirty="0" smtClean="0"/>
-              <a:t> (e.g. end-to-end delay, average number of re-transmissions)</a:t>
-            </a:r>
-          </a:p>
-          <a:p>
-            <a:endParaRPr lang="en-US" dirty="0"/>
+              <a:t>Calculate the initial set of Q values for every state/action pair</a:t>
+            </a:r>
+          </a:p>
+          <a:p>
+            <a:pPr>
+              <a:buNone/>
+            </a:pPr>
+            <a:endParaRPr lang="en-US" sz="2200" dirty="0" smtClean="0"/>
+          </a:p>
+          <a:p>
+            <a:endParaRPr lang="en-US" dirty="0" smtClean="0"/>
           </a:p>
         </p:txBody>
       </p:sp>
       <p:pic>
         <p:nvPicPr>
-          <p:cNvPr id="4" name="Picture 3" descr="Actions.png"/>
+          <p:cNvPr id="4" name="Picture 3" descr="ExplorationPhase.jpg"/>
           <p:cNvPicPr>
             <a:picLocks noChangeAspect="1"/>
           </p:cNvPicPr>
@@ -12184,8 +12315,8 @@
         </p:blipFill>
         <p:spPr>
           <a:xfrm>
-            <a:off x="3276600" y="2819400"/>
-            <a:ext cx="2511692" cy="2590800"/>
+            <a:off x="2286000" y="3429000"/>
+            <a:ext cx="4491385" cy="2971800"/>
           </a:xfrm>
           <a:prstGeom prst="rect">
             <a:avLst/>
@@ -12197,6 +12328,7 @@
   <p:clrMapOvr>
     <a:masterClrMapping/>
   </p:clrMapOvr>
+  <p:transition/>
 </p:sld>
 </file>
 
@@ -12265,7 +12397,14 @@
           <a:p>
             <a:r>
               <a:rPr lang="en-US" dirty="0" smtClean="0"/>
-              <a:t>Exploration phase:</a:t>
+              <a:t>Exploitation phase (epsilon greedy)</a:t>
+            </a:r>
+          </a:p>
+          <a:p>
+            <a:pPr lvl="1"/>
+            <a:r>
+              <a:rPr lang="en-US" sz="2000" dirty="0" smtClean="0"/>
+              <a:t>Results after 100 learning episodes, no disturbances present:</a:t>
             </a:r>
           </a:p>
           <a:p>
@@ -12273,43 +12412,19 @@
               <a:buFontTx/>
               <a:buChar char="-"/>
             </a:pPr>
-            <a:r>
-              <a:rPr lang="en-US" sz="2400" dirty="0" smtClean="0"/>
-              <a:t>Calculate the initial set of weights (</a:t>
-            </a:r>
-            <a:r>
-              <a:rPr lang="el-GR" sz="2400" dirty="0" smtClean="0"/>
-              <a:t>ω</a:t>
-            </a:r>
-            <a:r>
-              <a:rPr lang="en-US" sz="2400" dirty="0" smtClean="0"/>
-              <a:t>1, w2)</a:t>
-            </a:r>
-          </a:p>
-          <a:p>
-            <a:pPr>
-              <a:buFontTx/>
-              <a:buChar char="-"/>
-            </a:pPr>
-            <a:r>
-              <a:rPr lang="en-US" sz="2400" dirty="0" smtClean="0"/>
-              <a:t>Calculate the initial set of Q values for every state/action pair</a:t>
-            </a:r>
+            <a:endParaRPr lang="en-US" sz="2400" dirty="0" smtClean="0"/>
           </a:p>
           <a:p>
             <a:pPr>
               <a:buNone/>
             </a:pPr>
-            <a:endParaRPr lang="en-US" sz="2200" dirty="0" smtClean="0"/>
-          </a:p>
-          <a:p>
             <a:endParaRPr lang="en-US" dirty="0" smtClean="0"/>
           </a:p>
         </p:txBody>
       </p:sp>
       <p:pic>
         <p:nvPicPr>
-          <p:cNvPr id="4" name="Picture 3" descr="ExplorationPhase.jpg"/>
+          <p:cNvPr id="4" name="Picture 3" descr="Percentages.jpg"/>
           <p:cNvPicPr>
             <a:picLocks noChangeAspect="1"/>
           </p:cNvPicPr>
@@ -12323,8 +12438,8 @@
         </p:blipFill>
         <p:spPr>
           <a:xfrm>
-            <a:off x="2286000" y="3429000"/>
-            <a:ext cx="4491385" cy="2971800"/>
+            <a:off x="2057400" y="2743200"/>
+            <a:ext cx="4800600" cy="3474467"/>
           </a:xfrm>
           <a:prstGeom prst="rect">
             <a:avLst/>
@@ -12667,34 +12782,34 @@
           <a:p>
             <a:r>
               <a:rPr lang="en-US" dirty="0" smtClean="0"/>
-              <a:t>Exploitation phase (epsilon greedy)</a:t>
-            </a:r>
-          </a:p>
-          <a:p>
-            <a:pPr lvl="1"/>
-            <a:r>
-              <a:rPr lang="en-US" sz="2000" dirty="0" smtClean="0"/>
-              <a:t>Results after 100 learning episodes, no disturbances present:</a:t>
-            </a:r>
+              <a:t>Exploitation phase:</a:t>
+            </a:r>
+            <a:endParaRPr lang="en-US" sz="2400" dirty="0" smtClean="0"/>
           </a:p>
           <a:p>
             <a:pPr>
               <a:buFontTx/>
               <a:buChar char="-"/>
             </a:pPr>
-            <a:endParaRPr lang="en-US" sz="2400" dirty="0" smtClean="0"/>
+            <a:r>
+              <a:rPr lang="en-US" sz="2000" dirty="0" smtClean="0"/>
+              <a:t>Reaction to a network condition disturbance (worst case scenario)</a:t>
+            </a:r>
           </a:p>
           <a:p>
             <a:pPr>
               <a:buNone/>
             </a:pPr>
+            <a:endParaRPr lang="en-US" sz="2400" dirty="0" smtClean="0"/>
+          </a:p>
+          <a:p>
             <a:endParaRPr lang="en-US" dirty="0" smtClean="0"/>
           </a:p>
         </p:txBody>
       </p:sp>
       <p:pic>
         <p:nvPicPr>
-          <p:cNvPr id="4" name="Picture 3" descr="Percentages.jpg"/>
+          <p:cNvPr id="4" name="Picture 3" descr="ConditionsChange.jpg"/>
           <p:cNvPicPr>
             <a:picLocks noChangeAspect="1"/>
           </p:cNvPicPr>
@@ -12708,8 +12823,8 @@
         </p:blipFill>
         <p:spPr>
           <a:xfrm>
-            <a:off x="2057400" y="2743200"/>
-            <a:ext cx="4800600" cy="3474467"/>
+            <a:off x="2057400" y="2971800"/>
+            <a:ext cx="5009570" cy="3352800"/>
           </a:xfrm>
           <a:prstGeom prst="rect">
             <a:avLst/>
@@ -12761,142 +12876,11 @@
           <a:p>
             <a:r>
               <a:rPr lang="en-US" dirty="0" smtClean="0"/>
-              <a:t>Implementation – </a:t>
+              <a:t>Implementation - </a:t>
             </a:r>
             <a:r>
               <a:rPr lang="en-US" sz="3600" dirty="0" smtClean="0"/>
               <a:t>a more complex use case</a:t>
-            </a:r>
-            <a:endParaRPr lang="en-US" dirty="0"/>
-          </a:p>
-        </p:txBody>
-      </p:sp>
-      <p:sp>
-        <p:nvSpPr>
-          <p:cNvPr id="3" name="Content Placeholder 2"/>
-          <p:cNvSpPr>
-            <a:spLocks noGrp="1"/>
-          </p:cNvSpPr>
-          <p:nvPr>
-            <p:ph idx="1"/>
-          </p:nvPr>
-        </p:nvSpPr>
-        <p:spPr/>
-        <p:txBody>
-          <a:bodyPr>
-            <a:normAutofit/>
-          </a:bodyPr>
-          <a:lstStyle/>
-          <a:p>
-            <a:r>
-              <a:rPr lang="en-US" dirty="0" smtClean="0"/>
-              <a:t>Exploitation phase:</a:t>
-            </a:r>
-            <a:endParaRPr lang="en-US" sz="2400" dirty="0" smtClean="0"/>
-          </a:p>
-          <a:p>
-            <a:pPr>
-              <a:buFontTx/>
-              <a:buChar char="-"/>
-            </a:pPr>
-            <a:r>
-              <a:rPr lang="en-US" sz="2000" dirty="0" smtClean="0"/>
-              <a:t>Reaction to a network condition disturbance (worst case scenario)</a:t>
-            </a:r>
-          </a:p>
-          <a:p>
-            <a:pPr>
-              <a:buNone/>
-            </a:pPr>
-            <a:endParaRPr lang="en-US" sz="2400" dirty="0" smtClean="0"/>
-          </a:p>
-          <a:p>
-            <a:endParaRPr lang="en-US" dirty="0" smtClean="0"/>
-          </a:p>
-        </p:txBody>
-      </p:sp>
-      <p:pic>
-        <p:nvPicPr>
-          <p:cNvPr id="4" name="Picture 3" descr="ConditionsChange.jpg"/>
-          <p:cNvPicPr>
-            <a:picLocks noChangeAspect="1"/>
-          </p:cNvPicPr>
-          <p:nvPr/>
-        </p:nvPicPr>
-        <p:blipFill>
-          <a:blip r:embed="rId2" cstate="print"/>
-          <a:stretch>
-            <a:fillRect/>
-          </a:stretch>
-        </p:blipFill>
-        <p:spPr>
-          <a:xfrm>
-            <a:off x="2057400" y="2971800"/>
-            <a:ext cx="5009570" cy="3352800"/>
-          </a:xfrm>
-          <a:prstGeom prst="rect">
-            <a:avLst/>
-          </a:prstGeom>
-        </p:spPr>
-      </p:pic>
-    </p:spTree>
-  </p:cSld>
-  <p:clrMapOvr>
-    <a:masterClrMapping/>
-  </p:clrMapOvr>
-  <p:transition/>
-</p:sld>
-</file>
-
-<file path=ppt/slides/slide42.xml><?xml version="1.0" encoding="utf-8"?>
-<p:sld xmlns:a="http://schemas.openxmlformats.org/drawingml/2006/main" xmlns:r="http://schemas.openxmlformats.org/officeDocument/2006/relationships" xmlns:p="http://schemas.openxmlformats.org/presentationml/2006/main">
-  <p:cSld>
-    <p:spTree>
-      <p:nvGrpSpPr>
-        <p:cNvPr id="1" name=""/>
-        <p:cNvGrpSpPr/>
-        <p:nvPr/>
-      </p:nvGrpSpPr>
-      <p:grpSpPr>
-        <a:xfrm>
-          <a:off x="0" y="0"/>
-          <a:ext cx="0" cy="0"/>
-          <a:chOff x="0" y="0"/>
-          <a:chExt cx="0" cy="0"/>
-        </a:xfrm>
-      </p:grpSpPr>
-      <p:sp>
-        <p:nvSpPr>
-          <p:cNvPr id="2" name="Title 1"/>
-          <p:cNvSpPr>
-            <a:spLocks noGrp="1"/>
-          </p:cNvSpPr>
-          <p:nvPr>
-            <p:ph type="title"/>
-          </p:nvPr>
-        </p:nvSpPr>
-        <p:spPr/>
-        <p:txBody>
-          <a:bodyPr>
-            <a:normAutofit fontScale="90000"/>
-          </a:bodyPr>
-          <a:lstStyle/>
-          <a:p>
-            <a:r>
-              <a:rPr lang="en-US" dirty="0" smtClean="0"/>
-              <a:t>Implementation </a:t>
-            </a:r>
-            <a:r>
-              <a:rPr lang="en-US" dirty="0" smtClean="0"/>
-              <a:t>- </a:t>
-            </a:r>
-            <a:r>
-              <a:rPr lang="en-US" sz="3600" dirty="0" smtClean="0"/>
-              <a:t>a </a:t>
-            </a:r>
-            <a:r>
-              <a:rPr lang="en-US" sz="3600" dirty="0" smtClean="0"/>
-              <a:t>more complex use case</a:t>
             </a:r>
             <a:endParaRPr lang="en-US" dirty="0"/>
           </a:p>
@@ -12992,11 +12976,7 @@
             </a:pPr>
             <a:r>
               <a:rPr lang="en-US" sz="1800" dirty="0" smtClean="0"/>
-              <a:t>No </a:t>
-            </a:r>
-            <a:r>
-              <a:rPr lang="en-US" sz="1800" dirty="0" smtClean="0"/>
-              <a:t>significant difference in the number of episodes spent in the optimal state</a:t>
+              <a:t>No significant difference in the number of episodes spent in the optimal state</a:t>
             </a:r>
           </a:p>
           <a:p>
@@ -13077,7 +13057,7 @@
 </p:sld>
 </file>
 
-<file path=ppt/slides/slide43.xml><?xml version="1.0" encoding="utf-8"?>
+<file path=ppt/slides/slide42.xml><?xml version="1.0" encoding="utf-8"?>
 <p:sld xmlns:a="http://schemas.openxmlformats.org/drawingml/2006/main" xmlns:r="http://schemas.openxmlformats.org/officeDocument/2006/relationships" xmlns:p="http://schemas.openxmlformats.org/presentationml/2006/main">
   <p:cSld>
     <p:spTree>
@@ -13181,9 +13161,6 @@
               </a:rPr>
               <a:t>Probability of choosing a service combination depends on it’s Q value. </a:t>
             </a:r>
-            <a:endParaRPr lang="en-US" dirty="0" smtClean="0">
-              <a:cs typeface="Times New Roman" pitchFamily="18" charset="0"/>
-            </a:endParaRPr>
           </a:p>
           <a:p>
             <a:endParaRPr lang="en-US" dirty="0" smtClean="0">
@@ -13265,7 +13242,7 @@
 </p:sld>
 </file>
 
-<file path=ppt/slides/slide44.xml><?xml version="1.0" encoding="utf-8"?>
+<file path=ppt/slides/slide43.xml><?xml version="1.0" encoding="utf-8"?>
 <p:sld xmlns:a="http://schemas.openxmlformats.org/drawingml/2006/main" xmlns:r="http://schemas.openxmlformats.org/officeDocument/2006/relationships" xmlns:p="http://schemas.openxmlformats.org/presentationml/2006/main">
   <p:cSld>
     <p:spTree>
@@ -13300,16 +13277,22 @@
           <a:lstStyle/>
           <a:p>
             <a:r>
+              <a:rPr lang="en-US" sz="5300" dirty="0" smtClean="0">
+                <a:cs typeface="Times New Roman" pitchFamily="18" charset="0"/>
+              </a:rPr>
+              <a:t>Implementation</a:t>
+            </a:r>
+            <a:r>
               <a:rPr lang="en-US" sz="5400" dirty="0" smtClean="0">
                 <a:cs typeface="Times New Roman" pitchFamily="18" charset="0"/>
               </a:rPr>
-              <a:t>Implementation – </a:t>
-            </a:r>
-            <a:r>
-              <a:rPr lang="en-US" sz="3600" dirty="0" smtClean="0">
+              <a:t> – </a:t>
+            </a:r>
+            <a:r>
+              <a:rPr lang="en-US" sz="3100" dirty="0" smtClean="0">
                 <a:cs typeface="Times New Roman" pitchFamily="18" charset="0"/>
               </a:rPr>
-              <a:t>an even more complex use case</a:t>
+              <a:t>real life measurements</a:t>
             </a:r>
             <a:endParaRPr lang="en-US" dirty="0"/>
           </a:p>
@@ -15627,7 +15610,7 @@
 </p:sld>
 </file>
 
-<file path=ppt/slides/slide45.xml><?xml version="1.0" encoding="utf-8"?>
+<file path=ppt/slides/slide44.xml><?xml version="1.0" encoding="utf-8"?>
 <p:sld xmlns:a="http://schemas.openxmlformats.org/drawingml/2006/main" xmlns:r="http://schemas.openxmlformats.org/officeDocument/2006/relationships" xmlns:p="http://schemas.openxmlformats.org/presentationml/2006/main">
   <p:cSld>
     <p:spTree>
@@ -15668,10 +15651,10 @@
               <a:t>Implementation – </a:t>
             </a:r>
             <a:r>
-              <a:rPr lang="en-US" sz="3200" dirty="0" smtClean="0">
+              <a:rPr lang="en-US" sz="2800" dirty="0" smtClean="0">
                 <a:cs typeface="Times New Roman" pitchFamily="18" charset="0"/>
               </a:rPr>
-              <a:t>an even more complex use case</a:t>
+              <a:t>real life measurements</a:t>
             </a:r>
             <a:endParaRPr lang="en-US" sz="3200" dirty="0"/>
           </a:p>
@@ -15734,7 +15717,7 @@
 </p:sld>
 </file>
 
-<file path=ppt/slides/slide46.xml><?xml version="1.0" encoding="utf-8"?>
+<file path=ppt/slides/slide45.xml><?xml version="1.0" encoding="utf-8"?>
 <p:sld xmlns:a="http://schemas.openxmlformats.org/drawingml/2006/main" xmlns:r="http://schemas.openxmlformats.org/officeDocument/2006/relationships" xmlns:p="http://schemas.openxmlformats.org/presentationml/2006/main">
   <p:cSld>
     <p:spTree>
@@ -15775,10 +15758,10 @@
               <a:t>Implementation – </a:t>
             </a:r>
             <a:r>
-              <a:rPr lang="en-US" sz="3200" dirty="0" smtClean="0">
+              <a:rPr lang="en-US" sz="2800" dirty="0" smtClean="0">
                 <a:cs typeface="Times New Roman" pitchFamily="18" charset="0"/>
               </a:rPr>
-              <a:t>an even more complex use case</a:t>
+              <a:t>real life measurements</a:t>
             </a:r>
             <a:endParaRPr lang="en-US" sz="3200" dirty="0">
               <a:latin typeface="+mn-lt"/>
@@ -15810,13 +15793,7 @@
               <a:rPr lang="en-US" sz="2800" dirty="0" smtClean="0">
                 <a:cs typeface="Times New Roman" pitchFamily="18" charset="0"/>
               </a:rPr>
-              <a:t>Exploration phase results - steady </a:t>
-            </a:r>
-            <a:r>
-              <a:rPr lang="en-US" sz="2800" dirty="0" smtClean="0">
-                <a:cs typeface="Times New Roman" pitchFamily="18" charset="0"/>
-              </a:rPr>
-              <a:t>network conditions:</a:t>
+              <a:t>Exploration phase results - steady network conditions:</a:t>
             </a:r>
           </a:p>
           <a:p>
@@ -15854,7 +15831,7 @@
               <a:pPr>
                 <a:defRPr/>
               </a:pPr>
-              <a:t>46</a:t>
+              <a:t>45</a:t>
             </a:fld>
             <a:endParaRPr lang="en-US">
               <a:solidFill>
@@ -15951,7 +15928,7 @@
 </p:sld>
 </file>
 
-<file path=ppt/slides/slide47.xml><?xml version="1.0" encoding="utf-8"?>
+<file path=ppt/slides/slide46.xml><?xml version="1.0" encoding="utf-8"?>
 <p:sld xmlns:a="http://schemas.openxmlformats.org/drawingml/2006/main" xmlns:r="http://schemas.openxmlformats.org/officeDocument/2006/relationships" xmlns:p="http://schemas.openxmlformats.org/presentationml/2006/main">
   <p:cSld>
     <p:spTree>
@@ -15997,7 +15974,7 @@
                 <a:latin typeface="+mn-lt"/>
                 <a:cs typeface="Times New Roman" pitchFamily="18" charset="0"/>
               </a:rPr>
-              <a:t>an even more complex use case</a:t>
+              <a:t>real life measurements</a:t>
             </a:r>
             <a:endParaRPr lang="en-US" dirty="0">
               <a:latin typeface="+mn-lt"/>
@@ -16133,7 +16110,7 @@
               <a:pPr>
                 <a:defRPr/>
               </a:pPr>
-              <a:t>47</a:t>
+              <a:t>46</a:t>
             </a:fld>
             <a:endParaRPr lang="en-US">
               <a:solidFill>
@@ -16161,6 +16138,141 @@
           <a:xfrm>
             <a:off x="2590800" y="2133600"/>
             <a:ext cx="4042969" cy="2667000"/>
+          </a:xfrm>
+          <a:prstGeom prst="rect">
+            <a:avLst/>
+          </a:prstGeom>
+        </p:spPr>
+      </p:pic>
+    </p:spTree>
+  </p:cSld>
+  <p:clrMapOvr>
+    <a:masterClrMapping/>
+  </p:clrMapOvr>
+</p:sld>
+</file>
+
+<file path=ppt/slides/slide47.xml><?xml version="1.0" encoding="utf-8"?>
+<p:sld xmlns:a="http://schemas.openxmlformats.org/drawingml/2006/main" xmlns:r="http://schemas.openxmlformats.org/officeDocument/2006/relationships" xmlns:p="http://schemas.openxmlformats.org/presentationml/2006/main">
+  <p:cSld>
+    <p:spTree>
+      <p:nvGrpSpPr>
+        <p:cNvPr id="1" name=""/>
+        <p:cNvGrpSpPr/>
+        <p:nvPr/>
+      </p:nvGrpSpPr>
+      <p:grpSpPr>
+        <a:xfrm>
+          <a:off x="0" y="0"/>
+          <a:ext cx="0" cy="0"/>
+          <a:chOff x="0" y="0"/>
+          <a:chExt cx="0" cy="0"/>
+        </a:xfrm>
+      </p:grpSpPr>
+      <p:sp>
+        <p:nvSpPr>
+          <p:cNvPr id="2" name="Title 1"/>
+          <p:cNvSpPr>
+            <a:spLocks noGrp="1"/>
+          </p:cNvSpPr>
+          <p:nvPr>
+            <p:ph type="title"/>
+          </p:nvPr>
+        </p:nvSpPr>
+        <p:spPr/>
+        <p:txBody>
+          <a:bodyPr>
+            <a:noAutofit/>
+          </a:bodyPr>
+          <a:lstStyle/>
+          <a:p>
+            <a:r>
+              <a:rPr lang="en-US" dirty="0" smtClean="0">
+                <a:cs typeface="Times New Roman" pitchFamily="18" charset="0"/>
+              </a:rPr>
+              <a:t>Implementation – </a:t>
+            </a:r>
+            <a:r>
+              <a:rPr lang="en-US" sz="3200" dirty="0" smtClean="0">
+                <a:cs typeface="Times New Roman" pitchFamily="18" charset="0"/>
+              </a:rPr>
+              <a:t>real life measurements</a:t>
+            </a:r>
+            <a:endParaRPr lang="en-US" sz="3200" dirty="0"/>
+          </a:p>
+        </p:txBody>
+      </p:sp>
+      <p:sp>
+        <p:nvSpPr>
+          <p:cNvPr id="5" name="TextBox 4"/>
+          <p:cNvSpPr txBox="1"/>
+          <p:nvPr/>
+        </p:nvSpPr>
+        <p:spPr>
+          <a:xfrm>
+            <a:off x="685800" y="1524000"/>
+            <a:ext cx="8034635" cy="369332"/>
+          </a:xfrm>
+          <a:prstGeom prst="rect">
+            <a:avLst/>
+          </a:prstGeom>
+          <a:noFill/>
+        </p:spPr>
+        <p:txBody>
+          <a:bodyPr wrap="none" rtlCol="0">
+            <a:spAutoFit/>
+          </a:bodyPr>
+          <a:lstStyle/>
+          <a:p>
+            <a:r>
+              <a:rPr lang="en-US" dirty="0" smtClean="0"/>
+              <a:t>A performance summary for both networks, in a single hop and multi-hop use cases</a:t>
+            </a:r>
+            <a:endParaRPr lang="en-US" dirty="0"/>
+          </a:p>
+        </p:txBody>
+      </p:sp>
+      <p:pic>
+        <p:nvPicPr>
+          <p:cNvPr id="7" name="Content Placeholder 6" descr="SummarizeMultiHop.jpg"/>
+          <p:cNvPicPr>
+            <a:picLocks noGrp="1" noChangeAspect="1"/>
+          </p:cNvPicPr>
+          <p:nvPr>
+            <p:ph idx="1"/>
+          </p:nvPr>
+        </p:nvPicPr>
+        <p:blipFill>
+          <a:blip r:embed="rId2" cstate="print"/>
+          <a:stretch>
+            <a:fillRect/>
+          </a:stretch>
+        </p:blipFill>
+        <p:spPr>
+          <a:xfrm>
+            <a:off x="533400" y="2438400"/>
+            <a:ext cx="3977876" cy="3429000"/>
+          </a:xfrm>
+        </p:spPr>
+      </p:pic>
+      <p:pic>
+        <p:nvPicPr>
+          <p:cNvPr id="8" name="Picture 7" descr="SummarizeSingleHop.jpg"/>
+          <p:cNvPicPr>
+            <a:picLocks noChangeAspect="1"/>
+          </p:cNvPicPr>
+          <p:nvPr/>
+        </p:nvPicPr>
+        <p:blipFill>
+          <a:blip r:embed="rId3" cstate="print"/>
+          <a:stretch>
+            <a:fillRect/>
+          </a:stretch>
+        </p:blipFill>
+        <p:spPr>
+          <a:xfrm>
+            <a:off x="4648200" y="3657600"/>
+            <a:ext cx="4307425" cy="1600200"/>
           </a:xfrm>
           <a:prstGeom prst="rect">
             <a:avLst/>
@@ -16204,36 +16316,80 @@
         </p:nvSpPr>
         <p:spPr/>
         <p:txBody>
+          <a:bodyPr/>
+          <a:lstStyle/>
+          <a:p>
+            <a:r>
+              <a:rPr lang="en-US" dirty="0" smtClean="0"/>
+              <a:t>Implementation – </a:t>
+            </a:r>
+            <a:r>
+              <a:rPr lang="en-US" sz="3200" dirty="0" smtClean="0"/>
+              <a:t>the newest idea</a:t>
+            </a:r>
+            <a:endParaRPr lang="en-US" dirty="0"/>
+          </a:p>
+        </p:txBody>
+      </p:sp>
+      <p:sp>
+        <p:nvSpPr>
+          <p:cNvPr id="3" name="Content Placeholder 2"/>
+          <p:cNvSpPr>
+            <a:spLocks noGrp="1"/>
+          </p:cNvSpPr>
+          <p:nvPr>
+            <p:ph idx="1"/>
+          </p:nvPr>
+        </p:nvSpPr>
+        <p:spPr/>
+        <p:txBody>
           <a:bodyPr>
-            <a:noAutofit/>
+            <a:normAutofit/>
           </a:bodyPr>
           <a:lstStyle/>
           <a:p>
             <a:r>
-              <a:rPr lang="en-US" dirty="0" smtClean="0">
-                <a:cs typeface="Times New Roman" pitchFamily="18" charset="0"/>
-              </a:rPr>
-              <a:t>Implementation – </a:t>
-            </a:r>
-            <a:r>
-              <a:rPr lang="en-US" sz="3200" dirty="0" smtClean="0">
-                <a:cs typeface="Times New Roman" pitchFamily="18" charset="0"/>
-              </a:rPr>
-              <a:t>an even more complex use case</a:t>
-            </a:r>
-            <a:endParaRPr lang="en-US" sz="3200" dirty="0"/>
+              <a:rPr lang="en-US" sz="2400" dirty="0" smtClean="0"/>
+              <a:t>Values of each of the relevant network properties will be divided into a certain number of intervals: </a:t>
+            </a:r>
+          </a:p>
+          <a:p>
+            <a:endParaRPr lang="en-US" sz="2400" dirty="0" smtClean="0"/>
+          </a:p>
+          <a:p>
+            <a:endParaRPr lang="en-US" sz="2400" dirty="0" smtClean="0"/>
+          </a:p>
+          <a:p>
+            <a:endParaRPr lang="en-US" sz="2400" dirty="0" smtClean="0"/>
+          </a:p>
+          <a:p>
+            <a:endParaRPr lang="en-US" sz="2400" dirty="0" smtClean="0"/>
+          </a:p>
+          <a:p>
+            <a:r>
+              <a:rPr lang="en-US" sz="2000" dirty="0" smtClean="0"/>
+              <a:t>Every </a:t>
+            </a:r>
+            <a:r>
+              <a:rPr lang="en-US" sz="2000" dirty="0" smtClean="0"/>
+              <a:t>possible combination of the intervals will represent a network state. The maximum number of states can be calculated as: </a:t>
+            </a:r>
+          </a:p>
+          <a:p>
+            <a:pPr>
+              <a:buNone/>
+            </a:pPr>
+            <a:endParaRPr lang="en-US" sz="2400" dirty="0"/>
           </a:p>
         </p:txBody>
       </p:sp>
       <p:pic>
         <p:nvPicPr>
-          <p:cNvPr id="4" name="Content Placeholder 3" descr="Before and after cooperation.jpg"/>
+          <p:cNvPr id="4" name="Picture 3" descr="Final idea.jpg"/>
           <p:cNvPicPr>
-            <a:picLocks noGrp="1" noChangeAspect="1"/>
+            <a:picLocks noChangeAspect="1"/>
           </p:cNvPicPr>
-          <p:nvPr>
-            <p:ph idx="1"/>
-          </p:nvPr>
+          <p:nvPr/>
         </p:nvPicPr>
         <p:blipFill>
           <a:blip r:embed="rId2" cstate="print"/>
@@ -16243,70 +16399,180 @@
         </p:blipFill>
         <p:spPr>
           <a:xfrm>
-            <a:off x="1676400" y="1676400"/>
-            <a:ext cx="5530318" cy="3768992"/>
-          </a:xfrm>
-        </p:spPr>
-      </p:pic>
-      <p:sp>
-        <p:nvSpPr>
-          <p:cNvPr id="5" name="TextBox 4"/>
-          <p:cNvSpPr txBox="1"/>
-          <p:nvPr/>
-        </p:nvSpPr>
-        <p:spPr>
-          <a:xfrm>
-            <a:off x="533400" y="5715000"/>
-            <a:ext cx="8043869" cy="923330"/>
+            <a:off x="1295400" y="2667000"/>
+            <a:ext cx="6657889" cy="1219200"/>
           </a:xfrm>
           <a:prstGeom prst="rect">
             <a:avLst/>
           </a:prstGeom>
-          <a:noFill/>
         </p:spPr>
+      </p:pic>
+      <p:pic>
+        <p:nvPicPr>
+          <p:cNvPr id="5" name="Picture 4" descr="Final idea - formula.jpg"/>
+          <p:cNvPicPr>
+            <a:picLocks noChangeAspect="1"/>
+          </p:cNvPicPr>
+          <p:nvPr/>
+        </p:nvPicPr>
+        <p:blipFill>
+          <a:blip r:embed="rId3" cstate="print"/>
+          <a:stretch>
+            <a:fillRect/>
+          </a:stretch>
+        </p:blipFill>
+        <p:spPr>
+          <a:xfrm>
+            <a:off x="3352800" y="5029200"/>
+            <a:ext cx="2171700" cy="590550"/>
+          </a:xfrm>
+          <a:prstGeom prst="rect">
+            <a:avLst/>
+          </a:prstGeom>
+        </p:spPr>
+      </p:pic>
+    </p:spTree>
+  </p:cSld>
+  <p:clrMapOvr>
+    <a:masterClrMapping/>
+  </p:clrMapOvr>
+</p:sld>
+</file>
+
+<file path=ppt/slides/slide49.xml><?xml version="1.0" encoding="utf-8"?>
+<p:sld xmlns:a="http://schemas.openxmlformats.org/drawingml/2006/main" xmlns:r="http://schemas.openxmlformats.org/officeDocument/2006/relationships" xmlns:p="http://schemas.openxmlformats.org/presentationml/2006/main">
+  <p:cSld>
+    <p:spTree>
+      <p:nvGrpSpPr>
+        <p:cNvPr id="1" name=""/>
+        <p:cNvGrpSpPr/>
+        <p:nvPr/>
+      </p:nvGrpSpPr>
+      <p:grpSpPr>
+        <a:xfrm>
+          <a:off x="0" y="0"/>
+          <a:ext cx="0" cy="0"/>
+          <a:chOff x="0" y="0"/>
+          <a:chExt cx="0" cy="0"/>
+        </a:xfrm>
+      </p:grpSpPr>
+      <p:sp>
+        <p:nvSpPr>
+          <p:cNvPr id="2" name="Title 1"/>
+          <p:cNvSpPr>
+            <a:spLocks noGrp="1"/>
+          </p:cNvSpPr>
+          <p:nvPr>
+            <p:ph type="title"/>
+          </p:nvPr>
+        </p:nvSpPr>
+        <p:spPr/>
         <p:txBody>
-          <a:bodyPr wrap="none" rtlCol="0">
-            <a:spAutoFit/>
+          <a:bodyPr/>
+          <a:lstStyle/>
+          <a:p>
+            <a:r>
+              <a:rPr lang="en-US" dirty="0" smtClean="0"/>
+              <a:t>Implementation – </a:t>
+            </a:r>
+            <a:r>
+              <a:rPr lang="en-US" sz="3200" dirty="0" smtClean="0"/>
+              <a:t>the newest idea</a:t>
+            </a:r>
+            <a:endParaRPr lang="en-US" dirty="0"/>
+          </a:p>
+        </p:txBody>
+      </p:sp>
+      <p:sp>
+        <p:nvSpPr>
+          <p:cNvPr id="3" name="Content Placeholder 2"/>
+          <p:cNvSpPr>
+            <a:spLocks noGrp="1"/>
+          </p:cNvSpPr>
+          <p:nvPr>
+            <p:ph idx="1"/>
+          </p:nvPr>
+        </p:nvSpPr>
+        <p:spPr/>
+        <p:txBody>
+          <a:bodyPr>
+            <a:normAutofit lnSpcReduction="10000"/>
           </a:bodyPr>
           <a:lstStyle/>
           <a:p>
             <a:r>
-              <a:rPr lang="en-US" dirty="0" smtClean="0"/>
-              <a:t>Performances of the (a</a:t>
-            </a:r>
-            <a:r>
-              <a:rPr lang="en-US" dirty="0" smtClean="0"/>
-              <a:t>) Security network and (b) temperature </a:t>
-            </a:r>
-            <a:r>
-              <a:rPr lang="en-US" dirty="0" smtClean="0"/>
-              <a:t>monitoring </a:t>
-            </a:r>
-            <a:r>
-              <a:rPr lang="en-US" dirty="0" smtClean="0"/>
-              <a:t>network, </a:t>
-            </a:r>
-            <a:endParaRPr lang="en-US" dirty="0" smtClean="0"/>
-          </a:p>
-          <a:p>
-            <a:r>
-              <a:rPr lang="en-US" dirty="0" smtClean="0"/>
-              <a:t>in </a:t>
-            </a:r>
-            <a:r>
-              <a:rPr lang="en-US" dirty="0" smtClean="0"/>
-              <a:t>terms of a duty cycle and reliability metrics, in situations with and without</a:t>
-            </a:r>
-          </a:p>
-          <a:p>
-            <a:r>
-              <a:rPr lang="en-US" dirty="0" smtClean="0"/>
-              <a:t>influences </a:t>
-            </a:r>
-            <a:r>
-              <a:rPr lang="en-US" dirty="0" smtClean="0"/>
-              <a:t>of co-located devices. </a:t>
-            </a:r>
+              <a:rPr lang="en-US" sz="2600" dirty="0" smtClean="0"/>
+              <a:t>The simplest interpretation of the property intervals could be as: </a:t>
+            </a:r>
+            <a:r>
+              <a:rPr lang="en-US" sz="2600" b="1" dirty="0" smtClean="0"/>
+              <a:t>bad, acceptable, good. </a:t>
+            </a:r>
+            <a:r>
+              <a:rPr lang="en-US" sz="2600" dirty="0" smtClean="0"/>
+              <a:t>Additional intervals will ensure a finer differentiation between states. However, this will </a:t>
+            </a:r>
+            <a:r>
+              <a:rPr lang="en-US" sz="2600" dirty="0" smtClean="0"/>
+              <a:t>result </a:t>
+            </a:r>
+            <a:r>
+              <a:rPr lang="en-US" sz="2600" dirty="0" smtClean="0"/>
+              <a:t>in the higher number of them and, consequently, a longer learning period. </a:t>
+            </a:r>
+            <a:endParaRPr lang="en-US" sz="2600" dirty="0" smtClean="0"/>
+          </a:p>
+          <a:p>
+            <a:endParaRPr lang="en-US" sz="2600" dirty="0" smtClean="0"/>
+          </a:p>
+          <a:p>
+            <a:r>
+              <a:rPr lang="en-US" sz="2400" b="1" dirty="0" smtClean="0"/>
+              <a:t>Interference</a:t>
+            </a:r>
+            <a:r>
+              <a:rPr lang="en-US" sz="2400" dirty="0" smtClean="0"/>
+              <a:t> </a:t>
+            </a:r>
+            <a:r>
+              <a:rPr lang="en-US" sz="2400" dirty="0" smtClean="0"/>
+              <a:t>is also included </a:t>
+            </a:r>
+            <a:r>
+              <a:rPr lang="en-US" sz="2400" dirty="0" smtClean="0"/>
+              <a:t>as a part of a </a:t>
+            </a:r>
+            <a:r>
+              <a:rPr lang="en-US" sz="2400" dirty="0" smtClean="0"/>
+              <a:t>state, which changes voluntarily</a:t>
+            </a:r>
+            <a:r>
+              <a:rPr lang="en-US" sz="2400" dirty="0" smtClean="0"/>
+              <a:t>. The level of interference </a:t>
+            </a:r>
+            <a:r>
+              <a:rPr lang="en-US" sz="2400" dirty="0" smtClean="0"/>
+              <a:t>is assessed before taking an action. </a:t>
+            </a:r>
+            <a:r>
+              <a:rPr lang="en-US" sz="2400" dirty="0" smtClean="0"/>
+              <a:t>If the measured interference level between the two states is different, the corresponding transition </a:t>
+            </a:r>
+            <a:r>
+              <a:rPr lang="en-US" sz="2400" dirty="0" smtClean="0"/>
+              <a:t>is not given </a:t>
+            </a:r>
+            <a:r>
+              <a:rPr lang="en-US" sz="2400" dirty="0" smtClean="0"/>
+              <a:t>a Q value. </a:t>
+            </a:r>
+            <a:r>
+              <a:rPr lang="en-US" sz="2400" dirty="0" smtClean="0"/>
+              <a:t>Learning processes are separated.</a:t>
+            </a:r>
+            <a:endParaRPr lang="en-US" sz="2400" dirty="0" smtClean="0"/>
+          </a:p>
+          <a:p>
             <a:endParaRPr lang="en-US" dirty="0"/>
           </a:p>
         </p:txBody>
@@ -16428,6 +16694,318 @@
           <a:xfrm>
             <a:off x="2895600" y="2209800"/>
             <a:ext cx="3786003" cy="2593683"/>
+          </a:xfrm>
+          <a:prstGeom prst="rect">
+            <a:avLst/>
+          </a:prstGeom>
+        </p:spPr>
+      </p:pic>
+    </p:spTree>
+  </p:cSld>
+  <p:clrMapOvr>
+    <a:masterClrMapping/>
+  </p:clrMapOvr>
+</p:sld>
+</file>
+
+<file path=ppt/slides/slide50.xml><?xml version="1.0" encoding="utf-8"?>
+<p:sld xmlns:a="http://schemas.openxmlformats.org/drawingml/2006/main" xmlns:r="http://schemas.openxmlformats.org/officeDocument/2006/relationships" xmlns:p="http://schemas.openxmlformats.org/presentationml/2006/main">
+  <p:cSld>
+    <p:spTree>
+      <p:nvGrpSpPr>
+        <p:cNvPr id="1" name=""/>
+        <p:cNvGrpSpPr/>
+        <p:nvPr/>
+      </p:nvGrpSpPr>
+      <p:grpSpPr>
+        <a:xfrm>
+          <a:off x="0" y="0"/>
+          <a:ext cx="0" cy="0"/>
+          <a:chOff x="0" y="0"/>
+          <a:chExt cx="0" cy="0"/>
+        </a:xfrm>
+      </p:grpSpPr>
+      <p:sp>
+        <p:nvSpPr>
+          <p:cNvPr id="2" name="Title 1"/>
+          <p:cNvSpPr>
+            <a:spLocks noGrp="1"/>
+          </p:cNvSpPr>
+          <p:nvPr>
+            <p:ph type="title"/>
+          </p:nvPr>
+        </p:nvSpPr>
+        <p:spPr/>
+        <p:txBody>
+          <a:bodyPr/>
+          <a:lstStyle/>
+          <a:p>
+            <a:r>
+              <a:rPr lang="en-US" dirty="0" smtClean="0"/>
+              <a:t>Implementation – </a:t>
+            </a:r>
+            <a:r>
+              <a:rPr lang="en-US" sz="3200" dirty="0" smtClean="0"/>
+              <a:t>the newest idea</a:t>
+            </a:r>
+            <a:endParaRPr lang="en-US" dirty="0"/>
+          </a:p>
+        </p:txBody>
+      </p:sp>
+      <p:sp>
+        <p:nvSpPr>
+          <p:cNvPr id="3" name="Content Placeholder 2"/>
+          <p:cNvSpPr>
+            <a:spLocks noGrp="1"/>
+          </p:cNvSpPr>
+          <p:nvPr>
+            <p:ph idx="1"/>
+          </p:nvPr>
+        </p:nvSpPr>
+        <p:spPr>
+          <a:xfrm>
+            <a:off x="457200" y="1600200"/>
+            <a:ext cx="8229600" cy="4953000"/>
+          </a:xfrm>
+        </p:spPr>
+        <p:txBody>
+          <a:bodyPr/>
+          <a:lstStyle/>
+          <a:p>
+            <a:r>
+              <a:rPr lang="en-US" sz="2800" dirty="0" smtClean="0"/>
+              <a:t>Action is represented as an </a:t>
+            </a:r>
+            <a:r>
+              <a:rPr lang="en-US" sz="2800" dirty="0" smtClean="0"/>
+              <a:t>activation or deactivation </a:t>
+            </a:r>
+            <a:r>
+              <a:rPr lang="en-US" sz="2800" dirty="0" smtClean="0"/>
+              <a:t>of exclusively one service </a:t>
+            </a:r>
+            <a:r>
+              <a:rPr lang="en-US" sz="2800" dirty="0" smtClean="0"/>
+              <a:t>at a </a:t>
+            </a:r>
+            <a:r>
+              <a:rPr lang="en-US" sz="2800" dirty="0" smtClean="0"/>
+              <a:t>time:</a:t>
+            </a:r>
+          </a:p>
+          <a:p>
+            <a:endParaRPr lang="en-US" sz="2800" dirty="0" smtClean="0"/>
+          </a:p>
+          <a:p>
+            <a:endParaRPr lang="en-US" sz="2800" dirty="0" smtClean="0"/>
+          </a:p>
+          <a:p>
+            <a:endParaRPr lang="en-US" sz="2800" dirty="0" smtClean="0"/>
+          </a:p>
+          <a:p>
+            <a:endParaRPr lang="en-US" sz="2800" dirty="0" smtClean="0"/>
+          </a:p>
+          <a:p>
+            <a:endParaRPr lang="en-US" sz="2800" dirty="0" smtClean="0"/>
+          </a:p>
+          <a:p>
+            <a:endParaRPr lang="en-US" sz="2000" dirty="0" smtClean="0"/>
+          </a:p>
+          <a:p>
+            <a:r>
+              <a:rPr lang="en-US" sz="2000" dirty="0" smtClean="0"/>
+              <a:t>An </a:t>
+            </a:r>
+            <a:r>
+              <a:rPr lang="en-US" sz="2000" dirty="0" smtClean="0"/>
+              <a:t>action is denominated not by the sole service that is changed, but by service combination it </a:t>
+            </a:r>
+            <a:r>
+              <a:rPr lang="en-US" sz="2000" dirty="0" smtClean="0"/>
+              <a:t>resulted </a:t>
+            </a:r>
+            <a:r>
+              <a:rPr lang="en-US" sz="2000" dirty="0" smtClean="0"/>
+              <a:t>in. </a:t>
+            </a:r>
+          </a:p>
+          <a:p>
+            <a:endParaRPr lang="en-US" sz="2800" dirty="0" smtClean="0"/>
+          </a:p>
+          <a:p>
+            <a:endParaRPr lang="en-US" dirty="0"/>
+          </a:p>
+        </p:txBody>
+      </p:sp>
+      <p:pic>
+        <p:nvPicPr>
+          <p:cNvPr id="4" name="Picture 3" descr="Final idea - diagram.jpg"/>
+          <p:cNvPicPr>
+            <a:picLocks noChangeAspect="1"/>
+          </p:cNvPicPr>
+          <p:nvPr/>
+        </p:nvPicPr>
+        <p:blipFill>
+          <a:blip r:embed="rId2" cstate="print"/>
+          <a:stretch>
+            <a:fillRect/>
+          </a:stretch>
+        </p:blipFill>
+        <p:spPr>
+          <a:xfrm>
+            <a:off x="2667000" y="2590800"/>
+            <a:ext cx="4191000" cy="2836266"/>
+          </a:xfrm>
+          <a:prstGeom prst="rect">
+            <a:avLst/>
+          </a:prstGeom>
+        </p:spPr>
+      </p:pic>
+    </p:spTree>
+  </p:cSld>
+  <p:clrMapOvr>
+    <a:masterClrMapping/>
+  </p:clrMapOvr>
+</p:sld>
+</file>
+
+<file path=ppt/slides/slide51.xml><?xml version="1.0" encoding="utf-8"?>
+<p:sld xmlns:a="http://schemas.openxmlformats.org/drawingml/2006/main" xmlns:r="http://schemas.openxmlformats.org/officeDocument/2006/relationships" xmlns:p="http://schemas.openxmlformats.org/presentationml/2006/main">
+  <p:cSld>
+    <p:spTree>
+      <p:nvGrpSpPr>
+        <p:cNvPr id="1" name=""/>
+        <p:cNvGrpSpPr/>
+        <p:nvPr/>
+      </p:nvGrpSpPr>
+      <p:grpSpPr>
+        <a:xfrm>
+          <a:off x="0" y="0"/>
+          <a:ext cx="0" cy="0"/>
+          <a:chOff x="0" y="0"/>
+          <a:chExt cx="0" cy="0"/>
+        </a:xfrm>
+      </p:grpSpPr>
+      <p:sp>
+        <p:nvSpPr>
+          <p:cNvPr id="2" name="Title 1"/>
+          <p:cNvSpPr>
+            <a:spLocks noGrp="1"/>
+          </p:cNvSpPr>
+          <p:nvPr>
+            <p:ph type="title"/>
+          </p:nvPr>
+        </p:nvSpPr>
+        <p:spPr/>
+        <p:txBody>
+          <a:bodyPr/>
+          <a:lstStyle/>
+          <a:p>
+            <a:r>
+              <a:rPr lang="en-US" dirty="0" smtClean="0"/>
+              <a:t>Implementation – </a:t>
+            </a:r>
+            <a:r>
+              <a:rPr lang="en-US" sz="3200" dirty="0" smtClean="0"/>
+              <a:t>the newest idea</a:t>
+            </a:r>
+            <a:endParaRPr lang="en-US" dirty="0"/>
+          </a:p>
+        </p:txBody>
+      </p:sp>
+      <p:sp>
+        <p:nvSpPr>
+          <p:cNvPr id="3" name="Content Placeholder 2"/>
+          <p:cNvSpPr>
+            <a:spLocks noGrp="1"/>
+          </p:cNvSpPr>
+          <p:nvPr>
+            <p:ph idx="1"/>
+          </p:nvPr>
+        </p:nvSpPr>
+        <p:spPr>
+          <a:xfrm>
+            <a:off x="457200" y="1600200"/>
+            <a:ext cx="8229600" cy="4800600"/>
+          </a:xfrm>
+        </p:spPr>
+        <p:txBody>
+          <a:bodyPr>
+            <a:normAutofit lnSpcReduction="10000"/>
+          </a:bodyPr>
+          <a:lstStyle/>
+          <a:p>
+            <a:r>
+              <a:rPr lang="en-US" sz="1800" dirty="0" smtClean="0"/>
+              <a:t>Every service combination will, eventually, be associated with a certain state, meaning that taking a certain action at no matter what state, will result in a transfer to one particular state. </a:t>
+            </a:r>
+            <a:endParaRPr lang="en-US" sz="1800" dirty="0" smtClean="0"/>
+          </a:p>
+          <a:p>
+            <a:endParaRPr lang="en-US" sz="2000" dirty="0" smtClean="0"/>
+          </a:p>
+          <a:p>
+            <a:endParaRPr lang="en-US" sz="2000" dirty="0" smtClean="0"/>
+          </a:p>
+          <a:p>
+            <a:endParaRPr lang="en-US" sz="2000" dirty="0" smtClean="0"/>
+          </a:p>
+          <a:p>
+            <a:endParaRPr lang="en-US" sz="2000" dirty="0" smtClean="0"/>
+          </a:p>
+          <a:p>
+            <a:endParaRPr lang="en-US" sz="2000" dirty="0" smtClean="0"/>
+          </a:p>
+          <a:p>
+            <a:endParaRPr lang="en-US" sz="2000" dirty="0" smtClean="0"/>
+          </a:p>
+          <a:p>
+            <a:endParaRPr lang="en-US" sz="2000" dirty="0" smtClean="0"/>
+          </a:p>
+          <a:p>
+            <a:endParaRPr lang="en-US" sz="2000" dirty="0" smtClean="0"/>
+          </a:p>
+          <a:p>
+            <a:r>
+              <a:rPr lang="en-US" sz="2000" dirty="0" smtClean="0"/>
+              <a:t>This </a:t>
+            </a:r>
+            <a:r>
+              <a:rPr lang="en-US" sz="2000" dirty="0" smtClean="0"/>
+              <a:t>can be interpreted in the following way: once a service combination – an action Ax– is activated, Q values for every (</a:t>
+            </a:r>
+            <a:r>
+              <a:rPr lang="en-US" sz="2000" dirty="0" err="1" smtClean="0"/>
+              <a:t>S,a</a:t>
+            </a:r>
+            <a:r>
+              <a:rPr lang="en-US" sz="2000" dirty="0" smtClean="0"/>
+              <a:t>) pair that includes Ax -&gt; (S, Ax) will be updated.</a:t>
+            </a:r>
+          </a:p>
+          <a:p>
+            <a:endParaRPr lang="en-US" dirty="0"/>
+          </a:p>
+        </p:txBody>
+      </p:sp>
+      <p:pic>
+        <p:nvPicPr>
+          <p:cNvPr id="5" name="Picture 4" descr="Final idea - diagram.jpg"/>
+          <p:cNvPicPr>
+            <a:picLocks noChangeAspect="1"/>
+          </p:cNvPicPr>
+          <p:nvPr/>
+        </p:nvPicPr>
+        <p:blipFill>
+          <a:blip r:embed="rId2" cstate="print"/>
+          <a:stretch>
+            <a:fillRect/>
+          </a:stretch>
+        </p:blipFill>
+        <p:spPr>
+          <a:xfrm>
+            <a:off x="2590800" y="2362200"/>
+            <a:ext cx="3962400" cy="2681561"/>
           </a:xfrm>
           <a:prstGeom prst="rect">
             <a:avLst/>
@@ -16592,21 +17170,44 @@
           <a:p>
             <a:r>
               <a:rPr lang="en-US" dirty="0" smtClean="0"/>
-              <a:t>Networks cooperating</a:t>
+              <a:t>Incentive driven networking</a:t>
             </a:r>
             <a:endParaRPr lang="en-US" dirty="0"/>
+          </a:p>
+        </p:txBody>
+      </p:sp>
+      <p:sp>
+        <p:nvSpPr>
+          <p:cNvPr id="3" name="Content Placeholder 2"/>
+          <p:cNvSpPr>
+            <a:spLocks noGrp="1"/>
+          </p:cNvSpPr>
+          <p:nvPr>
+            <p:ph idx="1"/>
+          </p:nvPr>
+        </p:nvSpPr>
+        <p:spPr/>
+        <p:txBody>
+          <a:bodyPr>
+            <a:normAutofit/>
+          </a:bodyPr>
+          <a:lstStyle/>
+          <a:p>
+            <a:r>
+              <a:rPr lang="en-US" sz="2800" dirty="0" smtClean="0"/>
+              <a:t>A cross-layer, cross-network negotiation methodology for optimizing network resources</a:t>
+            </a:r>
+            <a:endParaRPr lang="en-US" sz="2800" dirty="0"/>
           </a:p>
         </p:txBody>
       </p:sp>
       <p:pic>
         <p:nvPicPr>
-          <p:cNvPr id="4" name="Content Placeholder 3" descr="Cooperating.jpg"/>
+          <p:cNvPr id="4" name="Picture 3" descr="Incentive cross-layer cross-network.jpg"/>
           <p:cNvPicPr>
-            <a:picLocks noGrp="1" noChangeAspect="1"/>
+            <a:picLocks noChangeAspect="1"/>
           </p:cNvPicPr>
-          <p:nvPr>
-            <p:ph idx="1"/>
-          </p:nvPr>
+          <p:nvPr/>
         </p:nvPicPr>
         <p:blipFill>
           <a:blip r:embed="rId2" cstate="print"/>
@@ -16616,9 +17217,12 @@
         </p:blipFill>
         <p:spPr>
           <a:xfrm>
-            <a:off x="990600" y="2133600"/>
-            <a:ext cx="7104185" cy="2977662"/>
+            <a:off x="2133600" y="2895600"/>
+            <a:ext cx="4905375" cy="3074496"/>
           </a:xfrm>
+          <a:prstGeom prst="rect">
+            <a:avLst/>
+          </a:prstGeom>
         </p:spPr>
       </p:pic>
     </p:spTree>
@@ -16682,42 +17286,90 @@
         <p:spPr/>
         <p:txBody>
           <a:bodyPr>
-            <a:normAutofit/>
+            <a:normAutofit lnSpcReduction="10000"/>
           </a:bodyPr>
           <a:lstStyle/>
           <a:p>
             <a:r>
-              <a:rPr lang="en-US" sz="2800" dirty="0" smtClean="0"/>
-              <a:t>A cross-layer, cross-network negotiation methodology for optimizing network resources</a:t>
-            </a:r>
-            <a:endParaRPr lang="en-US" sz="2800" dirty="0"/>
+              <a:rPr lang="en-US" dirty="0" smtClean="0"/>
+              <a:t>Incentive describes a high-level network behavior or a reason for cooperation:</a:t>
+            </a:r>
+          </a:p>
+          <a:p>
+            <a:pPr lvl="1"/>
+            <a:r>
+              <a:rPr lang="en-US" sz="2400" dirty="0" smtClean="0"/>
+              <a:t>Describe behavioral aspects of the network</a:t>
+            </a:r>
+          </a:p>
+          <a:p>
+            <a:pPr lvl="1"/>
+            <a:r>
+              <a:rPr lang="en-US" sz="2400" dirty="0" smtClean="0"/>
+              <a:t>Express the need for additional functionality</a:t>
+            </a:r>
+          </a:p>
+          <a:p>
+            <a:pPr lvl="1"/>
+            <a:r>
+              <a:rPr lang="en-US" sz="2400" dirty="0" smtClean="0"/>
+              <a:t>Give an indication of the expected performance network metric</a:t>
+            </a:r>
+          </a:p>
+          <a:p>
+            <a:pPr lvl="1">
+              <a:buNone/>
+            </a:pPr>
+            <a:r>
+              <a:rPr lang="en-US" sz="2000" dirty="0" smtClean="0"/>
+              <a:t>Examples:</a:t>
+            </a:r>
+          </a:p>
+          <a:p>
+            <a:pPr lvl="1"/>
+            <a:r>
+              <a:rPr lang="en-US" sz="2000" dirty="0" smtClean="0"/>
+              <a:t>High throughput, high reliability, low delay (better </a:t>
+            </a:r>
+            <a:r>
+              <a:rPr lang="en-US" sz="2000" dirty="0" err="1" smtClean="0"/>
+              <a:t>QoS</a:t>
+            </a:r>
+            <a:r>
+              <a:rPr lang="en-US" sz="2000" dirty="0" smtClean="0"/>
+              <a:t>)</a:t>
+            </a:r>
+          </a:p>
+          <a:p>
+            <a:pPr lvl="1"/>
+            <a:r>
+              <a:rPr lang="en-US" sz="2000" dirty="0" smtClean="0"/>
+              <a:t>High network lifetime </a:t>
+            </a:r>
+          </a:p>
+          <a:p>
+            <a:pPr lvl="1"/>
+            <a:r>
+              <a:rPr lang="en-US" sz="2000" dirty="0" smtClean="0"/>
+              <a:t>High coverage</a:t>
+            </a:r>
+          </a:p>
+          <a:p>
+            <a:pPr lvl="1"/>
+            <a:r>
+              <a:rPr lang="en-US" sz="2000" dirty="0" smtClean="0"/>
+              <a:t>Low exposure</a:t>
+            </a:r>
+          </a:p>
+          <a:p>
+            <a:pPr lvl="1"/>
+            <a:r>
+              <a:rPr lang="en-US" sz="2000" dirty="0" smtClean="0"/>
+              <a:t>Public access</a:t>
+            </a:r>
           </a:p>
         </p:txBody>
       </p:sp>
-      <p:pic>
-        <p:nvPicPr>
-          <p:cNvPr id="4" name="Picture 3" descr="Incentive cross-layer cross-network.jpg"/>
-          <p:cNvPicPr>
-            <a:picLocks noChangeAspect="1"/>
-          </p:cNvPicPr>
-          <p:nvPr/>
-        </p:nvPicPr>
-        <p:blipFill>
-          <a:blip r:embed="rId2" cstate="print"/>
-          <a:stretch>
-            <a:fillRect/>
-          </a:stretch>
-        </p:blipFill>
-        <p:spPr>
-          <a:xfrm>
-            <a:off x="2133600" y="2895600"/>
-            <a:ext cx="4905375" cy="3074496"/>
-          </a:xfrm>
-          <a:prstGeom prst="rect">
-            <a:avLst/>
-          </a:prstGeom>
-        </p:spPr>
-      </p:pic>
     </p:spTree>
   </p:cSld>
   <p:clrMapOvr>
@@ -16760,7 +17412,7 @@
           <a:p>
             <a:r>
               <a:rPr lang="en-US" dirty="0" smtClean="0"/>
-              <a:t>Incentive driven networking</a:t>
+              <a:t>Network services</a:t>
             </a:r>
             <a:endParaRPr lang="en-US" dirty="0"/>
           </a:p>
@@ -16785,81 +17437,37 @@
           <a:p>
             <a:r>
               <a:rPr lang="en-US" dirty="0" smtClean="0"/>
-              <a:t>Incentive describes a high-level network behavior or a reason for cooperation:</a:t>
-            </a:r>
-          </a:p>
-          <a:p>
-            <a:pPr lvl="1"/>
-            <a:r>
-              <a:rPr lang="en-US" sz="2400" dirty="0" smtClean="0"/>
-              <a:t>Describe behavioral aspects of the network</a:t>
-            </a:r>
-          </a:p>
-          <a:p>
-            <a:pPr lvl="1"/>
-            <a:r>
-              <a:rPr lang="en-US" sz="2400" dirty="0" smtClean="0"/>
-              <a:t>Express the need for additional functionality</a:t>
-            </a:r>
-          </a:p>
-          <a:p>
-            <a:pPr lvl="1"/>
-            <a:r>
-              <a:rPr lang="en-US" sz="2400" dirty="0" smtClean="0"/>
-              <a:t>Give an indication of the expected performance network metric</a:t>
-            </a:r>
-          </a:p>
-          <a:p>
-            <a:pPr lvl="1">
+              <a:t>Whereas incentives indicate network goals, network services are means to realize these goals</a:t>
+            </a:r>
+          </a:p>
+          <a:p>
+            <a:r>
+              <a:rPr lang="en-US" dirty="0" smtClean="0"/>
+              <a:t>Network services should be understood as optimization techniques that have influence over one or more incentives</a:t>
+            </a:r>
+          </a:p>
+          <a:p>
+            <a:pPr>
               <a:buNone/>
             </a:pPr>
             <a:r>
-              <a:rPr lang="en-US" sz="2000" dirty="0" smtClean="0"/>
+              <a:rPr lang="en-US" dirty="0" smtClean="0"/>
               <a:t>Examples:</a:t>
             </a:r>
           </a:p>
           <a:p>
-            <a:pPr lvl="1"/>
-            <a:r>
-              <a:rPr lang="en-US" sz="2000" dirty="0" smtClean="0"/>
-              <a:t>High throughput, high reliability, low delay (better </a:t>
-            </a:r>
-            <a:r>
-              <a:rPr lang="en-US" sz="2000" dirty="0" err="1" smtClean="0"/>
-              <a:t>QoS</a:t>
-            </a:r>
-            <a:r>
-              <a:rPr lang="en-US" sz="2000" dirty="0" smtClean="0"/>
-              <a:t>)</a:t>
-            </a:r>
-          </a:p>
-          <a:p>
-            <a:pPr lvl="1"/>
-            <a:r>
-              <a:rPr lang="en-US" sz="2000" dirty="0" smtClean="0"/>
-              <a:t>High network lifetime </a:t>
-            </a:r>
-          </a:p>
-          <a:p>
-            <a:pPr lvl="1"/>
-            <a:r>
-              <a:rPr lang="en-US" sz="2000" dirty="0" smtClean="0"/>
-              <a:t>High coverage</a:t>
-            </a:r>
-          </a:p>
-          <a:p>
-            <a:pPr lvl="1"/>
-            <a:r>
-              <a:rPr lang="en-US" sz="2000" dirty="0" smtClean="0"/>
-              <a:t>Low exposure</a:t>
-            </a:r>
-          </a:p>
-          <a:p>
-            <a:pPr lvl="1"/>
-            <a:r>
-              <a:rPr lang="en-US" sz="2000" dirty="0" smtClean="0"/>
-              <a:t>Public access</a:t>
-            </a:r>
+            <a:pPr>
+              <a:buNone/>
+            </a:pPr>
+            <a:r>
+              <a:rPr lang="en-US" dirty="0" smtClean="0"/>
+              <a:t>	</a:t>
+            </a:r>
+            <a:r>
+              <a:rPr lang="en-US" sz="2400" dirty="0" smtClean="0"/>
+              <a:t>packet aggregation and sharing, MAC protocols, interference avoidance techniques …</a:t>
+            </a:r>
+            <a:endParaRPr lang="en-US" dirty="0"/>
           </a:p>
         </p:txBody>
       </p:sp>

</xml_diff>